<commit_message>
220619 - fin 90%
</commit_message>
<xml_diff>
--- a/素材.pptx
+++ b/素材.pptx
@@ -6,6 +6,11 @@
   </p:sldMasterIdLst>
   <p:sldIdLst>
     <p:sldId id="256" r:id="rId2"/>
+    <p:sldId id="257" r:id="rId3"/>
+    <p:sldId id="258" r:id="rId4"/>
+    <p:sldId id="259" r:id="rId5"/>
+    <p:sldId id="260" r:id="rId6"/>
+    <p:sldId id="261" r:id="rId7"/>
   </p:sldIdLst>
   <p:sldSz cx="12192000" cy="6858000"/>
   <p:notesSz cx="6858000" cy="9144000"/>
@@ -272,7 +277,7 @@
           <a:p>
             <a:fld id="{021B483B-ABA0-48B8-A896-5DD07329AD2E}" type="datetimeFigureOut">
               <a:rPr lang="en-US" smtClean="0"/>
-              <a:t>6/5/2022</a:t>
+              <a:t>6/18/2022</a:t>
             </a:fld>
             <a:endParaRPr lang="en-US"/>
           </a:p>
@@ -472,7 +477,7 @@
           <a:p>
             <a:fld id="{021B483B-ABA0-48B8-A896-5DD07329AD2E}" type="datetimeFigureOut">
               <a:rPr lang="en-US" smtClean="0"/>
-              <a:t>6/5/2022</a:t>
+              <a:t>6/18/2022</a:t>
             </a:fld>
             <a:endParaRPr lang="en-US"/>
           </a:p>
@@ -682,7 +687,7 @@
           <a:p>
             <a:fld id="{021B483B-ABA0-48B8-A896-5DD07329AD2E}" type="datetimeFigureOut">
               <a:rPr lang="en-US" smtClean="0"/>
-              <a:t>6/5/2022</a:t>
+              <a:t>6/18/2022</a:t>
             </a:fld>
             <a:endParaRPr lang="en-US"/>
           </a:p>
@@ -882,7 +887,7 @@
           <a:p>
             <a:fld id="{021B483B-ABA0-48B8-A896-5DD07329AD2E}" type="datetimeFigureOut">
               <a:rPr lang="en-US" smtClean="0"/>
-              <a:t>6/5/2022</a:t>
+              <a:t>6/18/2022</a:t>
             </a:fld>
             <a:endParaRPr lang="en-US"/>
           </a:p>
@@ -1158,7 +1163,7 @@
           <a:p>
             <a:fld id="{021B483B-ABA0-48B8-A896-5DD07329AD2E}" type="datetimeFigureOut">
               <a:rPr lang="en-US" smtClean="0"/>
-              <a:t>6/5/2022</a:t>
+              <a:t>6/18/2022</a:t>
             </a:fld>
             <a:endParaRPr lang="en-US"/>
           </a:p>
@@ -1426,7 +1431,7 @@
           <a:p>
             <a:fld id="{021B483B-ABA0-48B8-A896-5DD07329AD2E}" type="datetimeFigureOut">
               <a:rPr lang="en-US" smtClean="0"/>
-              <a:t>6/5/2022</a:t>
+              <a:t>6/18/2022</a:t>
             </a:fld>
             <a:endParaRPr lang="en-US"/>
           </a:p>
@@ -1841,7 +1846,7 @@
           <a:p>
             <a:fld id="{021B483B-ABA0-48B8-A896-5DD07329AD2E}" type="datetimeFigureOut">
               <a:rPr lang="en-US" smtClean="0"/>
-              <a:t>6/5/2022</a:t>
+              <a:t>6/18/2022</a:t>
             </a:fld>
             <a:endParaRPr lang="en-US"/>
           </a:p>
@@ -1983,7 +1988,7 @@
           <a:p>
             <a:fld id="{021B483B-ABA0-48B8-A896-5DD07329AD2E}" type="datetimeFigureOut">
               <a:rPr lang="en-US" smtClean="0"/>
-              <a:t>6/5/2022</a:t>
+              <a:t>6/18/2022</a:t>
             </a:fld>
             <a:endParaRPr lang="en-US"/>
           </a:p>
@@ -2096,7 +2101,7 @@
           <a:p>
             <a:fld id="{021B483B-ABA0-48B8-A896-5DD07329AD2E}" type="datetimeFigureOut">
               <a:rPr lang="en-US" smtClean="0"/>
-              <a:t>6/5/2022</a:t>
+              <a:t>6/18/2022</a:t>
             </a:fld>
             <a:endParaRPr lang="en-US"/>
           </a:p>
@@ -2409,7 +2414,7 @@
           <a:p>
             <a:fld id="{021B483B-ABA0-48B8-A896-5DD07329AD2E}" type="datetimeFigureOut">
               <a:rPr lang="en-US" smtClean="0"/>
-              <a:t>6/5/2022</a:t>
+              <a:t>6/18/2022</a:t>
             </a:fld>
             <a:endParaRPr lang="en-US"/>
           </a:p>
@@ -2698,7 +2703,7 @@
           <a:p>
             <a:fld id="{021B483B-ABA0-48B8-A896-5DD07329AD2E}" type="datetimeFigureOut">
               <a:rPr lang="en-US" smtClean="0"/>
-              <a:t>6/5/2022</a:t>
+              <a:t>6/18/2022</a:t>
             </a:fld>
             <a:endParaRPr lang="en-US"/>
           </a:p>
@@ -2941,7 +2946,7 @@
           <a:p>
             <a:fld id="{021B483B-ABA0-48B8-A896-5DD07329AD2E}" type="datetimeFigureOut">
               <a:rPr lang="en-US" smtClean="0"/>
-              <a:t>6/5/2022</a:t>
+              <a:t>6/18/2022</a:t>
             </a:fld>
             <a:endParaRPr lang="en-US"/>
           </a:p>
@@ -3553,6 +3558,1848 @@
 </p:sld>
 </file>
 
+<file path=ppt/slides/slide2.xml><?xml version="1.0" encoding="utf-8"?>
+<p:sld xmlns:a="http://schemas.openxmlformats.org/drawingml/2006/main" xmlns:r="http://schemas.openxmlformats.org/officeDocument/2006/relationships" xmlns:p="http://schemas.openxmlformats.org/presentationml/2006/main">
+  <p:cSld>
+    <p:spTree>
+      <p:nvGrpSpPr>
+        <p:cNvPr id="1" name=""/>
+        <p:cNvGrpSpPr/>
+        <p:nvPr/>
+      </p:nvGrpSpPr>
+      <p:grpSpPr>
+        <a:xfrm>
+          <a:off x="0" y="0"/>
+          <a:ext cx="0" cy="0"/>
+          <a:chOff x="0" y="0"/>
+          <a:chExt cx="0" cy="0"/>
+        </a:xfrm>
+      </p:grpSpPr>
+      <p:pic>
+        <p:nvPicPr>
+          <p:cNvPr id="3" name="圖片 2">
+            <a:extLst>
+              <a:ext uri="{FF2B5EF4-FFF2-40B4-BE49-F238E27FC236}">
+                <a16:creationId xmlns:a16="http://schemas.microsoft.com/office/drawing/2014/main" id="{C111AEC6-D400-9393-71E5-5292E5FA81BB}"/>
+              </a:ext>
+            </a:extLst>
+          </p:cNvPr>
+          <p:cNvPicPr>
+            <a:picLocks noChangeAspect="1"/>
+          </p:cNvPicPr>
+          <p:nvPr/>
+        </p:nvPicPr>
+        <p:blipFill rotWithShape="1">
+          <a:blip r:embed="rId2">
+            <a:extLst>
+              <a:ext uri="{28A0092B-C50C-407E-A947-70E740481C1C}">
+                <a14:useLocalDpi xmlns:a14="http://schemas.microsoft.com/office/drawing/2010/main" val="0"/>
+              </a:ext>
+            </a:extLst>
+          </a:blip>
+          <a:srcRect r="50000" b="50000"/>
+          <a:stretch/>
+        </p:blipFill>
+        <p:spPr>
+          <a:xfrm>
+            <a:off x="2028276" y="134111"/>
+            <a:ext cx="5477423" cy="5477423"/>
+          </a:xfrm>
+          <a:prstGeom prst="rect">
+            <a:avLst/>
+          </a:prstGeom>
+        </p:spPr>
+      </p:pic>
+      <p:sp>
+        <p:nvSpPr>
+          <p:cNvPr id="6" name="文字方塊 5">
+            <a:extLst>
+              <a:ext uri="{FF2B5EF4-FFF2-40B4-BE49-F238E27FC236}">
+                <a16:creationId xmlns:a16="http://schemas.microsoft.com/office/drawing/2014/main" id="{7AA1D58C-E033-0759-1846-B46ED7840462}"/>
+              </a:ext>
+            </a:extLst>
+          </p:cNvPr>
+          <p:cNvSpPr txBox="1"/>
+          <p:nvPr/>
+        </p:nvSpPr>
+        <p:spPr>
+          <a:xfrm>
+            <a:off x="6096000" y="1145892"/>
+            <a:ext cx="697627" cy="246221"/>
+          </a:xfrm>
+          <a:prstGeom prst="rect">
+            <a:avLst/>
+          </a:prstGeom>
+          <a:noFill/>
+        </p:spPr>
+        <p:txBody>
+          <a:bodyPr wrap="none" rtlCol="0">
+            <a:spAutoFit/>
+          </a:bodyPr>
+          <a:lstStyle/>
+          <a:p>
+            <a:r>
+              <a:rPr lang="zh-TW" altLang="en-US" sz="1000" dirty="0">
+                <a:solidFill>
+                  <a:schemeClr val="bg1"/>
+                </a:solidFill>
+                <a:latin typeface="源樣明體 SB" panose="02020600000000000000" pitchFamily="18" charset="-120"/>
+                <a:ea typeface="源樣明體 SB" panose="02020600000000000000" pitchFamily="18" charset="-120"/>
+              </a:rPr>
+              <a:t>開始遊戲</a:t>
+            </a:r>
+            <a:endParaRPr lang="en-US" sz="1000" dirty="0">
+              <a:solidFill>
+                <a:schemeClr val="bg1"/>
+              </a:solidFill>
+              <a:latin typeface="源樣明體 SB" panose="02020600000000000000" pitchFamily="18" charset="-120"/>
+              <a:ea typeface="源樣明體 SB" panose="02020600000000000000" pitchFamily="18" charset="-120"/>
+            </a:endParaRPr>
+          </a:p>
+        </p:txBody>
+      </p:sp>
+      <p:sp>
+        <p:nvSpPr>
+          <p:cNvPr id="5" name="文字方塊 4">
+            <a:extLst>
+              <a:ext uri="{FF2B5EF4-FFF2-40B4-BE49-F238E27FC236}">
+                <a16:creationId xmlns:a16="http://schemas.microsoft.com/office/drawing/2014/main" id="{959BECE8-6761-31C3-C4F8-24C74622FA72}"/>
+              </a:ext>
+            </a:extLst>
+          </p:cNvPr>
+          <p:cNvSpPr txBox="1"/>
+          <p:nvPr/>
+        </p:nvSpPr>
+        <p:spPr>
+          <a:xfrm>
+            <a:off x="4668011" y="2226491"/>
+            <a:ext cx="441146" cy="246221"/>
+          </a:xfrm>
+          <a:prstGeom prst="rect">
+            <a:avLst/>
+          </a:prstGeom>
+          <a:noFill/>
+        </p:spPr>
+        <p:txBody>
+          <a:bodyPr wrap="none" rtlCol="0">
+            <a:spAutoFit/>
+          </a:bodyPr>
+          <a:lstStyle/>
+          <a:p>
+            <a:r>
+              <a:rPr lang="zh-TW" altLang="en-US" sz="1000" dirty="0">
+                <a:solidFill>
+                  <a:schemeClr val="bg1"/>
+                </a:solidFill>
+                <a:latin typeface="源樣明體 SB" panose="02020600000000000000" pitchFamily="18" charset="-120"/>
+                <a:ea typeface="源樣明體 SB" panose="02020600000000000000" pitchFamily="18" charset="-120"/>
+              </a:rPr>
+              <a:t>設定</a:t>
+            </a:r>
+            <a:endParaRPr lang="en-US" sz="1000" dirty="0">
+              <a:solidFill>
+                <a:schemeClr val="bg1"/>
+              </a:solidFill>
+              <a:latin typeface="源樣明體 SB" panose="02020600000000000000" pitchFamily="18" charset="-120"/>
+              <a:ea typeface="源樣明體 SB" panose="02020600000000000000" pitchFamily="18" charset="-120"/>
+            </a:endParaRPr>
+          </a:p>
+        </p:txBody>
+      </p:sp>
+      <p:sp>
+        <p:nvSpPr>
+          <p:cNvPr id="7" name="文字方塊 6">
+            <a:extLst>
+              <a:ext uri="{FF2B5EF4-FFF2-40B4-BE49-F238E27FC236}">
+                <a16:creationId xmlns:a16="http://schemas.microsoft.com/office/drawing/2014/main" id="{7F345593-264C-70E6-1996-AEE4098E182F}"/>
+              </a:ext>
+            </a:extLst>
+          </p:cNvPr>
+          <p:cNvSpPr txBox="1"/>
+          <p:nvPr/>
+        </p:nvSpPr>
+        <p:spPr>
+          <a:xfrm>
+            <a:off x="4668011" y="3131601"/>
+            <a:ext cx="441146" cy="246221"/>
+          </a:xfrm>
+          <a:prstGeom prst="rect">
+            <a:avLst/>
+          </a:prstGeom>
+          <a:noFill/>
+        </p:spPr>
+        <p:txBody>
+          <a:bodyPr wrap="none" rtlCol="0">
+            <a:spAutoFit/>
+          </a:bodyPr>
+          <a:lstStyle/>
+          <a:p>
+            <a:r>
+              <a:rPr lang="zh-TW" altLang="en-US" sz="1000" dirty="0">
+                <a:solidFill>
+                  <a:schemeClr val="bg1"/>
+                </a:solidFill>
+                <a:latin typeface="源樣明體 SB" panose="02020600000000000000" pitchFamily="18" charset="-120"/>
+                <a:ea typeface="源樣明體 SB" panose="02020600000000000000" pitchFamily="18" charset="-120"/>
+              </a:rPr>
+              <a:t>關於</a:t>
+            </a:r>
+            <a:endParaRPr lang="en-US" sz="1000" dirty="0">
+              <a:solidFill>
+                <a:schemeClr val="bg1"/>
+              </a:solidFill>
+              <a:latin typeface="源樣明體 SB" panose="02020600000000000000" pitchFamily="18" charset="-120"/>
+              <a:ea typeface="源樣明體 SB" panose="02020600000000000000" pitchFamily="18" charset="-120"/>
+            </a:endParaRPr>
+          </a:p>
+        </p:txBody>
+      </p:sp>
+      <p:sp>
+        <p:nvSpPr>
+          <p:cNvPr id="8" name="文字方塊 7">
+            <a:extLst>
+              <a:ext uri="{FF2B5EF4-FFF2-40B4-BE49-F238E27FC236}">
+                <a16:creationId xmlns:a16="http://schemas.microsoft.com/office/drawing/2014/main" id="{A798388F-6F15-1D2F-C87C-DAFD619A67E6}"/>
+              </a:ext>
+            </a:extLst>
+          </p:cNvPr>
+          <p:cNvSpPr txBox="1"/>
+          <p:nvPr/>
+        </p:nvSpPr>
+        <p:spPr>
+          <a:xfrm>
+            <a:off x="4668011" y="4092023"/>
+            <a:ext cx="697627" cy="246221"/>
+          </a:xfrm>
+          <a:prstGeom prst="rect">
+            <a:avLst/>
+          </a:prstGeom>
+          <a:noFill/>
+        </p:spPr>
+        <p:txBody>
+          <a:bodyPr wrap="none" rtlCol="0">
+            <a:spAutoFit/>
+          </a:bodyPr>
+          <a:lstStyle/>
+          <a:p>
+            <a:r>
+              <a:rPr lang="zh-TW" altLang="en-US" sz="1000" dirty="0">
+                <a:solidFill>
+                  <a:schemeClr val="bg1"/>
+                </a:solidFill>
+                <a:latin typeface="源樣明體 SB" panose="02020600000000000000" pitchFamily="18" charset="-120"/>
+                <a:ea typeface="源樣明體 SB" panose="02020600000000000000" pitchFamily="18" charset="-120"/>
+              </a:rPr>
+              <a:t>離開遊戲</a:t>
+            </a:r>
+            <a:endParaRPr lang="en-US" sz="1000" dirty="0">
+              <a:solidFill>
+                <a:schemeClr val="bg1"/>
+              </a:solidFill>
+              <a:latin typeface="源樣明體 SB" panose="02020600000000000000" pitchFamily="18" charset="-120"/>
+              <a:ea typeface="源樣明體 SB" panose="02020600000000000000" pitchFamily="18" charset="-120"/>
+            </a:endParaRPr>
+          </a:p>
+        </p:txBody>
+      </p:sp>
+      <p:sp>
+        <p:nvSpPr>
+          <p:cNvPr id="9" name="文字方塊 8">
+            <a:extLst>
+              <a:ext uri="{FF2B5EF4-FFF2-40B4-BE49-F238E27FC236}">
+                <a16:creationId xmlns:a16="http://schemas.microsoft.com/office/drawing/2014/main" id="{DCE5B103-E8C0-50BA-8BA2-BA955E7DDA99}"/>
+              </a:ext>
+            </a:extLst>
+          </p:cNvPr>
+          <p:cNvSpPr txBox="1"/>
+          <p:nvPr/>
+        </p:nvSpPr>
+        <p:spPr>
+          <a:xfrm>
+            <a:off x="2735662" y="1085435"/>
+            <a:ext cx="697627" cy="246221"/>
+          </a:xfrm>
+          <a:prstGeom prst="rect">
+            <a:avLst/>
+          </a:prstGeom>
+          <a:noFill/>
+        </p:spPr>
+        <p:txBody>
+          <a:bodyPr wrap="none" rtlCol="0">
+            <a:spAutoFit/>
+          </a:bodyPr>
+          <a:lstStyle/>
+          <a:p>
+            <a:r>
+              <a:rPr lang="zh-TW" altLang="en-US" sz="1000" dirty="0">
+                <a:solidFill>
+                  <a:srgbClr val="FFC000"/>
+                </a:solidFill>
+                <a:latin typeface="源樣明體 SB" panose="02020600000000000000" pitchFamily="18" charset="-120"/>
+                <a:ea typeface="源樣明體 SB" panose="02020600000000000000" pitchFamily="18" charset="-120"/>
+              </a:rPr>
+              <a:t>開始遊戲</a:t>
+            </a:r>
+            <a:endParaRPr lang="en-US" sz="1000" dirty="0">
+              <a:solidFill>
+                <a:srgbClr val="FFC000"/>
+              </a:solidFill>
+              <a:latin typeface="源樣明體 SB" panose="02020600000000000000" pitchFamily="18" charset="-120"/>
+              <a:ea typeface="源樣明體 SB" panose="02020600000000000000" pitchFamily="18" charset="-120"/>
+            </a:endParaRPr>
+          </a:p>
+        </p:txBody>
+      </p:sp>
+      <p:sp>
+        <p:nvSpPr>
+          <p:cNvPr id="10" name="文字方塊 9">
+            <a:extLst>
+              <a:ext uri="{FF2B5EF4-FFF2-40B4-BE49-F238E27FC236}">
+                <a16:creationId xmlns:a16="http://schemas.microsoft.com/office/drawing/2014/main" id="{1CDC5161-1E43-C299-1B66-B0FFB62DDB7D}"/>
+              </a:ext>
+            </a:extLst>
+          </p:cNvPr>
+          <p:cNvSpPr txBox="1"/>
+          <p:nvPr/>
+        </p:nvSpPr>
+        <p:spPr>
+          <a:xfrm>
+            <a:off x="2397252" y="2229392"/>
+            <a:ext cx="441146" cy="246221"/>
+          </a:xfrm>
+          <a:prstGeom prst="rect">
+            <a:avLst/>
+          </a:prstGeom>
+          <a:noFill/>
+        </p:spPr>
+        <p:txBody>
+          <a:bodyPr wrap="none" rtlCol="0">
+            <a:spAutoFit/>
+          </a:bodyPr>
+          <a:lstStyle/>
+          <a:p>
+            <a:r>
+              <a:rPr lang="zh-TW" altLang="en-US" sz="1000" dirty="0">
+                <a:solidFill>
+                  <a:srgbClr val="FFC000"/>
+                </a:solidFill>
+                <a:latin typeface="源樣明體 SB" panose="02020600000000000000" pitchFamily="18" charset="-120"/>
+                <a:ea typeface="源樣明體 SB" panose="02020600000000000000" pitchFamily="18" charset="-120"/>
+              </a:rPr>
+              <a:t>設定</a:t>
+            </a:r>
+            <a:endParaRPr lang="en-US" sz="1000" dirty="0">
+              <a:solidFill>
+                <a:srgbClr val="FFC000"/>
+              </a:solidFill>
+              <a:latin typeface="源樣明體 SB" panose="02020600000000000000" pitchFamily="18" charset="-120"/>
+              <a:ea typeface="源樣明體 SB" panose="02020600000000000000" pitchFamily="18" charset="-120"/>
+            </a:endParaRPr>
+          </a:p>
+        </p:txBody>
+      </p:sp>
+      <p:sp>
+        <p:nvSpPr>
+          <p:cNvPr id="14" name="文字方塊 13">
+            <a:extLst>
+              <a:ext uri="{FF2B5EF4-FFF2-40B4-BE49-F238E27FC236}">
+                <a16:creationId xmlns:a16="http://schemas.microsoft.com/office/drawing/2014/main" id="{F38E7B48-E529-7835-E393-7B4E537DAF9D}"/>
+              </a:ext>
+            </a:extLst>
+          </p:cNvPr>
+          <p:cNvSpPr txBox="1"/>
+          <p:nvPr/>
+        </p:nvSpPr>
+        <p:spPr>
+          <a:xfrm>
+            <a:off x="2473451" y="3218842"/>
+            <a:ext cx="441146" cy="246221"/>
+          </a:xfrm>
+          <a:prstGeom prst="rect">
+            <a:avLst/>
+          </a:prstGeom>
+          <a:noFill/>
+        </p:spPr>
+        <p:txBody>
+          <a:bodyPr wrap="none" rtlCol="0">
+            <a:spAutoFit/>
+          </a:bodyPr>
+          <a:lstStyle/>
+          <a:p>
+            <a:r>
+              <a:rPr lang="zh-TW" altLang="en-US" sz="1000" dirty="0">
+                <a:solidFill>
+                  <a:srgbClr val="FFC000"/>
+                </a:solidFill>
+                <a:latin typeface="源樣明體 SB" panose="02020600000000000000" pitchFamily="18" charset="-120"/>
+                <a:ea typeface="源樣明體 SB" panose="02020600000000000000" pitchFamily="18" charset="-120"/>
+              </a:rPr>
+              <a:t>關於</a:t>
+            </a:r>
+            <a:endParaRPr lang="en-US" sz="1000" dirty="0">
+              <a:solidFill>
+                <a:srgbClr val="FFC000"/>
+              </a:solidFill>
+              <a:latin typeface="源樣明體 SB" panose="02020600000000000000" pitchFamily="18" charset="-120"/>
+              <a:ea typeface="源樣明體 SB" panose="02020600000000000000" pitchFamily="18" charset="-120"/>
+            </a:endParaRPr>
+          </a:p>
+        </p:txBody>
+      </p:sp>
+      <p:sp>
+        <p:nvSpPr>
+          <p:cNvPr id="15" name="文字方塊 14">
+            <a:extLst>
+              <a:ext uri="{FF2B5EF4-FFF2-40B4-BE49-F238E27FC236}">
+                <a16:creationId xmlns:a16="http://schemas.microsoft.com/office/drawing/2014/main" id="{0D49D5E8-EB96-2413-2A18-4D3CD41365A1}"/>
+              </a:ext>
+            </a:extLst>
+          </p:cNvPr>
+          <p:cNvSpPr txBox="1"/>
+          <p:nvPr/>
+        </p:nvSpPr>
+        <p:spPr>
+          <a:xfrm>
+            <a:off x="1935587" y="4152983"/>
+            <a:ext cx="697627" cy="246221"/>
+          </a:xfrm>
+          <a:prstGeom prst="rect">
+            <a:avLst/>
+          </a:prstGeom>
+          <a:noFill/>
+        </p:spPr>
+        <p:txBody>
+          <a:bodyPr wrap="none" rtlCol="0">
+            <a:spAutoFit/>
+          </a:bodyPr>
+          <a:lstStyle/>
+          <a:p>
+            <a:r>
+              <a:rPr lang="zh-TW" altLang="en-US" sz="1000" dirty="0">
+                <a:solidFill>
+                  <a:srgbClr val="FFC000"/>
+                </a:solidFill>
+                <a:latin typeface="源樣明體 SB" panose="02020600000000000000" pitchFamily="18" charset="-120"/>
+                <a:ea typeface="源樣明體 SB" panose="02020600000000000000" pitchFamily="18" charset="-120"/>
+              </a:rPr>
+              <a:t>離開遊戲</a:t>
+            </a:r>
+            <a:endParaRPr lang="en-US" sz="1000" dirty="0">
+              <a:solidFill>
+                <a:srgbClr val="FFC000"/>
+              </a:solidFill>
+              <a:latin typeface="源樣明體 SB" panose="02020600000000000000" pitchFamily="18" charset="-120"/>
+              <a:ea typeface="源樣明體 SB" panose="02020600000000000000" pitchFamily="18" charset="-120"/>
+            </a:endParaRPr>
+          </a:p>
+        </p:txBody>
+      </p:sp>
+      <p:sp>
+        <p:nvSpPr>
+          <p:cNvPr id="16" name="文字方塊 15">
+            <a:extLst>
+              <a:ext uri="{FF2B5EF4-FFF2-40B4-BE49-F238E27FC236}">
+                <a16:creationId xmlns:a16="http://schemas.microsoft.com/office/drawing/2014/main" id="{F7D8D3DA-A476-CB67-8642-538E388A4C07}"/>
+              </a:ext>
+            </a:extLst>
+          </p:cNvPr>
+          <p:cNvSpPr txBox="1"/>
+          <p:nvPr/>
+        </p:nvSpPr>
+        <p:spPr>
+          <a:xfrm>
+            <a:off x="3118003" y="4700644"/>
+            <a:ext cx="902811" cy="307777"/>
+          </a:xfrm>
+          <a:prstGeom prst="rect">
+            <a:avLst/>
+          </a:prstGeom>
+          <a:noFill/>
+        </p:spPr>
+        <p:txBody>
+          <a:bodyPr wrap="none" rtlCol="0">
+            <a:spAutoFit/>
+          </a:bodyPr>
+          <a:lstStyle/>
+          <a:p>
+            <a:r>
+              <a:rPr lang="zh-TW" altLang="en-US" sz="1400" dirty="0">
+                <a:solidFill>
+                  <a:schemeClr val="bg1"/>
+                </a:solidFill>
+                <a:latin typeface="源樣明體 SB" panose="02020600000000000000" pitchFamily="18" charset="-120"/>
+                <a:ea typeface="源樣明體 SB" panose="02020600000000000000" pitchFamily="18" charset="-120"/>
+              </a:rPr>
+              <a:t>守護家園</a:t>
+            </a:r>
+            <a:endParaRPr lang="en-US" sz="1400" dirty="0">
+              <a:solidFill>
+                <a:schemeClr val="bg1"/>
+              </a:solidFill>
+              <a:latin typeface="源樣明體 SB" panose="02020600000000000000" pitchFamily="18" charset="-120"/>
+              <a:ea typeface="源樣明體 SB" panose="02020600000000000000" pitchFamily="18" charset="-120"/>
+            </a:endParaRPr>
+          </a:p>
+        </p:txBody>
+      </p:sp>
+      <p:sp>
+        <p:nvSpPr>
+          <p:cNvPr id="17" name="文字方塊 16">
+            <a:extLst>
+              <a:ext uri="{FF2B5EF4-FFF2-40B4-BE49-F238E27FC236}">
+                <a16:creationId xmlns:a16="http://schemas.microsoft.com/office/drawing/2014/main" id="{A21593F8-F702-E47B-99C5-C42EC52515B4}"/>
+              </a:ext>
+            </a:extLst>
+          </p:cNvPr>
+          <p:cNvSpPr txBox="1"/>
+          <p:nvPr/>
+        </p:nvSpPr>
+        <p:spPr>
+          <a:xfrm>
+            <a:off x="3118003" y="5113417"/>
+            <a:ext cx="1242648" cy="307777"/>
+          </a:xfrm>
+          <a:prstGeom prst="rect">
+            <a:avLst/>
+          </a:prstGeom>
+          <a:noFill/>
+        </p:spPr>
+        <p:txBody>
+          <a:bodyPr wrap="none" rtlCol="0">
+            <a:spAutoFit/>
+          </a:bodyPr>
+          <a:lstStyle/>
+          <a:p>
+            <a:r>
+              <a:rPr lang="zh-TW" altLang="en-US" sz="1400" dirty="0">
+                <a:solidFill>
+                  <a:schemeClr val="bg1"/>
+                </a:solidFill>
+                <a:latin typeface="源樣明體 SB" panose="02020600000000000000" pitchFamily="18" charset="-120"/>
+                <a:ea typeface="源樣明體 SB" panose="02020600000000000000" pitchFamily="18" charset="-120"/>
+              </a:rPr>
+              <a:t>守護家園 </a:t>
+            </a:r>
+            <a:r>
+              <a:rPr lang="en-US" altLang="zh-TW" sz="700" dirty="0">
+                <a:solidFill>
+                  <a:srgbClr val="FF0000"/>
+                </a:solidFill>
+                <a:latin typeface="源樣明體 SB" panose="02020600000000000000" pitchFamily="18" charset="-120"/>
+                <a:ea typeface="源樣明體 SB" panose="02020600000000000000" pitchFamily="18" charset="-120"/>
+              </a:rPr>
+              <a:t>…</a:t>
+            </a:r>
+            <a:r>
+              <a:rPr lang="zh-TW" altLang="en-US" sz="700" dirty="0">
+                <a:solidFill>
+                  <a:srgbClr val="FF0000"/>
+                </a:solidFill>
+                <a:latin typeface="源樣明體 SB" panose="02020600000000000000" pitchFamily="18" charset="-120"/>
+                <a:ea typeface="源樣明體 SB" panose="02020600000000000000" pitchFamily="18" charset="-120"/>
+              </a:rPr>
+              <a:t>嗎？</a:t>
+            </a:r>
+            <a:endParaRPr lang="en-US" sz="1400" dirty="0">
+              <a:solidFill>
+                <a:srgbClr val="FF0000"/>
+              </a:solidFill>
+              <a:latin typeface="源樣明體 SB" panose="02020600000000000000" pitchFamily="18" charset="-120"/>
+              <a:ea typeface="源樣明體 SB" panose="02020600000000000000" pitchFamily="18" charset="-120"/>
+            </a:endParaRPr>
+          </a:p>
+        </p:txBody>
+      </p:sp>
+    </p:spTree>
+    <p:extLst>
+      <p:ext uri="{BB962C8B-B14F-4D97-AF65-F5344CB8AC3E}">
+        <p14:creationId xmlns:p14="http://schemas.microsoft.com/office/powerpoint/2010/main" val="2323422564"/>
+      </p:ext>
+    </p:extLst>
+  </p:cSld>
+  <p:clrMapOvr>
+    <a:masterClrMapping/>
+  </p:clrMapOvr>
+</p:sld>
+</file>
+
+<file path=ppt/slides/slide3.xml><?xml version="1.0" encoding="utf-8"?>
+<p:sld xmlns:a="http://schemas.openxmlformats.org/drawingml/2006/main" xmlns:r="http://schemas.openxmlformats.org/officeDocument/2006/relationships" xmlns:p="http://schemas.openxmlformats.org/presentationml/2006/main">
+  <p:cSld>
+    <p:spTree>
+      <p:nvGrpSpPr>
+        <p:cNvPr id="1" name=""/>
+        <p:cNvGrpSpPr/>
+        <p:nvPr/>
+      </p:nvGrpSpPr>
+      <p:grpSpPr>
+        <a:xfrm>
+          <a:off x="0" y="0"/>
+          <a:ext cx="0" cy="0"/>
+          <a:chOff x="0" y="0"/>
+          <a:chExt cx="0" cy="0"/>
+        </a:xfrm>
+      </p:grpSpPr>
+      <p:pic>
+        <p:nvPicPr>
+          <p:cNvPr id="18" name="圖片 17">
+            <a:extLst>
+              <a:ext uri="{FF2B5EF4-FFF2-40B4-BE49-F238E27FC236}">
+                <a16:creationId xmlns:a16="http://schemas.microsoft.com/office/drawing/2014/main" id="{A013BD48-CAA2-15EB-AED9-6928E1CD76B3}"/>
+              </a:ext>
+            </a:extLst>
+          </p:cNvPr>
+          <p:cNvPicPr>
+            <a:picLocks noChangeAspect="1"/>
+          </p:cNvPicPr>
+          <p:nvPr/>
+        </p:nvPicPr>
+        <p:blipFill rotWithShape="1">
+          <a:blip r:embed="rId2">
+            <a:extLst>
+              <a:ext uri="{28A0092B-C50C-407E-A947-70E740481C1C}">
+                <a14:useLocalDpi xmlns:a14="http://schemas.microsoft.com/office/drawing/2010/main" val="0"/>
+              </a:ext>
+            </a:extLst>
+          </a:blip>
+          <a:srcRect r="50000" b="50000"/>
+          <a:stretch/>
+        </p:blipFill>
+        <p:spPr>
+          <a:xfrm>
+            <a:off x="3006684" y="435863"/>
+            <a:ext cx="5477423" cy="5477423"/>
+          </a:xfrm>
+          <a:prstGeom prst="rect">
+            <a:avLst/>
+          </a:prstGeom>
+        </p:spPr>
+      </p:pic>
+      <p:sp>
+        <p:nvSpPr>
+          <p:cNvPr id="2" name="文字方塊 1">
+            <a:extLst>
+              <a:ext uri="{FF2B5EF4-FFF2-40B4-BE49-F238E27FC236}">
+                <a16:creationId xmlns:a16="http://schemas.microsoft.com/office/drawing/2014/main" id="{933B2E1D-51C1-9AEE-1DBE-9465143978A2}"/>
+              </a:ext>
+            </a:extLst>
+          </p:cNvPr>
+          <p:cNvSpPr txBox="1"/>
+          <p:nvPr/>
+        </p:nvSpPr>
+        <p:spPr>
+          <a:xfrm>
+            <a:off x="3166352" y="1577447"/>
+            <a:ext cx="2068195" cy="1200329"/>
+          </a:xfrm>
+          <a:prstGeom prst="rect">
+            <a:avLst/>
+          </a:prstGeom>
+          <a:noFill/>
+        </p:spPr>
+        <p:txBody>
+          <a:bodyPr wrap="none" rtlCol="0">
+            <a:spAutoFit/>
+          </a:bodyPr>
+          <a:lstStyle/>
+          <a:p>
+            <a:r>
+              <a:rPr lang="zh-TW" altLang="en-US" sz="600" dirty="0">
+                <a:solidFill>
+                  <a:schemeClr val="bg1"/>
+                </a:solidFill>
+                <a:latin typeface="源樣明體 SB" panose="02020600000000000000" pitchFamily="18" charset="-120"/>
+                <a:ea typeface="源樣明體 SB" panose="02020600000000000000" pitchFamily="18" charset="-120"/>
+              </a:rPr>
+              <a:t>作者　施淙綸</a:t>
+            </a:r>
+            <a:endParaRPr lang="en-US" altLang="zh-TW" sz="600" dirty="0">
+              <a:solidFill>
+                <a:schemeClr val="bg1"/>
+              </a:solidFill>
+              <a:latin typeface="源樣明體 SB" panose="02020600000000000000" pitchFamily="18" charset="-120"/>
+              <a:ea typeface="源樣明體 SB" panose="02020600000000000000" pitchFamily="18" charset="-120"/>
+            </a:endParaRPr>
+          </a:p>
+          <a:p>
+            <a:endParaRPr lang="en-US" altLang="zh-TW" sz="600" dirty="0">
+              <a:solidFill>
+                <a:schemeClr val="bg1"/>
+              </a:solidFill>
+              <a:latin typeface="源樣明體 SB" panose="02020600000000000000" pitchFamily="18" charset="-120"/>
+              <a:ea typeface="源樣明體 SB" panose="02020600000000000000" pitchFamily="18" charset="-120"/>
+            </a:endParaRPr>
+          </a:p>
+          <a:p>
+            <a:endParaRPr lang="en-US" altLang="zh-TW" sz="600" dirty="0">
+              <a:solidFill>
+                <a:schemeClr val="bg1"/>
+              </a:solidFill>
+              <a:latin typeface="源樣明體 SB" panose="02020600000000000000" pitchFamily="18" charset="-120"/>
+              <a:ea typeface="源樣明體 SB" panose="02020600000000000000" pitchFamily="18" charset="-120"/>
+            </a:endParaRPr>
+          </a:p>
+          <a:p>
+            <a:endParaRPr lang="en-US" altLang="zh-TW" sz="600" dirty="0">
+              <a:solidFill>
+                <a:schemeClr val="bg1"/>
+              </a:solidFill>
+              <a:latin typeface="源樣明體 SB" panose="02020600000000000000" pitchFamily="18" charset="-120"/>
+              <a:ea typeface="源樣明體 SB" panose="02020600000000000000" pitchFamily="18" charset="-120"/>
+            </a:endParaRPr>
+          </a:p>
+          <a:p>
+            <a:r>
+              <a:rPr lang="en-US" altLang="zh-TW" sz="600" dirty="0">
+                <a:solidFill>
+                  <a:schemeClr val="bg1"/>
+                </a:solidFill>
+                <a:latin typeface="源樣明體 SB" panose="02020600000000000000" pitchFamily="18" charset="-120"/>
+                <a:ea typeface="源樣明體 SB" panose="02020600000000000000" pitchFamily="18" charset="-120"/>
+              </a:rPr>
+              <a:t>Final</a:t>
+            </a:r>
+            <a:r>
+              <a:rPr lang="zh-TW" altLang="en-US" sz="600" dirty="0">
+                <a:solidFill>
+                  <a:schemeClr val="bg1"/>
+                </a:solidFill>
+                <a:latin typeface="源樣明體 SB" panose="02020600000000000000" pitchFamily="18" charset="-120"/>
+                <a:ea typeface="源樣明體 SB" panose="02020600000000000000" pitchFamily="18" charset="-120"/>
+              </a:rPr>
+              <a:t> </a:t>
+            </a:r>
+            <a:r>
+              <a:rPr lang="en-US" altLang="zh-TW" sz="600" dirty="0">
+                <a:solidFill>
+                  <a:schemeClr val="bg1"/>
+                </a:solidFill>
+                <a:latin typeface="源樣明體 SB" panose="02020600000000000000" pitchFamily="18" charset="-120"/>
+                <a:ea typeface="源樣明體 SB" panose="02020600000000000000" pitchFamily="18" charset="-120"/>
+              </a:rPr>
+              <a:t>Project</a:t>
+            </a:r>
+            <a:r>
+              <a:rPr lang="zh-TW" altLang="en-US" sz="600" dirty="0">
+                <a:solidFill>
+                  <a:schemeClr val="bg1"/>
+                </a:solidFill>
+                <a:latin typeface="源樣明體 SB" panose="02020600000000000000" pitchFamily="18" charset="-120"/>
+                <a:ea typeface="源樣明體 SB" panose="02020600000000000000" pitchFamily="18" charset="-120"/>
+              </a:rPr>
+              <a:t> </a:t>
+            </a:r>
+            <a:r>
+              <a:rPr lang="en-US" altLang="zh-TW" sz="600" dirty="0">
+                <a:solidFill>
+                  <a:schemeClr val="bg1"/>
+                </a:solidFill>
+                <a:latin typeface="源樣明體 SB" panose="02020600000000000000" pitchFamily="18" charset="-120"/>
+                <a:ea typeface="源樣明體 SB" panose="02020600000000000000" pitchFamily="18" charset="-120"/>
+              </a:rPr>
+              <a:t>for Introduction to Programming (I)</a:t>
+            </a:r>
+          </a:p>
+          <a:p>
+            <a:endParaRPr lang="en-US" altLang="zh-TW" sz="600" dirty="0">
+              <a:solidFill>
+                <a:schemeClr val="bg1"/>
+              </a:solidFill>
+              <a:latin typeface="源樣明體 SB" panose="02020600000000000000" pitchFamily="18" charset="-120"/>
+              <a:ea typeface="源樣明體 SB" panose="02020600000000000000" pitchFamily="18" charset="-120"/>
+            </a:endParaRPr>
+          </a:p>
+          <a:p>
+            <a:endParaRPr lang="en-US" altLang="zh-TW" sz="600" dirty="0">
+              <a:solidFill>
+                <a:schemeClr val="bg1"/>
+              </a:solidFill>
+              <a:latin typeface="源樣明體 SB" panose="02020600000000000000" pitchFamily="18" charset="-120"/>
+              <a:ea typeface="源樣明體 SB" panose="02020600000000000000" pitchFamily="18" charset="-120"/>
+            </a:endParaRPr>
+          </a:p>
+          <a:p>
+            <a:endParaRPr lang="en-US" altLang="zh-TW" sz="600" dirty="0">
+              <a:solidFill>
+                <a:schemeClr val="bg1"/>
+              </a:solidFill>
+              <a:latin typeface="源樣明體 SB" panose="02020600000000000000" pitchFamily="18" charset="-120"/>
+              <a:ea typeface="源樣明體 SB" panose="02020600000000000000" pitchFamily="18" charset="-120"/>
+            </a:endParaRPr>
+          </a:p>
+          <a:p>
+            <a:r>
+              <a:rPr lang="zh-TW" altLang="en-US" sz="600" dirty="0">
+                <a:solidFill>
+                  <a:schemeClr val="bg1"/>
+                </a:solidFill>
+                <a:latin typeface="源樣明體 SB" panose="02020600000000000000" pitchFamily="18" charset="-120"/>
+                <a:ea typeface="源樣明體 SB" panose="02020600000000000000" pitchFamily="18" charset="-120"/>
+              </a:rPr>
+              <a:t>實作時間　戰鬥系統    </a:t>
+            </a:r>
+            <a:r>
+              <a:rPr lang="en-US" altLang="zh-TW" sz="600" dirty="0">
+                <a:solidFill>
+                  <a:schemeClr val="bg1"/>
+                </a:solidFill>
+                <a:latin typeface="源樣明體 SB" panose="02020600000000000000" pitchFamily="18" charset="-120"/>
+                <a:ea typeface="源樣明體 SB" panose="02020600000000000000" pitchFamily="18" charset="-120"/>
+              </a:rPr>
+              <a:t>16 </a:t>
+            </a:r>
+            <a:r>
+              <a:rPr lang="en-US" altLang="zh-TW" sz="600" dirty="0" err="1">
+                <a:solidFill>
+                  <a:schemeClr val="bg1"/>
+                </a:solidFill>
+                <a:latin typeface="源樣明體 SB" panose="02020600000000000000" pitchFamily="18" charset="-120"/>
+                <a:ea typeface="源樣明體 SB" panose="02020600000000000000" pitchFamily="18" charset="-120"/>
+              </a:rPr>
+              <a:t>hrs</a:t>
+            </a:r>
+            <a:endParaRPr lang="en-US" altLang="zh-TW" sz="600" dirty="0">
+              <a:solidFill>
+                <a:schemeClr val="bg1"/>
+              </a:solidFill>
+              <a:latin typeface="源樣明體 SB" panose="02020600000000000000" pitchFamily="18" charset="-120"/>
+              <a:ea typeface="源樣明體 SB" panose="02020600000000000000" pitchFamily="18" charset="-120"/>
+            </a:endParaRPr>
+          </a:p>
+          <a:p>
+            <a:r>
+              <a:rPr lang="zh-TW" altLang="en-US" sz="600" dirty="0">
+                <a:solidFill>
+                  <a:schemeClr val="bg1"/>
+                </a:solidFill>
+                <a:latin typeface="源樣明體 SB" panose="02020600000000000000" pitchFamily="18" charset="-120"/>
+                <a:ea typeface="源樣明體 SB" panose="02020600000000000000" pitchFamily="18" charset="-120"/>
+              </a:rPr>
+              <a:t>　　　　　產生地圖    </a:t>
+            </a:r>
+            <a:r>
+              <a:rPr lang="en-US" altLang="zh-TW" sz="600" dirty="0">
+                <a:solidFill>
+                  <a:schemeClr val="bg1"/>
+                </a:solidFill>
+                <a:latin typeface="源樣明體 SB" panose="02020600000000000000" pitchFamily="18" charset="-120"/>
+                <a:ea typeface="源樣明體 SB" panose="02020600000000000000" pitchFamily="18" charset="-120"/>
+              </a:rPr>
+              <a:t>1 </a:t>
+            </a:r>
+            <a:r>
+              <a:rPr lang="en-US" altLang="zh-TW" sz="600" dirty="0" err="1">
+                <a:solidFill>
+                  <a:schemeClr val="bg1"/>
+                </a:solidFill>
+                <a:latin typeface="源樣明體 SB" panose="02020600000000000000" pitchFamily="18" charset="-120"/>
+                <a:ea typeface="源樣明體 SB" panose="02020600000000000000" pitchFamily="18" charset="-120"/>
+              </a:rPr>
+              <a:t>hrs</a:t>
+            </a:r>
+            <a:endParaRPr lang="en-US" altLang="zh-TW" sz="600" dirty="0">
+              <a:solidFill>
+                <a:schemeClr val="bg1"/>
+              </a:solidFill>
+              <a:latin typeface="源樣明體 SB" panose="02020600000000000000" pitchFamily="18" charset="-120"/>
+              <a:ea typeface="源樣明體 SB" panose="02020600000000000000" pitchFamily="18" charset="-120"/>
+            </a:endParaRPr>
+          </a:p>
+          <a:p>
+            <a:r>
+              <a:rPr lang="zh-TW" altLang="en-US" sz="600" dirty="0">
+                <a:solidFill>
+                  <a:schemeClr val="bg1"/>
+                </a:solidFill>
+                <a:latin typeface="源樣明體 SB" panose="02020600000000000000" pitchFamily="18" charset="-120"/>
+                <a:ea typeface="源樣明體 SB" panose="02020600000000000000" pitchFamily="18" charset="-120"/>
+              </a:rPr>
+              <a:t>　　　　　</a:t>
+            </a:r>
+            <a:r>
+              <a:rPr lang="en-US" altLang="zh-TW" sz="600" dirty="0">
+                <a:solidFill>
+                  <a:schemeClr val="bg1"/>
+                </a:solidFill>
+                <a:latin typeface="源樣明體 SB" panose="02020600000000000000" pitchFamily="18" charset="-120"/>
+                <a:ea typeface="源樣明體 SB" panose="02020600000000000000" pitchFamily="18" charset="-120"/>
+              </a:rPr>
+              <a:t>QL</a:t>
+            </a:r>
+            <a:r>
+              <a:rPr lang="zh-TW" altLang="en-US" sz="600" dirty="0">
+                <a:solidFill>
+                  <a:schemeClr val="bg1"/>
+                </a:solidFill>
+                <a:latin typeface="源樣明體 SB" panose="02020600000000000000" pitchFamily="18" charset="-120"/>
+                <a:ea typeface="源樣明體 SB" panose="02020600000000000000" pitchFamily="18" charset="-120"/>
+              </a:rPr>
+              <a:t>              </a:t>
+            </a:r>
+            <a:r>
+              <a:rPr lang="en-US" altLang="zh-TW" sz="600" dirty="0">
+                <a:solidFill>
+                  <a:schemeClr val="bg1"/>
+                </a:solidFill>
+                <a:latin typeface="源樣明體 SB" panose="02020600000000000000" pitchFamily="18" charset="-120"/>
+                <a:ea typeface="源樣明體 SB" panose="02020600000000000000" pitchFamily="18" charset="-120"/>
+              </a:rPr>
+              <a:t>5 </a:t>
+            </a:r>
+            <a:r>
+              <a:rPr lang="en-US" altLang="zh-TW" sz="600" dirty="0" err="1">
+                <a:solidFill>
+                  <a:schemeClr val="bg1"/>
+                </a:solidFill>
+                <a:latin typeface="源樣明體 SB" panose="02020600000000000000" pitchFamily="18" charset="-120"/>
+                <a:ea typeface="源樣明體 SB" panose="02020600000000000000" pitchFamily="18" charset="-120"/>
+              </a:rPr>
+              <a:t>hrs</a:t>
+            </a:r>
+            <a:endParaRPr lang="en-US" altLang="zh-TW" sz="600" dirty="0">
+              <a:solidFill>
+                <a:schemeClr val="bg1"/>
+              </a:solidFill>
+              <a:latin typeface="源樣明體 SB" panose="02020600000000000000" pitchFamily="18" charset="-120"/>
+              <a:ea typeface="源樣明體 SB" panose="02020600000000000000" pitchFamily="18" charset="-120"/>
+            </a:endParaRPr>
+          </a:p>
+          <a:p>
+            <a:r>
+              <a:rPr lang="zh-TW" altLang="en-US" sz="600" dirty="0">
+                <a:solidFill>
+                  <a:schemeClr val="bg1"/>
+                </a:solidFill>
+                <a:latin typeface="源樣明體 SB" panose="02020600000000000000" pitchFamily="18" charset="-120"/>
+                <a:ea typeface="源樣明體 SB" panose="02020600000000000000" pitchFamily="18" charset="-120"/>
+              </a:rPr>
+              <a:t>　　　　　</a:t>
+            </a:r>
+            <a:r>
+              <a:rPr lang="en-US" altLang="zh-TW" sz="600" dirty="0">
+                <a:solidFill>
+                  <a:schemeClr val="bg1"/>
+                </a:solidFill>
+                <a:latin typeface="源樣明體 SB" panose="02020600000000000000" pitchFamily="18" charset="-120"/>
+                <a:ea typeface="源樣明體 SB" panose="02020600000000000000" pitchFamily="18" charset="-120"/>
+              </a:rPr>
+              <a:t>UI</a:t>
+            </a:r>
+            <a:r>
+              <a:rPr lang="zh-TW" altLang="en-US" sz="600" dirty="0">
+                <a:solidFill>
+                  <a:schemeClr val="bg1"/>
+                </a:solidFill>
+                <a:latin typeface="源樣明體 SB" panose="02020600000000000000" pitchFamily="18" charset="-120"/>
+                <a:ea typeface="源樣明體 SB" panose="02020600000000000000" pitchFamily="18" charset="-120"/>
+              </a:rPr>
+              <a:t>介面       </a:t>
+            </a:r>
+            <a:r>
+              <a:rPr lang="en-US" altLang="zh-TW" sz="600" dirty="0">
+                <a:solidFill>
+                  <a:schemeClr val="bg1"/>
+                </a:solidFill>
+                <a:latin typeface="源樣明體 SB" panose="02020600000000000000" pitchFamily="18" charset="-120"/>
+                <a:ea typeface="源樣明體 SB" panose="02020600000000000000" pitchFamily="18" charset="-120"/>
+              </a:rPr>
+              <a:t>10 </a:t>
+            </a:r>
+            <a:r>
+              <a:rPr lang="en-US" altLang="zh-TW" sz="600" dirty="0" err="1">
+                <a:solidFill>
+                  <a:schemeClr val="bg1"/>
+                </a:solidFill>
+                <a:latin typeface="源樣明體 SB" panose="02020600000000000000" pitchFamily="18" charset="-120"/>
+                <a:ea typeface="源樣明體 SB" panose="02020600000000000000" pitchFamily="18" charset="-120"/>
+              </a:rPr>
+              <a:t>hrs</a:t>
+            </a:r>
+            <a:endParaRPr lang="en-US" altLang="zh-TW" sz="600" dirty="0">
+              <a:solidFill>
+                <a:schemeClr val="bg1"/>
+              </a:solidFill>
+              <a:latin typeface="源樣明體 SB" panose="02020600000000000000" pitchFamily="18" charset="-120"/>
+              <a:ea typeface="源樣明體 SB" panose="02020600000000000000" pitchFamily="18" charset="-120"/>
+            </a:endParaRPr>
+          </a:p>
+        </p:txBody>
+      </p:sp>
+    </p:spTree>
+    <p:extLst>
+      <p:ext uri="{BB962C8B-B14F-4D97-AF65-F5344CB8AC3E}">
+        <p14:creationId xmlns:p14="http://schemas.microsoft.com/office/powerpoint/2010/main" val="2413621724"/>
+      </p:ext>
+    </p:extLst>
+  </p:cSld>
+  <p:clrMapOvr>
+    <a:masterClrMapping/>
+  </p:clrMapOvr>
+</p:sld>
+</file>
+
+<file path=ppt/slides/slide4.xml><?xml version="1.0" encoding="utf-8"?>
+<p:sld xmlns:a="http://schemas.openxmlformats.org/drawingml/2006/main" xmlns:r="http://schemas.openxmlformats.org/officeDocument/2006/relationships" xmlns:p="http://schemas.openxmlformats.org/presentationml/2006/main">
+  <p:cSld>
+    <p:spTree>
+      <p:nvGrpSpPr>
+        <p:cNvPr id="1" name=""/>
+        <p:cNvGrpSpPr/>
+        <p:nvPr/>
+      </p:nvGrpSpPr>
+      <p:grpSpPr>
+        <a:xfrm>
+          <a:off x="0" y="0"/>
+          <a:ext cx="0" cy="0"/>
+          <a:chOff x="0" y="0"/>
+          <a:chExt cx="0" cy="0"/>
+        </a:xfrm>
+      </p:grpSpPr>
+      <p:pic>
+        <p:nvPicPr>
+          <p:cNvPr id="18" name="圖片 17">
+            <a:extLst>
+              <a:ext uri="{FF2B5EF4-FFF2-40B4-BE49-F238E27FC236}">
+                <a16:creationId xmlns:a16="http://schemas.microsoft.com/office/drawing/2014/main" id="{A013BD48-CAA2-15EB-AED9-6928E1CD76B3}"/>
+              </a:ext>
+            </a:extLst>
+          </p:cNvPr>
+          <p:cNvPicPr>
+            <a:picLocks noChangeAspect="1"/>
+          </p:cNvPicPr>
+          <p:nvPr/>
+        </p:nvPicPr>
+        <p:blipFill rotWithShape="1">
+          <a:blip r:embed="rId2">
+            <a:extLst>
+              <a:ext uri="{28A0092B-C50C-407E-A947-70E740481C1C}">
+                <a14:useLocalDpi xmlns:a14="http://schemas.microsoft.com/office/drawing/2010/main" val="0"/>
+              </a:ext>
+            </a:extLst>
+          </a:blip>
+          <a:srcRect r="50000" b="50000"/>
+          <a:stretch/>
+        </p:blipFill>
+        <p:spPr>
+          <a:xfrm>
+            <a:off x="2911252" y="463803"/>
+            <a:ext cx="5477423" cy="5477423"/>
+          </a:xfrm>
+          <a:prstGeom prst="rect">
+            <a:avLst/>
+          </a:prstGeom>
+        </p:spPr>
+      </p:pic>
+      <p:sp>
+        <p:nvSpPr>
+          <p:cNvPr id="2" name="文字方塊 1">
+            <a:extLst>
+              <a:ext uri="{FF2B5EF4-FFF2-40B4-BE49-F238E27FC236}">
+                <a16:creationId xmlns:a16="http://schemas.microsoft.com/office/drawing/2014/main" id="{933B2E1D-51C1-9AEE-1DBE-9465143978A2}"/>
+              </a:ext>
+            </a:extLst>
+          </p:cNvPr>
+          <p:cNvSpPr txBox="1"/>
+          <p:nvPr/>
+        </p:nvSpPr>
+        <p:spPr>
+          <a:xfrm>
+            <a:off x="3730247" y="2382786"/>
+            <a:ext cx="1034257" cy="246221"/>
+          </a:xfrm>
+          <a:prstGeom prst="rect">
+            <a:avLst/>
+          </a:prstGeom>
+          <a:noFill/>
+        </p:spPr>
+        <p:txBody>
+          <a:bodyPr wrap="none" rtlCol="0">
+            <a:spAutoFit/>
+          </a:bodyPr>
+          <a:lstStyle/>
+          <a:p>
+            <a:r>
+              <a:rPr lang="en-US" altLang="zh-TW" sz="1000" dirty="0">
+                <a:solidFill>
+                  <a:schemeClr val="bg1"/>
+                </a:solidFill>
+                <a:latin typeface="源樣明體 SB" panose="02020600000000000000" pitchFamily="18" charset="-120"/>
+                <a:ea typeface="源樣明體 SB" panose="02020600000000000000" pitchFamily="18" charset="-120"/>
+              </a:rPr>
+              <a:t>BOSS</a:t>
+            </a:r>
+            <a:r>
+              <a:rPr lang="zh-TW" altLang="en-US" sz="1000" dirty="0">
+                <a:solidFill>
+                  <a:schemeClr val="bg1"/>
+                </a:solidFill>
+                <a:latin typeface="源樣明體 SB" panose="02020600000000000000" pitchFamily="18" charset="-120"/>
+                <a:ea typeface="源樣明體 SB" panose="02020600000000000000" pitchFamily="18" charset="-120"/>
+              </a:rPr>
+              <a:t>移動模式</a:t>
+            </a:r>
+            <a:endParaRPr lang="en-US" altLang="zh-TW" sz="1000" dirty="0">
+              <a:solidFill>
+                <a:schemeClr val="bg1"/>
+              </a:solidFill>
+              <a:latin typeface="源樣明體 SB" panose="02020600000000000000" pitchFamily="18" charset="-120"/>
+              <a:ea typeface="源樣明體 SB" panose="02020600000000000000" pitchFamily="18" charset="-120"/>
+            </a:endParaRPr>
+          </a:p>
+        </p:txBody>
+      </p:sp>
+      <p:sp>
+        <p:nvSpPr>
+          <p:cNvPr id="6" name="文字方塊 5">
+            <a:extLst>
+              <a:ext uri="{FF2B5EF4-FFF2-40B4-BE49-F238E27FC236}">
+                <a16:creationId xmlns:a16="http://schemas.microsoft.com/office/drawing/2014/main" id="{54555AD8-580E-222D-600B-1EB8C7580BC1}"/>
+              </a:ext>
+            </a:extLst>
+          </p:cNvPr>
+          <p:cNvSpPr txBox="1"/>
+          <p:nvPr/>
+        </p:nvSpPr>
+        <p:spPr>
+          <a:xfrm>
+            <a:off x="5525504" y="2275064"/>
+            <a:ext cx="389850" cy="215444"/>
+          </a:xfrm>
+          <a:prstGeom prst="rect">
+            <a:avLst/>
+          </a:prstGeom>
+          <a:noFill/>
+        </p:spPr>
+        <p:txBody>
+          <a:bodyPr wrap="none" rtlCol="0">
+            <a:spAutoFit/>
+          </a:bodyPr>
+          <a:lstStyle/>
+          <a:p>
+            <a:r>
+              <a:rPr lang="zh-TW" altLang="en-US" sz="800" dirty="0">
+                <a:solidFill>
+                  <a:schemeClr val="bg1"/>
+                </a:solidFill>
+                <a:latin typeface="源樣明體 SB" panose="02020600000000000000" pitchFamily="18" charset="-120"/>
+                <a:ea typeface="源樣明體 SB" panose="02020600000000000000" pitchFamily="18" charset="-120"/>
+              </a:rPr>
+              <a:t>開啟</a:t>
+            </a:r>
+            <a:endParaRPr lang="en-US" altLang="zh-TW" sz="800" dirty="0">
+              <a:solidFill>
+                <a:schemeClr val="bg1"/>
+              </a:solidFill>
+              <a:latin typeface="源樣明體 SB" panose="02020600000000000000" pitchFamily="18" charset="-120"/>
+              <a:ea typeface="源樣明體 SB" panose="02020600000000000000" pitchFamily="18" charset="-120"/>
+            </a:endParaRPr>
+          </a:p>
+        </p:txBody>
+      </p:sp>
+      <p:sp>
+        <p:nvSpPr>
+          <p:cNvPr id="7" name="文字方塊 6">
+            <a:extLst>
+              <a:ext uri="{FF2B5EF4-FFF2-40B4-BE49-F238E27FC236}">
+                <a16:creationId xmlns:a16="http://schemas.microsoft.com/office/drawing/2014/main" id="{9808E18D-4456-CF7C-F6D3-EF48B593CEEC}"/>
+              </a:ext>
+            </a:extLst>
+          </p:cNvPr>
+          <p:cNvSpPr txBox="1"/>
+          <p:nvPr/>
+        </p:nvSpPr>
+        <p:spPr>
+          <a:xfrm>
+            <a:off x="5929458" y="2245840"/>
+            <a:ext cx="389850" cy="215444"/>
+          </a:xfrm>
+          <a:prstGeom prst="rect">
+            <a:avLst/>
+          </a:prstGeom>
+          <a:noFill/>
+        </p:spPr>
+        <p:txBody>
+          <a:bodyPr wrap="none" rtlCol="0">
+            <a:spAutoFit/>
+          </a:bodyPr>
+          <a:lstStyle/>
+          <a:p>
+            <a:r>
+              <a:rPr lang="zh-TW" altLang="en-US" sz="800" dirty="0">
+                <a:solidFill>
+                  <a:schemeClr val="bg1"/>
+                </a:solidFill>
+                <a:latin typeface="源樣明體 SB" panose="02020600000000000000" pitchFamily="18" charset="-120"/>
+                <a:ea typeface="源樣明體 SB" panose="02020600000000000000" pitchFamily="18" charset="-120"/>
+              </a:rPr>
+              <a:t>關閉</a:t>
+            </a:r>
+            <a:endParaRPr lang="en-US" altLang="zh-TW" sz="800" dirty="0">
+              <a:solidFill>
+                <a:schemeClr val="bg1"/>
+              </a:solidFill>
+              <a:latin typeface="源樣明體 SB" panose="02020600000000000000" pitchFamily="18" charset="-120"/>
+              <a:ea typeface="源樣明體 SB" panose="02020600000000000000" pitchFamily="18" charset="-120"/>
+            </a:endParaRPr>
+          </a:p>
+        </p:txBody>
+      </p:sp>
+      <p:sp>
+        <p:nvSpPr>
+          <p:cNvPr id="8" name="文字方塊 7">
+            <a:extLst>
+              <a:ext uri="{FF2B5EF4-FFF2-40B4-BE49-F238E27FC236}">
+                <a16:creationId xmlns:a16="http://schemas.microsoft.com/office/drawing/2014/main" id="{B6A6D39D-3501-38CA-EE99-BB87FE9081BC}"/>
+              </a:ext>
+            </a:extLst>
+          </p:cNvPr>
+          <p:cNvSpPr txBox="1"/>
+          <p:nvPr/>
+        </p:nvSpPr>
+        <p:spPr>
+          <a:xfrm>
+            <a:off x="5929458" y="2525292"/>
+            <a:ext cx="389850" cy="215444"/>
+          </a:xfrm>
+          <a:prstGeom prst="rect">
+            <a:avLst/>
+          </a:prstGeom>
+          <a:noFill/>
+        </p:spPr>
+        <p:txBody>
+          <a:bodyPr wrap="none" rtlCol="0">
+            <a:spAutoFit/>
+          </a:bodyPr>
+          <a:lstStyle/>
+          <a:p>
+            <a:r>
+              <a:rPr lang="zh-TW" altLang="en-US" sz="800" dirty="0">
+                <a:solidFill>
+                  <a:srgbClr val="FFC000"/>
+                </a:solidFill>
+                <a:latin typeface="源樣明體 SB" panose="02020600000000000000" pitchFamily="18" charset="-120"/>
+                <a:ea typeface="源樣明體 SB" panose="02020600000000000000" pitchFamily="18" charset="-120"/>
+              </a:rPr>
+              <a:t>關閉</a:t>
+            </a:r>
+            <a:endParaRPr lang="en-US" altLang="zh-TW" sz="800" dirty="0">
+              <a:solidFill>
+                <a:srgbClr val="FFC000"/>
+              </a:solidFill>
+              <a:latin typeface="源樣明體 SB" panose="02020600000000000000" pitchFamily="18" charset="-120"/>
+              <a:ea typeface="源樣明體 SB" panose="02020600000000000000" pitchFamily="18" charset="-120"/>
+            </a:endParaRPr>
+          </a:p>
+        </p:txBody>
+      </p:sp>
+      <p:sp>
+        <p:nvSpPr>
+          <p:cNvPr id="9" name="文字方塊 8">
+            <a:extLst>
+              <a:ext uri="{FF2B5EF4-FFF2-40B4-BE49-F238E27FC236}">
+                <a16:creationId xmlns:a16="http://schemas.microsoft.com/office/drawing/2014/main" id="{572F548F-649C-25DD-3569-C0EEAA18F975}"/>
+              </a:ext>
+            </a:extLst>
+          </p:cNvPr>
+          <p:cNvSpPr txBox="1"/>
+          <p:nvPr/>
+        </p:nvSpPr>
+        <p:spPr>
+          <a:xfrm>
+            <a:off x="5525504" y="2525292"/>
+            <a:ext cx="389850" cy="215444"/>
+          </a:xfrm>
+          <a:prstGeom prst="rect">
+            <a:avLst/>
+          </a:prstGeom>
+          <a:noFill/>
+        </p:spPr>
+        <p:txBody>
+          <a:bodyPr wrap="none" rtlCol="0">
+            <a:spAutoFit/>
+          </a:bodyPr>
+          <a:lstStyle/>
+          <a:p>
+            <a:r>
+              <a:rPr lang="zh-TW" altLang="en-US" sz="800" dirty="0">
+                <a:solidFill>
+                  <a:srgbClr val="FFC000"/>
+                </a:solidFill>
+                <a:latin typeface="源樣明體 SB" panose="02020600000000000000" pitchFamily="18" charset="-120"/>
+                <a:ea typeface="源樣明體 SB" panose="02020600000000000000" pitchFamily="18" charset="-120"/>
+              </a:rPr>
+              <a:t>開啟</a:t>
+            </a:r>
+            <a:endParaRPr lang="en-US" altLang="zh-TW" sz="800" dirty="0">
+              <a:solidFill>
+                <a:srgbClr val="FFC000"/>
+              </a:solidFill>
+              <a:latin typeface="源樣明體 SB" panose="02020600000000000000" pitchFamily="18" charset="-120"/>
+              <a:ea typeface="源樣明體 SB" panose="02020600000000000000" pitchFamily="18" charset="-120"/>
+            </a:endParaRPr>
+          </a:p>
+        </p:txBody>
+      </p:sp>
+      <p:sp>
+        <p:nvSpPr>
+          <p:cNvPr id="10" name="文字方塊 9">
+            <a:extLst>
+              <a:ext uri="{FF2B5EF4-FFF2-40B4-BE49-F238E27FC236}">
+                <a16:creationId xmlns:a16="http://schemas.microsoft.com/office/drawing/2014/main" id="{6D550604-2A6E-2778-BC7B-B7824BFAAA8D}"/>
+              </a:ext>
+            </a:extLst>
+          </p:cNvPr>
+          <p:cNvSpPr txBox="1"/>
+          <p:nvPr/>
+        </p:nvSpPr>
+        <p:spPr>
+          <a:xfrm>
+            <a:off x="4433964" y="2797528"/>
+            <a:ext cx="330540" cy="215444"/>
+          </a:xfrm>
+          <a:prstGeom prst="rect">
+            <a:avLst/>
+          </a:prstGeom>
+          <a:noFill/>
+        </p:spPr>
+        <p:txBody>
+          <a:bodyPr wrap="none" rtlCol="0">
+            <a:spAutoFit/>
+          </a:bodyPr>
+          <a:lstStyle/>
+          <a:p>
+            <a:r>
+              <a:rPr lang="en-US" altLang="zh-TW" sz="800" dirty="0">
+                <a:solidFill>
+                  <a:schemeClr val="bg1"/>
+                </a:solidFill>
+                <a:latin typeface="源樣明體 SB" panose="02020600000000000000" pitchFamily="18" charset="-120"/>
+                <a:ea typeface="源樣明體 SB" panose="02020600000000000000" pitchFamily="18" charset="-120"/>
+              </a:rPr>
+              <a:t>QL</a:t>
+            </a:r>
+          </a:p>
+        </p:txBody>
+      </p:sp>
+      <p:sp>
+        <p:nvSpPr>
+          <p:cNvPr id="11" name="文字方塊 10">
+            <a:extLst>
+              <a:ext uri="{FF2B5EF4-FFF2-40B4-BE49-F238E27FC236}">
+                <a16:creationId xmlns:a16="http://schemas.microsoft.com/office/drawing/2014/main" id="{7EFBD994-14AD-6DAB-FE89-F3945DABDA2E}"/>
+              </a:ext>
+            </a:extLst>
+          </p:cNvPr>
+          <p:cNvSpPr txBox="1"/>
+          <p:nvPr/>
+        </p:nvSpPr>
+        <p:spPr>
+          <a:xfrm>
+            <a:off x="3702444" y="2797528"/>
+            <a:ext cx="681597" cy="215444"/>
+          </a:xfrm>
+          <a:prstGeom prst="rect">
+            <a:avLst/>
+          </a:prstGeom>
+          <a:noFill/>
+        </p:spPr>
+        <p:txBody>
+          <a:bodyPr wrap="none" rtlCol="0">
+            <a:spAutoFit/>
+          </a:bodyPr>
+          <a:lstStyle/>
+          <a:p>
+            <a:r>
+              <a:rPr lang="en-US" altLang="zh-TW" sz="800" dirty="0">
+                <a:solidFill>
+                  <a:schemeClr val="bg1"/>
+                </a:solidFill>
+                <a:latin typeface="源樣明體 SB" panose="02020600000000000000" pitchFamily="18" charset="-120"/>
+                <a:ea typeface="源樣明體 SB" panose="02020600000000000000" pitchFamily="18" charset="-120"/>
+              </a:rPr>
+              <a:t>RANDOM</a:t>
+            </a:r>
+          </a:p>
+        </p:txBody>
+      </p:sp>
+      <p:sp>
+        <p:nvSpPr>
+          <p:cNvPr id="12" name="文字方塊 11">
+            <a:extLst>
+              <a:ext uri="{FF2B5EF4-FFF2-40B4-BE49-F238E27FC236}">
+                <a16:creationId xmlns:a16="http://schemas.microsoft.com/office/drawing/2014/main" id="{33783F64-0F3A-9DB6-AD5D-DD0909C86B4D}"/>
+              </a:ext>
+            </a:extLst>
+          </p:cNvPr>
+          <p:cNvSpPr txBox="1"/>
+          <p:nvPr/>
+        </p:nvSpPr>
+        <p:spPr>
+          <a:xfrm>
+            <a:off x="3702443" y="3073771"/>
+            <a:ext cx="681597" cy="215444"/>
+          </a:xfrm>
+          <a:prstGeom prst="rect">
+            <a:avLst/>
+          </a:prstGeom>
+          <a:noFill/>
+        </p:spPr>
+        <p:txBody>
+          <a:bodyPr wrap="none" rtlCol="0">
+            <a:spAutoFit/>
+          </a:bodyPr>
+          <a:lstStyle/>
+          <a:p>
+            <a:r>
+              <a:rPr lang="en-US" altLang="zh-TW" sz="800" dirty="0">
+                <a:solidFill>
+                  <a:srgbClr val="FFC000"/>
+                </a:solidFill>
+                <a:latin typeface="源樣明體 SB" panose="02020600000000000000" pitchFamily="18" charset="-120"/>
+                <a:ea typeface="源樣明體 SB" panose="02020600000000000000" pitchFamily="18" charset="-120"/>
+              </a:rPr>
+              <a:t>RANDOM</a:t>
+            </a:r>
+          </a:p>
+        </p:txBody>
+      </p:sp>
+      <p:sp>
+        <p:nvSpPr>
+          <p:cNvPr id="13" name="文字方塊 12">
+            <a:extLst>
+              <a:ext uri="{FF2B5EF4-FFF2-40B4-BE49-F238E27FC236}">
+                <a16:creationId xmlns:a16="http://schemas.microsoft.com/office/drawing/2014/main" id="{7D27D6D1-5B36-BA38-EC2F-0D0060AF6F1B}"/>
+              </a:ext>
+            </a:extLst>
+          </p:cNvPr>
+          <p:cNvSpPr txBox="1"/>
+          <p:nvPr/>
+        </p:nvSpPr>
+        <p:spPr>
+          <a:xfrm>
+            <a:off x="4433964" y="3073771"/>
+            <a:ext cx="330540" cy="215444"/>
+          </a:xfrm>
+          <a:prstGeom prst="rect">
+            <a:avLst/>
+          </a:prstGeom>
+          <a:noFill/>
+        </p:spPr>
+        <p:txBody>
+          <a:bodyPr wrap="none" rtlCol="0">
+            <a:spAutoFit/>
+          </a:bodyPr>
+          <a:lstStyle/>
+          <a:p>
+            <a:r>
+              <a:rPr lang="en-US" altLang="zh-TW" sz="800" dirty="0">
+                <a:solidFill>
+                  <a:srgbClr val="FFC000"/>
+                </a:solidFill>
+                <a:latin typeface="源樣明體 SB" panose="02020600000000000000" pitchFamily="18" charset="-120"/>
+                <a:ea typeface="源樣明體 SB" panose="02020600000000000000" pitchFamily="18" charset="-120"/>
+              </a:rPr>
+              <a:t>QL</a:t>
+            </a:r>
+          </a:p>
+        </p:txBody>
+      </p:sp>
+    </p:spTree>
+    <p:extLst>
+      <p:ext uri="{BB962C8B-B14F-4D97-AF65-F5344CB8AC3E}">
+        <p14:creationId xmlns:p14="http://schemas.microsoft.com/office/powerpoint/2010/main" val="2858001210"/>
+      </p:ext>
+    </p:extLst>
+  </p:cSld>
+  <p:clrMapOvr>
+    <a:masterClrMapping/>
+  </p:clrMapOvr>
+</p:sld>
+</file>
+
+<file path=ppt/slides/slide5.xml><?xml version="1.0" encoding="utf-8"?>
+<p:sld xmlns:a="http://schemas.openxmlformats.org/drawingml/2006/main" xmlns:r="http://schemas.openxmlformats.org/officeDocument/2006/relationships" xmlns:p="http://schemas.openxmlformats.org/presentationml/2006/main">
+  <p:cSld>
+    <p:spTree>
+      <p:nvGrpSpPr>
+        <p:cNvPr id="1" name=""/>
+        <p:cNvGrpSpPr/>
+        <p:nvPr/>
+      </p:nvGrpSpPr>
+      <p:grpSpPr>
+        <a:xfrm>
+          <a:off x="0" y="0"/>
+          <a:ext cx="0" cy="0"/>
+          <a:chOff x="0" y="0"/>
+          <a:chExt cx="0" cy="0"/>
+        </a:xfrm>
+      </p:grpSpPr>
+      <p:pic>
+        <p:nvPicPr>
+          <p:cNvPr id="18" name="圖片 17">
+            <a:extLst>
+              <a:ext uri="{FF2B5EF4-FFF2-40B4-BE49-F238E27FC236}">
+                <a16:creationId xmlns:a16="http://schemas.microsoft.com/office/drawing/2014/main" id="{A013BD48-CAA2-15EB-AED9-6928E1CD76B3}"/>
+              </a:ext>
+            </a:extLst>
+          </p:cNvPr>
+          <p:cNvPicPr>
+            <a:picLocks noChangeAspect="1"/>
+          </p:cNvPicPr>
+          <p:nvPr/>
+        </p:nvPicPr>
+        <p:blipFill rotWithShape="1">
+          <a:blip r:embed="rId2">
+            <a:extLst>
+              <a:ext uri="{28A0092B-C50C-407E-A947-70E740481C1C}">
+                <a14:useLocalDpi xmlns:a14="http://schemas.microsoft.com/office/drawing/2010/main" val="0"/>
+              </a:ext>
+            </a:extLst>
+          </a:blip>
+          <a:srcRect r="50000" b="50000"/>
+          <a:stretch/>
+        </p:blipFill>
+        <p:spPr>
+          <a:xfrm>
+            <a:off x="2911252" y="463803"/>
+            <a:ext cx="5477423" cy="5477423"/>
+          </a:xfrm>
+          <a:prstGeom prst="rect">
+            <a:avLst/>
+          </a:prstGeom>
+        </p:spPr>
+      </p:pic>
+      <p:sp>
+        <p:nvSpPr>
+          <p:cNvPr id="2" name="文字方塊 1">
+            <a:extLst>
+              <a:ext uri="{FF2B5EF4-FFF2-40B4-BE49-F238E27FC236}">
+                <a16:creationId xmlns:a16="http://schemas.microsoft.com/office/drawing/2014/main" id="{933B2E1D-51C1-9AEE-1DBE-9465143978A2}"/>
+              </a:ext>
+            </a:extLst>
+          </p:cNvPr>
+          <p:cNvSpPr txBox="1"/>
+          <p:nvPr/>
+        </p:nvSpPr>
+        <p:spPr>
+          <a:xfrm>
+            <a:off x="3938612" y="1645676"/>
+            <a:ext cx="441146" cy="246221"/>
+          </a:xfrm>
+          <a:prstGeom prst="rect">
+            <a:avLst/>
+          </a:prstGeom>
+          <a:noFill/>
+        </p:spPr>
+        <p:txBody>
+          <a:bodyPr wrap="none" rtlCol="0">
+            <a:spAutoFit/>
+          </a:bodyPr>
+          <a:lstStyle/>
+          <a:p>
+            <a:r>
+              <a:rPr lang="zh-TW" altLang="en-US" sz="1000" dirty="0">
+                <a:solidFill>
+                  <a:schemeClr val="bg1"/>
+                </a:solidFill>
+                <a:latin typeface="源樣明體 SB" panose="02020600000000000000" pitchFamily="18" charset="-120"/>
+                <a:ea typeface="源樣明體 SB" panose="02020600000000000000" pitchFamily="18" charset="-120"/>
+              </a:rPr>
+              <a:t>設定</a:t>
+            </a:r>
+            <a:endParaRPr lang="en-US" altLang="zh-TW" sz="1000" dirty="0">
+              <a:solidFill>
+                <a:schemeClr val="bg1"/>
+              </a:solidFill>
+              <a:latin typeface="源樣明體 SB" panose="02020600000000000000" pitchFamily="18" charset="-120"/>
+              <a:ea typeface="源樣明體 SB" panose="02020600000000000000" pitchFamily="18" charset="-120"/>
+            </a:endParaRPr>
+          </a:p>
+        </p:txBody>
+      </p:sp>
+      <p:sp>
+        <p:nvSpPr>
+          <p:cNvPr id="14" name="文字方塊 13">
+            <a:extLst>
+              <a:ext uri="{FF2B5EF4-FFF2-40B4-BE49-F238E27FC236}">
+                <a16:creationId xmlns:a16="http://schemas.microsoft.com/office/drawing/2014/main" id="{A1AF72F9-A0F8-2154-908A-FB4EED6DF094}"/>
+              </a:ext>
+            </a:extLst>
+          </p:cNvPr>
+          <p:cNvSpPr txBox="1"/>
+          <p:nvPr/>
+        </p:nvSpPr>
+        <p:spPr>
+          <a:xfrm>
+            <a:off x="3333294" y="1645676"/>
+            <a:ext cx="441146" cy="246221"/>
+          </a:xfrm>
+          <a:prstGeom prst="rect">
+            <a:avLst/>
+          </a:prstGeom>
+          <a:noFill/>
+        </p:spPr>
+        <p:txBody>
+          <a:bodyPr wrap="none" rtlCol="0">
+            <a:spAutoFit/>
+          </a:bodyPr>
+          <a:lstStyle/>
+          <a:p>
+            <a:r>
+              <a:rPr lang="zh-TW" altLang="en-US" sz="1000" dirty="0">
+                <a:solidFill>
+                  <a:schemeClr val="bg1"/>
+                </a:solidFill>
+                <a:latin typeface="源樣明體 SB" panose="02020600000000000000" pitchFamily="18" charset="-120"/>
+                <a:ea typeface="源樣明體 SB" panose="02020600000000000000" pitchFamily="18" charset="-120"/>
+              </a:rPr>
+              <a:t>繼續</a:t>
+            </a:r>
+            <a:endParaRPr lang="en-US" altLang="zh-TW" sz="1000" dirty="0">
+              <a:solidFill>
+                <a:schemeClr val="bg1"/>
+              </a:solidFill>
+              <a:latin typeface="源樣明體 SB" panose="02020600000000000000" pitchFamily="18" charset="-120"/>
+              <a:ea typeface="源樣明體 SB" panose="02020600000000000000" pitchFamily="18" charset="-120"/>
+            </a:endParaRPr>
+          </a:p>
+        </p:txBody>
+      </p:sp>
+      <p:sp>
+        <p:nvSpPr>
+          <p:cNvPr id="15" name="文字方塊 14">
+            <a:extLst>
+              <a:ext uri="{FF2B5EF4-FFF2-40B4-BE49-F238E27FC236}">
+                <a16:creationId xmlns:a16="http://schemas.microsoft.com/office/drawing/2014/main" id="{48E2AB45-4969-4C7D-EECC-35AF4F09C503}"/>
+              </a:ext>
+            </a:extLst>
+          </p:cNvPr>
+          <p:cNvSpPr txBox="1"/>
+          <p:nvPr/>
+        </p:nvSpPr>
+        <p:spPr>
+          <a:xfrm>
+            <a:off x="4543931" y="1645677"/>
+            <a:ext cx="441146" cy="246221"/>
+          </a:xfrm>
+          <a:prstGeom prst="rect">
+            <a:avLst/>
+          </a:prstGeom>
+          <a:noFill/>
+        </p:spPr>
+        <p:txBody>
+          <a:bodyPr wrap="none" rtlCol="0">
+            <a:spAutoFit/>
+          </a:bodyPr>
+          <a:lstStyle/>
+          <a:p>
+            <a:r>
+              <a:rPr lang="zh-TW" altLang="en-US" sz="1000" dirty="0">
+                <a:solidFill>
+                  <a:schemeClr val="bg1"/>
+                </a:solidFill>
+                <a:latin typeface="源樣明體 SB" panose="02020600000000000000" pitchFamily="18" charset="-120"/>
+                <a:ea typeface="源樣明體 SB" panose="02020600000000000000" pitchFamily="18" charset="-120"/>
+              </a:rPr>
+              <a:t>退出</a:t>
+            </a:r>
+            <a:endParaRPr lang="en-US" altLang="zh-TW" sz="1000" dirty="0">
+              <a:solidFill>
+                <a:schemeClr val="bg1"/>
+              </a:solidFill>
+              <a:latin typeface="源樣明體 SB" panose="02020600000000000000" pitchFamily="18" charset="-120"/>
+              <a:ea typeface="源樣明體 SB" panose="02020600000000000000" pitchFamily="18" charset="-120"/>
+            </a:endParaRPr>
+          </a:p>
+        </p:txBody>
+      </p:sp>
+      <p:sp>
+        <p:nvSpPr>
+          <p:cNvPr id="16" name="文字方塊 15">
+            <a:extLst>
+              <a:ext uri="{FF2B5EF4-FFF2-40B4-BE49-F238E27FC236}">
+                <a16:creationId xmlns:a16="http://schemas.microsoft.com/office/drawing/2014/main" id="{EF7A6862-D62C-A7FA-62F5-3D1CFA5DA5FF}"/>
+              </a:ext>
+            </a:extLst>
+          </p:cNvPr>
+          <p:cNvSpPr txBox="1"/>
+          <p:nvPr/>
+        </p:nvSpPr>
+        <p:spPr>
+          <a:xfrm>
+            <a:off x="3938612" y="2011436"/>
+            <a:ext cx="441146" cy="246221"/>
+          </a:xfrm>
+          <a:prstGeom prst="rect">
+            <a:avLst/>
+          </a:prstGeom>
+          <a:noFill/>
+        </p:spPr>
+        <p:txBody>
+          <a:bodyPr wrap="none" rtlCol="0">
+            <a:spAutoFit/>
+          </a:bodyPr>
+          <a:lstStyle/>
+          <a:p>
+            <a:r>
+              <a:rPr lang="zh-TW" altLang="en-US" sz="1000" dirty="0">
+                <a:solidFill>
+                  <a:srgbClr val="FFC000"/>
+                </a:solidFill>
+                <a:latin typeface="源樣明體 SB" panose="02020600000000000000" pitchFamily="18" charset="-120"/>
+                <a:ea typeface="源樣明體 SB" panose="02020600000000000000" pitchFamily="18" charset="-120"/>
+              </a:rPr>
+              <a:t>設定</a:t>
+            </a:r>
+            <a:endParaRPr lang="en-US" altLang="zh-TW" sz="1000" dirty="0">
+              <a:solidFill>
+                <a:srgbClr val="FFC000"/>
+              </a:solidFill>
+              <a:latin typeface="源樣明體 SB" panose="02020600000000000000" pitchFamily="18" charset="-120"/>
+              <a:ea typeface="源樣明體 SB" panose="02020600000000000000" pitchFamily="18" charset="-120"/>
+            </a:endParaRPr>
+          </a:p>
+        </p:txBody>
+      </p:sp>
+      <p:sp>
+        <p:nvSpPr>
+          <p:cNvPr id="17" name="文字方塊 16">
+            <a:extLst>
+              <a:ext uri="{FF2B5EF4-FFF2-40B4-BE49-F238E27FC236}">
+                <a16:creationId xmlns:a16="http://schemas.microsoft.com/office/drawing/2014/main" id="{AD38DDB2-CB6B-1A60-9981-A85C01ED7E3D}"/>
+              </a:ext>
+            </a:extLst>
+          </p:cNvPr>
+          <p:cNvSpPr txBox="1"/>
+          <p:nvPr/>
+        </p:nvSpPr>
+        <p:spPr>
+          <a:xfrm>
+            <a:off x="3333294" y="2011436"/>
+            <a:ext cx="441146" cy="246221"/>
+          </a:xfrm>
+          <a:prstGeom prst="rect">
+            <a:avLst/>
+          </a:prstGeom>
+          <a:noFill/>
+        </p:spPr>
+        <p:txBody>
+          <a:bodyPr wrap="none" rtlCol="0">
+            <a:spAutoFit/>
+          </a:bodyPr>
+          <a:lstStyle/>
+          <a:p>
+            <a:r>
+              <a:rPr lang="zh-TW" altLang="en-US" sz="1000" dirty="0">
+                <a:solidFill>
+                  <a:srgbClr val="FFC000"/>
+                </a:solidFill>
+                <a:latin typeface="源樣明體 SB" panose="02020600000000000000" pitchFamily="18" charset="-120"/>
+                <a:ea typeface="源樣明體 SB" panose="02020600000000000000" pitchFamily="18" charset="-120"/>
+              </a:rPr>
+              <a:t>繼續</a:t>
+            </a:r>
+            <a:endParaRPr lang="en-US" altLang="zh-TW" sz="1000" dirty="0">
+              <a:solidFill>
+                <a:srgbClr val="FFC000"/>
+              </a:solidFill>
+              <a:latin typeface="源樣明體 SB" panose="02020600000000000000" pitchFamily="18" charset="-120"/>
+              <a:ea typeface="源樣明體 SB" panose="02020600000000000000" pitchFamily="18" charset="-120"/>
+            </a:endParaRPr>
+          </a:p>
+        </p:txBody>
+      </p:sp>
+      <p:sp>
+        <p:nvSpPr>
+          <p:cNvPr id="19" name="文字方塊 18">
+            <a:extLst>
+              <a:ext uri="{FF2B5EF4-FFF2-40B4-BE49-F238E27FC236}">
+                <a16:creationId xmlns:a16="http://schemas.microsoft.com/office/drawing/2014/main" id="{444DFBFF-8F7F-B66A-B27C-F1A9726BFA7E}"/>
+              </a:ext>
+            </a:extLst>
+          </p:cNvPr>
+          <p:cNvSpPr txBox="1"/>
+          <p:nvPr/>
+        </p:nvSpPr>
+        <p:spPr>
+          <a:xfrm>
+            <a:off x="4543931" y="2011437"/>
+            <a:ext cx="441146" cy="246221"/>
+          </a:xfrm>
+          <a:prstGeom prst="rect">
+            <a:avLst/>
+          </a:prstGeom>
+          <a:noFill/>
+        </p:spPr>
+        <p:txBody>
+          <a:bodyPr wrap="none" rtlCol="0">
+            <a:spAutoFit/>
+          </a:bodyPr>
+          <a:lstStyle/>
+          <a:p>
+            <a:r>
+              <a:rPr lang="zh-TW" altLang="en-US" sz="1000" dirty="0">
+                <a:solidFill>
+                  <a:srgbClr val="FFC000"/>
+                </a:solidFill>
+                <a:latin typeface="源樣明體 SB" panose="02020600000000000000" pitchFamily="18" charset="-120"/>
+                <a:ea typeface="源樣明體 SB" panose="02020600000000000000" pitchFamily="18" charset="-120"/>
+              </a:rPr>
+              <a:t>退出</a:t>
+            </a:r>
+            <a:endParaRPr lang="en-US" altLang="zh-TW" sz="1000" dirty="0">
+              <a:solidFill>
+                <a:srgbClr val="FFC000"/>
+              </a:solidFill>
+              <a:latin typeface="源樣明體 SB" panose="02020600000000000000" pitchFamily="18" charset="-120"/>
+              <a:ea typeface="源樣明體 SB" panose="02020600000000000000" pitchFamily="18" charset="-120"/>
+            </a:endParaRPr>
+          </a:p>
+        </p:txBody>
+      </p:sp>
+    </p:spTree>
+    <p:extLst>
+      <p:ext uri="{BB962C8B-B14F-4D97-AF65-F5344CB8AC3E}">
+        <p14:creationId xmlns:p14="http://schemas.microsoft.com/office/powerpoint/2010/main" val="1145843391"/>
+      </p:ext>
+    </p:extLst>
+  </p:cSld>
+  <p:clrMapOvr>
+    <a:masterClrMapping/>
+  </p:clrMapOvr>
+</p:sld>
+</file>
+
+<file path=ppt/slides/slide6.xml><?xml version="1.0" encoding="utf-8"?>
+<p:sld xmlns:a="http://schemas.openxmlformats.org/drawingml/2006/main" xmlns:r="http://schemas.openxmlformats.org/officeDocument/2006/relationships" xmlns:p="http://schemas.openxmlformats.org/presentationml/2006/main">
+  <p:cSld>
+    <p:spTree>
+      <p:nvGrpSpPr>
+        <p:cNvPr id="1" name=""/>
+        <p:cNvGrpSpPr/>
+        <p:nvPr/>
+      </p:nvGrpSpPr>
+      <p:grpSpPr>
+        <a:xfrm>
+          <a:off x="0" y="0"/>
+          <a:ext cx="0" cy="0"/>
+          <a:chOff x="0" y="0"/>
+          <a:chExt cx="0" cy="0"/>
+        </a:xfrm>
+      </p:grpSpPr>
+    </p:spTree>
+    <p:extLst>
+      <p:ext uri="{BB962C8B-B14F-4D97-AF65-F5344CB8AC3E}">
+        <p14:creationId xmlns:p14="http://schemas.microsoft.com/office/powerpoint/2010/main" val="1068525366"/>
+      </p:ext>
+    </p:extLst>
+  </p:cSld>
+  <p:clrMapOvr>
+    <a:masterClrMapping/>
+  </p:clrMapOvr>
+</p:sld>
+</file>
+
 <file path=ppt/theme/theme1.xml><?xml version="1.0" encoding="utf-8"?>
 <a:theme xmlns:a="http://schemas.openxmlformats.org/drawingml/2006/main" name="Office 佈景主題">
   <a:themeElements>

</xml_diff>

<commit_message>
220619 - 98% fin
</commit_message>
<xml_diff>
--- a/素材.pptx
+++ b/素材.pptx
@@ -277,7 +277,7 @@
           <a:p>
             <a:fld id="{021B483B-ABA0-48B8-A896-5DD07329AD2E}" type="datetimeFigureOut">
               <a:rPr lang="en-US" smtClean="0"/>
-              <a:t>6/18/2022</a:t>
+              <a:t>6/19/2022</a:t>
             </a:fld>
             <a:endParaRPr lang="en-US"/>
           </a:p>
@@ -477,7 +477,7 @@
           <a:p>
             <a:fld id="{021B483B-ABA0-48B8-A896-5DD07329AD2E}" type="datetimeFigureOut">
               <a:rPr lang="en-US" smtClean="0"/>
-              <a:t>6/18/2022</a:t>
+              <a:t>6/19/2022</a:t>
             </a:fld>
             <a:endParaRPr lang="en-US"/>
           </a:p>
@@ -687,7 +687,7 @@
           <a:p>
             <a:fld id="{021B483B-ABA0-48B8-A896-5DD07329AD2E}" type="datetimeFigureOut">
               <a:rPr lang="en-US" smtClean="0"/>
-              <a:t>6/18/2022</a:t>
+              <a:t>6/19/2022</a:t>
             </a:fld>
             <a:endParaRPr lang="en-US"/>
           </a:p>
@@ -887,7 +887,7 @@
           <a:p>
             <a:fld id="{021B483B-ABA0-48B8-A896-5DD07329AD2E}" type="datetimeFigureOut">
               <a:rPr lang="en-US" smtClean="0"/>
-              <a:t>6/18/2022</a:t>
+              <a:t>6/19/2022</a:t>
             </a:fld>
             <a:endParaRPr lang="en-US"/>
           </a:p>
@@ -1163,7 +1163,7 @@
           <a:p>
             <a:fld id="{021B483B-ABA0-48B8-A896-5DD07329AD2E}" type="datetimeFigureOut">
               <a:rPr lang="en-US" smtClean="0"/>
-              <a:t>6/18/2022</a:t>
+              <a:t>6/19/2022</a:t>
             </a:fld>
             <a:endParaRPr lang="en-US"/>
           </a:p>
@@ -1431,7 +1431,7 @@
           <a:p>
             <a:fld id="{021B483B-ABA0-48B8-A896-5DD07329AD2E}" type="datetimeFigureOut">
               <a:rPr lang="en-US" smtClean="0"/>
-              <a:t>6/18/2022</a:t>
+              <a:t>6/19/2022</a:t>
             </a:fld>
             <a:endParaRPr lang="en-US"/>
           </a:p>
@@ -1846,7 +1846,7 @@
           <a:p>
             <a:fld id="{021B483B-ABA0-48B8-A896-5DD07329AD2E}" type="datetimeFigureOut">
               <a:rPr lang="en-US" smtClean="0"/>
-              <a:t>6/18/2022</a:t>
+              <a:t>6/19/2022</a:t>
             </a:fld>
             <a:endParaRPr lang="en-US"/>
           </a:p>
@@ -1988,7 +1988,7 @@
           <a:p>
             <a:fld id="{021B483B-ABA0-48B8-A896-5DD07329AD2E}" type="datetimeFigureOut">
               <a:rPr lang="en-US" smtClean="0"/>
-              <a:t>6/18/2022</a:t>
+              <a:t>6/19/2022</a:t>
             </a:fld>
             <a:endParaRPr lang="en-US"/>
           </a:p>
@@ -2101,7 +2101,7 @@
           <a:p>
             <a:fld id="{021B483B-ABA0-48B8-A896-5DD07329AD2E}" type="datetimeFigureOut">
               <a:rPr lang="en-US" smtClean="0"/>
-              <a:t>6/18/2022</a:t>
+              <a:t>6/19/2022</a:t>
             </a:fld>
             <a:endParaRPr lang="en-US"/>
           </a:p>
@@ -2414,7 +2414,7 @@
           <a:p>
             <a:fld id="{021B483B-ABA0-48B8-A896-5DD07329AD2E}" type="datetimeFigureOut">
               <a:rPr lang="en-US" smtClean="0"/>
-              <a:t>6/18/2022</a:t>
+              <a:t>6/19/2022</a:t>
             </a:fld>
             <a:endParaRPr lang="en-US"/>
           </a:p>
@@ -2703,7 +2703,7 @@
           <a:p>
             <a:fld id="{021B483B-ABA0-48B8-A896-5DD07329AD2E}" type="datetimeFigureOut">
               <a:rPr lang="en-US" smtClean="0"/>
-              <a:t>6/18/2022</a:t>
+              <a:t>6/19/2022</a:t>
             </a:fld>
             <a:endParaRPr lang="en-US"/>
           </a:p>
@@ -2946,7 +2946,7 @@
           <a:p>
             <a:fld id="{021B483B-ABA0-48B8-A896-5DD07329AD2E}" type="datetimeFigureOut">
               <a:rPr lang="en-US" smtClean="0"/>
-              <a:t>6/18/2022</a:t>
+              <a:t>6/19/2022</a:t>
             </a:fld>
             <a:endParaRPr lang="en-US"/>
           </a:p>
@@ -5387,6 +5387,291 @@
           <a:chExt cx="0" cy="0"/>
         </a:xfrm>
       </p:grpSpPr>
+      <p:pic>
+        <p:nvPicPr>
+          <p:cNvPr id="7" name="圖片 6">
+            <a:extLst>
+              <a:ext uri="{FF2B5EF4-FFF2-40B4-BE49-F238E27FC236}">
+                <a16:creationId xmlns:a16="http://schemas.microsoft.com/office/drawing/2014/main" id="{702F75D0-B019-510D-5E5B-6B25302C8C52}"/>
+              </a:ext>
+            </a:extLst>
+          </p:cNvPr>
+          <p:cNvPicPr>
+            <a:picLocks noChangeAspect="1"/>
+          </p:cNvPicPr>
+          <p:nvPr/>
+        </p:nvPicPr>
+        <p:blipFill rotWithShape="1">
+          <a:blip r:embed="rId2">
+            <a:extLst>
+              <a:ext uri="{28A0092B-C50C-407E-A947-70E740481C1C}">
+                <a14:useLocalDpi xmlns:a14="http://schemas.microsoft.com/office/drawing/2010/main" val="0"/>
+              </a:ext>
+            </a:extLst>
+          </a:blip>
+          <a:srcRect r="50000" b="50000"/>
+          <a:stretch/>
+        </p:blipFill>
+        <p:spPr>
+          <a:xfrm>
+            <a:off x="1635458" y="-788396"/>
+            <a:ext cx="8779558" cy="8779558"/>
+          </a:xfrm>
+          <a:prstGeom prst="rect">
+            <a:avLst/>
+          </a:prstGeom>
+        </p:spPr>
+      </p:pic>
+      <p:sp>
+        <p:nvSpPr>
+          <p:cNvPr id="2" name="文字方塊 1">
+            <a:extLst>
+              <a:ext uri="{FF2B5EF4-FFF2-40B4-BE49-F238E27FC236}">
+                <a16:creationId xmlns:a16="http://schemas.microsoft.com/office/drawing/2014/main" id="{E00B5779-0244-6BF6-6B6A-E1B06EEDCE27}"/>
+              </a:ext>
+            </a:extLst>
+          </p:cNvPr>
+          <p:cNvSpPr txBox="1"/>
+          <p:nvPr/>
+        </p:nvSpPr>
+        <p:spPr>
+          <a:xfrm>
+            <a:off x="5424180" y="521208"/>
+            <a:ext cx="1343638" cy="692497"/>
+          </a:xfrm>
+          <a:prstGeom prst="rect">
+            <a:avLst/>
+          </a:prstGeom>
+          <a:noFill/>
+        </p:spPr>
+        <p:txBody>
+          <a:bodyPr wrap="none" rtlCol="0">
+            <a:spAutoFit/>
+          </a:bodyPr>
+          <a:lstStyle/>
+          <a:p>
+            <a:pPr algn="ctr"/>
+            <a:r>
+              <a:rPr lang="en-US" altLang="zh-TW" sz="1050" spc="300" dirty="0">
+                <a:solidFill>
+                  <a:srgbClr val="FF0000"/>
+                </a:solidFill>
+                <a:latin typeface="源樣明體 SB" panose="02020600000000000000" pitchFamily="18" charset="-120"/>
+                <a:ea typeface="源樣明體 SB" panose="02020600000000000000" pitchFamily="18" charset="-120"/>
+              </a:rPr>
+              <a:t>Game  Over</a:t>
+            </a:r>
+          </a:p>
+          <a:p>
+            <a:pPr algn="ctr"/>
+            <a:endParaRPr lang="en-US" sz="1050" spc="300" dirty="0">
+              <a:solidFill>
+                <a:srgbClr val="FF0000"/>
+              </a:solidFill>
+              <a:latin typeface="源樣明體 SB" panose="02020600000000000000" pitchFamily="18" charset="-120"/>
+              <a:ea typeface="源樣明體 SB" panose="02020600000000000000" pitchFamily="18" charset="-120"/>
+            </a:endParaRPr>
+          </a:p>
+          <a:p>
+            <a:pPr algn="ctr"/>
+            <a:r>
+              <a:rPr lang="en-US" sz="900" spc="300" dirty="0">
+                <a:solidFill>
+                  <a:schemeClr val="bg1"/>
+                </a:solidFill>
+                <a:latin typeface="源樣明體 SB" panose="02020600000000000000" pitchFamily="18" charset="-120"/>
+                <a:ea typeface="源樣明體 SB" panose="02020600000000000000" pitchFamily="18" charset="-120"/>
+              </a:rPr>
+              <a:t>HA! </a:t>
+            </a:r>
+          </a:p>
+          <a:p>
+            <a:pPr algn="ctr"/>
+            <a:r>
+              <a:rPr lang="en-US" sz="900" spc="300" dirty="0">
+                <a:solidFill>
+                  <a:schemeClr val="bg1"/>
+                </a:solidFill>
+                <a:latin typeface="源樣明體 SB" panose="02020600000000000000" pitchFamily="18" charset="-120"/>
+                <a:ea typeface="源樣明體 SB" panose="02020600000000000000" pitchFamily="18" charset="-120"/>
+              </a:rPr>
+              <a:t>Loser~</a:t>
+            </a:r>
+          </a:p>
+        </p:txBody>
+      </p:sp>
+      <p:sp>
+        <p:nvSpPr>
+          <p:cNvPr id="4" name="文字方塊 3">
+            <a:extLst>
+              <a:ext uri="{FF2B5EF4-FFF2-40B4-BE49-F238E27FC236}">
+                <a16:creationId xmlns:a16="http://schemas.microsoft.com/office/drawing/2014/main" id="{0A822A35-DEB5-75EA-368A-77B4F5E52C88}"/>
+              </a:ext>
+            </a:extLst>
+          </p:cNvPr>
+          <p:cNvSpPr txBox="1"/>
+          <p:nvPr/>
+        </p:nvSpPr>
+        <p:spPr>
+          <a:xfrm>
+            <a:off x="1299135" y="4023360"/>
+            <a:ext cx="484428" cy="523220"/>
+          </a:xfrm>
+          <a:prstGeom prst="rect">
+            <a:avLst/>
+          </a:prstGeom>
+          <a:noFill/>
+        </p:spPr>
+        <p:txBody>
+          <a:bodyPr wrap="none" rtlCol="0">
+            <a:spAutoFit/>
+          </a:bodyPr>
+          <a:lstStyle/>
+          <a:p>
+            <a:r>
+              <a:rPr lang="en-US" altLang="zh-TW" sz="2800" spc="300" dirty="0">
+                <a:latin typeface="源樣明體 SB" panose="02020600000000000000" pitchFamily="18" charset="-120"/>
+                <a:ea typeface="源樣明體 SB" panose="02020600000000000000" pitchFamily="18" charset="-120"/>
+              </a:rPr>
+              <a:t>R</a:t>
+            </a:r>
+            <a:endParaRPr lang="en-US" sz="2800" spc="300" dirty="0">
+              <a:latin typeface="源樣明體 SB" panose="02020600000000000000" pitchFamily="18" charset="-120"/>
+              <a:ea typeface="源樣明體 SB" panose="02020600000000000000" pitchFamily="18" charset="-120"/>
+            </a:endParaRPr>
+          </a:p>
+        </p:txBody>
+      </p:sp>
+      <p:sp>
+        <p:nvSpPr>
+          <p:cNvPr id="5" name="文字方塊 4">
+            <a:extLst>
+              <a:ext uri="{FF2B5EF4-FFF2-40B4-BE49-F238E27FC236}">
+                <a16:creationId xmlns:a16="http://schemas.microsoft.com/office/drawing/2014/main" id="{1EAE3EF9-585C-BA36-67BD-42725E958E10}"/>
+              </a:ext>
+            </a:extLst>
+          </p:cNvPr>
+          <p:cNvSpPr txBox="1"/>
+          <p:nvPr/>
+        </p:nvSpPr>
+        <p:spPr>
+          <a:xfrm>
+            <a:off x="851096" y="4901184"/>
+            <a:ext cx="1380506" cy="523220"/>
+          </a:xfrm>
+          <a:prstGeom prst="rect">
+            <a:avLst/>
+          </a:prstGeom>
+          <a:noFill/>
+        </p:spPr>
+        <p:txBody>
+          <a:bodyPr wrap="none" rtlCol="0">
+            <a:spAutoFit/>
+          </a:bodyPr>
+          <a:lstStyle/>
+          <a:p>
+            <a:r>
+              <a:rPr lang="en-US" altLang="zh-TW" sz="2800" dirty="0">
+                <a:latin typeface="源樣明體 SB" panose="02020600000000000000" pitchFamily="18" charset="-120"/>
+                <a:ea typeface="源樣明體 SB" panose="02020600000000000000" pitchFamily="18" charset="-120"/>
+              </a:rPr>
+              <a:t>SPACE</a:t>
+            </a:r>
+            <a:endParaRPr lang="en-US" sz="2800" dirty="0">
+              <a:latin typeface="源樣明體 SB" panose="02020600000000000000" pitchFamily="18" charset="-120"/>
+              <a:ea typeface="源樣明體 SB" panose="02020600000000000000" pitchFamily="18" charset="-120"/>
+            </a:endParaRPr>
+          </a:p>
+        </p:txBody>
+      </p:sp>
+      <p:sp>
+        <p:nvSpPr>
+          <p:cNvPr id="6" name="文字方塊 5">
+            <a:extLst>
+              <a:ext uri="{FF2B5EF4-FFF2-40B4-BE49-F238E27FC236}">
+                <a16:creationId xmlns:a16="http://schemas.microsoft.com/office/drawing/2014/main" id="{F0743C60-03DB-74E6-A88A-553230CAF460}"/>
+              </a:ext>
+            </a:extLst>
+          </p:cNvPr>
+          <p:cNvSpPr txBox="1"/>
+          <p:nvPr/>
+        </p:nvSpPr>
+        <p:spPr>
+          <a:xfrm>
+            <a:off x="4136167" y="2392144"/>
+            <a:ext cx="3919663" cy="677108"/>
+          </a:xfrm>
+          <a:prstGeom prst="rect">
+            <a:avLst/>
+          </a:prstGeom>
+          <a:noFill/>
+        </p:spPr>
+        <p:txBody>
+          <a:bodyPr wrap="none" rtlCol="0">
+            <a:spAutoFit/>
+          </a:bodyPr>
+          <a:lstStyle/>
+          <a:p>
+            <a:pPr algn="ctr"/>
+            <a:r>
+              <a:rPr lang="en-US" sz="1050" spc="300" dirty="0" err="1">
+                <a:solidFill>
+                  <a:srgbClr val="FFC000"/>
+                </a:solidFill>
+                <a:latin typeface="源樣明體 SB" panose="02020600000000000000" pitchFamily="18" charset="-120"/>
+                <a:ea typeface="源樣明體 SB" panose="02020600000000000000" pitchFamily="18" charset="-120"/>
+              </a:rPr>
+              <a:t>Congrates</a:t>
+            </a:r>
+            <a:r>
+              <a:rPr lang="en-US" sz="1050" spc="300" dirty="0">
+                <a:solidFill>
+                  <a:srgbClr val="FFC000"/>
+                </a:solidFill>
+                <a:latin typeface="源樣明體 SB" panose="02020600000000000000" pitchFamily="18" charset="-120"/>
+                <a:ea typeface="源樣明體 SB" panose="02020600000000000000" pitchFamily="18" charset="-120"/>
+              </a:rPr>
+              <a:t>!</a:t>
+            </a:r>
+          </a:p>
+          <a:p>
+            <a:pPr algn="ctr"/>
+            <a:endParaRPr lang="en-US" sz="1050" spc="300" dirty="0">
+              <a:solidFill>
+                <a:srgbClr val="FF0000"/>
+              </a:solidFill>
+              <a:latin typeface="源樣明體 SB" panose="02020600000000000000" pitchFamily="18" charset="-120"/>
+              <a:ea typeface="源樣明體 SB" panose="02020600000000000000" pitchFamily="18" charset="-120"/>
+            </a:endParaRPr>
+          </a:p>
+          <a:p>
+            <a:pPr algn="ctr"/>
+            <a:r>
+              <a:rPr lang="en-US" sz="900" spc="300" dirty="0">
+                <a:solidFill>
+                  <a:schemeClr val="bg1"/>
+                </a:solidFill>
+                <a:latin typeface="源樣明體 SB" panose="02020600000000000000" pitchFamily="18" charset="-120"/>
+                <a:ea typeface="源樣明體 SB" panose="02020600000000000000" pitchFamily="18" charset="-120"/>
+              </a:rPr>
+              <a:t>You win the combat and become a slime</a:t>
+            </a:r>
+          </a:p>
+          <a:p>
+            <a:pPr algn="ctr"/>
+            <a:r>
+              <a:rPr lang="en-US" sz="700" spc="300" dirty="0">
+                <a:solidFill>
+                  <a:schemeClr val="bg1"/>
+                </a:solidFill>
+                <a:latin typeface="源樣明體 SB" panose="02020600000000000000" pitchFamily="18" charset="-120"/>
+                <a:ea typeface="源樣明體 SB" panose="02020600000000000000" pitchFamily="18" charset="-120"/>
+              </a:rPr>
+              <a:t>LOL</a:t>
+            </a:r>
+          </a:p>
+        </p:txBody>
+      </p:sp>
     </p:spTree>
     <p:extLst>
       <p:ext uri="{BB962C8B-B14F-4D97-AF65-F5344CB8AC3E}">

</xml_diff>

<commit_message>
220620 - 100% finished!!!!!!!!!
- finally finished the final project. 快哭ㄌQAQQQ
</commit_message>
<xml_diff>
--- a/素材.pptx
+++ b/素材.pptx
@@ -4189,8 +4189,8 @@
         </p:nvSpPr>
         <p:spPr>
           <a:xfrm>
-            <a:off x="3166352" y="1577447"/>
-            <a:ext cx="2068195" cy="1200329"/>
+            <a:off x="3458782" y="944714"/>
+            <a:ext cx="2068195" cy="923330"/>
           </a:xfrm>
           <a:prstGeom prst="rect">
             <a:avLst/>
@@ -4202,6 +4202,82 @@
             <a:spAutoFit/>
           </a:bodyPr>
           <a:lstStyle/>
+          <a:p>
+            <a:r>
+              <a:rPr lang="zh-TW" altLang="en-US" sz="600" dirty="0">
+                <a:solidFill>
+                  <a:schemeClr val="bg1"/>
+                </a:solidFill>
+                <a:latin typeface="源樣明體 SB" panose="02020600000000000000" pitchFamily="18" charset="-120"/>
+                <a:ea typeface="源樣明體 SB" panose="02020600000000000000" pitchFamily="18" charset="-120"/>
+              </a:rPr>
+              <a:t>遊戲名稱　守護家園  </a:t>
+            </a:r>
+            <a:r>
+              <a:rPr lang="zh-TW" altLang="en-US" sz="300" strike="sngStrike" dirty="0">
+                <a:solidFill>
+                  <a:schemeClr val="bg1"/>
+                </a:solidFill>
+                <a:latin typeface="源樣明體 SB" panose="02020600000000000000" pitchFamily="18" charset="-120"/>
+                <a:ea typeface="源樣明體 SB" panose="02020600000000000000" pitchFamily="18" charset="-120"/>
+              </a:rPr>
+              <a:t>這是隨便取的名字</a:t>
+            </a:r>
+            <a:r>
+              <a:rPr lang="en-US" altLang="zh-TW" sz="300" strike="sngStrike" dirty="0">
+                <a:solidFill>
+                  <a:schemeClr val="bg1"/>
+                </a:solidFill>
+                <a:latin typeface="源樣明體 SB" panose="02020600000000000000" pitchFamily="18" charset="-120"/>
+                <a:ea typeface="源樣明體 SB" panose="02020600000000000000" pitchFamily="18" charset="-120"/>
+              </a:rPr>
+              <a:t>((</a:t>
+            </a:r>
+            <a:r>
+              <a:rPr lang="zh-TW" altLang="en-US" sz="300" strike="sngStrike" dirty="0">
+                <a:solidFill>
+                  <a:schemeClr val="bg1"/>
+                </a:solidFill>
+                <a:latin typeface="源樣明體 SB" panose="02020600000000000000" pitchFamily="18" charset="-120"/>
+                <a:ea typeface="源樣明體 SB" panose="02020600000000000000" pitchFamily="18" charset="-120"/>
+              </a:rPr>
+              <a:t>沒</a:t>
+            </a:r>
+            <a:endParaRPr lang="en-US" altLang="zh-TW" sz="300" strike="sngStrike" dirty="0">
+              <a:solidFill>
+                <a:schemeClr val="bg1"/>
+              </a:solidFill>
+              <a:latin typeface="源樣明體 SB" panose="02020600000000000000" pitchFamily="18" charset="-120"/>
+              <a:ea typeface="源樣明體 SB" panose="02020600000000000000" pitchFamily="18" charset="-120"/>
+            </a:endParaRPr>
+          </a:p>
+          <a:p>
+            <a:endParaRPr lang="en-US" altLang="zh-TW" sz="600" dirty="0">
+              <a:solidFill>
+                <a:schemeClr val="bg1"/>
+              </a:solidFill>
+              <a:latin typeface="源樣明體 SB" panose="02020600000000000000" pitchFamily="18" charset="-120"/>
+              <a:ea typeface="源樣明體 SB" panose="02020600000000000000" pitchFamily="18" charset="-120"/>
+            </a:endParaRPr>
+          </a:p>
+          <a:p>
+            <a:endParaRPr lang="en-US" altLang="zh-TW" sz="600" dirty="0">
+              <a:solidFill>
+                <a:schemeClr val="bg1"/>
+              </a:solidFill>
+              <a:latin typeface="源樣明體 SB" panose="02020600000000000000" pitchFamily="18" charset="-120"/>
+              <a:ea typeface="源樣明體 SB" panose="02020600000000000000" pitchFamily="18" charset="-120"/>
+            </a:endParaRPr>
+          </a:p>
+          <a:p>
+            <a:endParaRPr lang="en-US" altLang="zh-TW" sz="600" dirty="0">
+              <a:solidFill>
+                <a:schemeClr val="bg1"/>
+              </a:solidFill>
+              <a:latin typeface="源樣明體 SB" panose="02020600000000000000" pitchFamily="18" charset="-120"/>
+              <a:ea typeface="源樣明體 SB" panose="02020600000000000000" pitchFamily="18" charset="-120"/>
+            </a:endParaRPr>
+          </a:p>
           <a:p>
             <a:r>
               <a:rPr lang="zh-TW" altLang="en-US" sz="600" dirty="0">
@@ -4300,231 +4376,2002 @@
               <a:t>for Introduction to Programming (I)</a:t>
             </a:r>
           </a:p>
-          <a:p>
-            <a:endParaRPr lang="en-US" altLang="zh-TW" sz="600" dirty="0">
-              <a:solidFill>
-                <a:schemeClr val="bg1"/>
-              </a:solidFill>
-              <a:latin typeface="源樣明體 SB" panose="02020600000000000000" pitchFamily="18" charset="-120"/>
-              <a:ea typeface="源樣明體 SB" panose="02020600000000000000" pitchFamily="18" charset="-120"/>
-            </a:endParaRPr>
-          </a:p>
-          <a:p>
-            <a:endParaRPr lang="en-US" altLang="zh-TW" sz="600" dirty="0">
-              <a:solidFill>
-                <a:schemeClr val="bg1"/>
-              </a:solidFill>
-              <a:latin typeface="源樣明體 SB" panose="02020600000000000000" pitchFamily="18" charset="-120"/>
-              <a:ea typeface="源樣明體 SB" panose="02020600000000000000" pitchFamily="18" charset="-120"/>
-            </a:endParaRPr>
-          </a:p>
-          <a:p>
-            <a:endParaRPr lang="en-US" altLang="zh-TW" sz="600" dirty="0">
-              <a:solidFill>
-                <a:schemeClr val="bg1"/>
-              </a:solidFill>
-              <a:latin typeface="源樣明體 SB" panose="02020600000000000000" pitchFamily="18" charset="-120"/>
-              <a:ea typeface="源樣明體 SB" panose="02020600000000000000" pitchFamily="18" charset="-120"/>
-            </a:endParaRPr>
-          </a:p>
-          <a:p>
-            <a:r>
-              <a:rPr lang="zh-TW" altLang="en-US" sz="600" dirty="0">
-                <a:solidFill>
-                  <a:schemeClr val="bg1"/>
-                </a:solidFill>
-                <a:latin typeface="源樣明體 SB" panose="02020600000000000000" pitchFamily="18" charset="-120"/>
-                <a:ea typeface="源樣明體 SB" panose="02020600000000000000" pitchFamily="18" charset="-120"/>
-              </a:rPr>
-              <a:t>實作時間　戰鬥系統    </a:t>
-            </a:r>
-            <a:r>
-              <a:rPr lang="en-US" altLang="zh-TW" sz="600" dirty="0">
-                <a:solidFill>
-                  <a:schemeClr val="bg1"/>
-                </a:solidFill>
-                <a:latin typeface="源樣明體 SB" panose="02020600000000000000" pitchFamily="18" charset="-120"/>
-                <a:ea typeface="源樣明體 SB" panose="02020600000000000000" pitchFamily="18" charset="-120"/>
-              </a:rPr>
-              <a:t>16 </a:t>
-            </a:r>
-            <a:r>
-              <a:rPr lang="en-US" altLang="zh-TW" sz="600" dirty="0" err="1">
-                <a:solidFill>
-                  <a:schemeClr val="bg1"/>
-                </a:solidFill>
-                <a:latin typeface="源樣明體 SB" panose="02020600000000000000" pitchFamily="18" charset="-120"/>
-                <a:ea typeface="源樣明體 SB" panose="02020600000000000000" pitchFamily="18" charset="-120"/>
-              </a:rPr>
-              <a:t>hrs</a:t>
-            </a:r>
-            <a:endParaRPr lang="en-US" altLang="zh-TW" sz="600" dirty="0">
-              <a:solidFill>
-                <a:schemeClr val="bg1"/>
-              </a:solidFill>
-              <a:latin typeface="源樣明體 SB" panose="02020600000000000000" pitchFamily="18" charset="-120"/>
-              <a:ea typeface="源樣明體 SB" panose="02020600000000000000" pitchFamily="18" charset="-120"/>
-            </a:endParaRPr>
-          </a:p>
-          <a:p>
-            <a:r>
-              <a:rPr lang="zh-TW" altLang="en-US" sz="600" dirty="0">
-                <a:solidFill>
-                  <a:schemeClr val="bg1"/>
-                </a:solidFill>
-                <a:latin typeface="源樣明體 SB" panose="02020600000000000000" pitchFamily="18" charset="-120"/>
-                <a:ea typeface="源樣明體 SB" panose="02020600000000000000" pitchFamily="18" charset="-120"/>
-              </a:rPr>
-              <a:t>　　　　　產生地圖    </a:t>
-            </a:r>
-            <a:r>
-              <a:rPr lang="en-US" altLang="zh-TW" sz="600" dirty="0">
-                <a:solidFill>
-                  <a:schemeClr val="bg1"/>
-                </a:solidFill>
-                <a:latin typeface="源樣明體 SB" panose="02020600000000000000" pitchFamily="18" charset="-120"/>
-                <a:ea typeface="源樣明體 SB" panose="02020600000000000000" pitchFamily="18" charset="-120"/>
-              </a:rPr>
-              <a:t>1 </a:t>
-            </a:r>
-            <a:r>
-              <a:rPr lang="en-US" altLang="zh-TW" sz="600" dirty="0" err="1">
-                <a:solidFill>
-                  <a:schemeClr val="bg1"/>
-                </a:solidFill>
-                <a:latin typeface="源樣明體 SB" panose="02020600000000000000" pitchFamily="18" charset="-120"/>
-                <a:ea typeface="源樣明體 SB" panose="02020600000000000000" pitchFamily="18" charset="-120"/>
-              </a:rPr>
-              <a:t>hrs</a:t>
-            </a:r>
-            <a:endParaRPr lang="en-US" altLang="zh-TW" sz="600" dirty="0">
-              <a:solidFill>
-                <a:schemeClr val="bg1"/>
-              </a:solidFill>
-              <a:latin typeface="源樣明體 SB" panose="02020600000000000000" pitchFamily="18" charset="-120"/>
-              <a:ea typeface="源樣明體 SB" panose="02020600000000000000" pitchFamily="18" charset="-120"/>
-            </a:endParaRPr>
-          </a:p>
-          <a:p>
-            <a:r>
-              <a:rPr lang="zh-TW" altLang="en-US" sz="600" dirty="0">
-                <a:solidFill>
-                  <a:schemeClr val="bg1"/>
-                </a:solidFill>
-                <a:latin typeface="源樣明體 SB" panose="02020600000000000000" pitchFamily="18" charset="-120"/>
-                <a:ea typeface="源樣明體 SB" panose="02020600000000000000" pitchFamily="18" charset="-120"/>
-              </a:rPr>
-              <a:t>　　　　　</a:t>
-            </a:r>
-            <a:r>
-              <a:rPr lang="en-US" altLang="zh-TW" sz="600" dirty="0">
-                <a:solidFill>
-                  <a:schemeClr val="bg1"/>
-                </a:solidFill>
-                <a:latin typeface="源樣明體 SB" panose="02020600000000000000" pitchFamily="18" charset="-120"/>
-                <a:ea typeface="源樣明體 SB" panose="02020600000000000000" pitchFamily="18" charset="-120"/>
-              </a:rPr>
-              <a:t>QL</a:t>
-            </a:r>
-            <a:r>
-              <a:rPr lang="zh-TW" altLang="en-US" sz="600" dirty="0">
-                <a:solidFill>
-                  <a:schemeClr val="bg1"/>
-                </a:solidFill>
-                <a:latin typeface="源樣明體 SB" panose="02020600000000000000" pitchFamily="18" charset="-120"/>
-                <a:ea typeface="源樣明體 SB" panose="02020600000000000000" pitchFamily="18" charset="-120"/>
-              </a:rPr>
-              <a:t>              </a:t>
-            </a:r>
-            <a:r>
-              <a:rPr lang="en-US" altLang="zh-TW" sz="600" dirty="0">
-                <a:solidFill>
-                  <a:schemeClr val="bg1"/>
-                </a:solidFill>
-                <a:latin typeface="源樣明體 SB" panose="02020600000000000000" pitchFamily="18" charset="-120"/>
-                <a:ea typeface="源樣明體 SB" panose="02020600000000000000" pitchFamily="18" charset="-120"/>
-              </a:rPr>
-              <a:t>5 </a:t>
-            </a:r>
-            <a:r>
-              <a:rPr lang="en-US" altLang="zh-TW" sz="600" dirty="0" err="1">
-                <a:solidFill>
-                  <a:schemeClr val="bg1"/>
-                </a:solidFill>
-                <a:latin typeface="源樣明體 SB" panose="02020600000000000000" pitchFamily="18" charset="-120"/>
-                <a:ea typeface="源樣明體 SB" panose="02020600000000000000" pitchFamily="18" charset="-120"/>
-              </a:rPr>
-              <a:t>hrs</a:t>
-            </a:r>
-            <a:endParaRPr lang="en-US" altLang="zh-TW" sz="600" dirty="0">
-              <a:solidFill>
-                <a:schemeClr val="bg1"/>
-              </a:solidFill>
-              <a:latin typeface="源樣明體 SB" panose="02020600000000000000" pitchFamily="18" charset="-120"/>
-              <a:ea typeface="源樣明體 SB" panose="02020600000000000000" pitchFamily="18" charset="-120"/>
-            </a:endParaRPr>
-          </a:p>
-          <a:p>
-            <a:r>
-              <a:rPr lang="zh-TW" altLang="en-US" sz="600" dirty="0">
-                <a:solidFill>
-                  <a:schemeClr val="bg1"/>
-                </a:solidFill>
-                <a:latin typeface="源樣明體 SB" panose="02020600000000000000" pitchFamily="18" charset="-120"/>
-                <a:ea typeface="源樣明體 SB" panose="02020600000000000000" pitchFamily="18" charset="-120"/>
-              </a:rPr>
-              <a:t>　　　　　</a:t>
-            </a:r>
-            <a:r>
-              <a:rPr lang="en-US" altLang="zh-TW" sz="600" dirty="0">
-                <a:solidFill>
-                  <a:schemeClr val="bg1"/>
-                </a:solidFill>
-                <a:latin typeface="源樣明體 SB" panose="02020600000000000000" pitchFamily="18" charset="-120"/>
-                <a:ea typeface="源樣明體 SB" panose="02020600000000000000" pitchFamily="18" charset="-120"/>
-              </a:rPr>
-              <a:t>UI</a:t>
-            </a:r>
-            <a:r>
-              <a:rPr lang="zh-TW" altLang="en-US" sz="600" dirty="0">
-                <a:solidFill>
-                  <a:schemeClr val="bg1"/>
-                </a:solidFill>
-                <a:latin typeface="源樣明體 SB" panose="02020600000000000000" pitchFamily="18" charset="-120"/>
-                <a:ea typeface="源樣明體 SB" panose="02020600000000000000" pitchFamily="18" charset="-120"/>
-              </a:rPr>
-              <a:t>介面       </a:t>
-            </a:r>
-            <a:r>
-              <a:rPr lang="en-US" altLang="zh-TW" sz="600" dirty="0">
-                <a:solidFill>
-                  <a:schemeClr val="bg1"/>
-                </a:solidFill>
-                <a:latin typeface="源樣明體 SB" panose="02020600000000000000" pitchFamily="18" charset="-120"/>
-                <a:ea typeface="源樣明體 SB" panose="02020600000000000000" pitchFamily="18" charset="-120"/>
-              </a:rPr>
-              <a:t>10 </a:t>
-            </a:r>
-            <a:r>
-              <a:rPr lang="en-US" altLang="zh-TW" sz="600" dirty="0" err="1">
-                <a:solidFill>
-                  <a:schemeClr val="bg1"/>
-                </a:solidFill>
-                <a:latin typeface="源樣明體 SB" panose="02020600000000000000" pitchFamily="18" charset="-120"/>
-                <a:ea typeface="源樣明體 SB" panose="02020600000000000000" pitchFamily="18" charset="-120"/>
-              </a:rPr>
-              <a:t>hrs</a:t>
-            </a:r>
-            <a:endParaRPr lang="en-US" altLang="zh-TW" sz="600" dirty="0">
-              <a:solidFill>
-                <a:schemeClr val="bg1"/>
-              </a:solidFill>
-              <a:latin typeface="源樣明體 SB" panose="02020600000000000000" pitchFamily="18" charset="-120"/>
-              <a:ea typeface="源樣明體 SB" panose="02020600000000000000" pitchFamily="18" charset="-120"/>
-            </a:endParaRPr>
-          </a:p>
-        </p:txBody>
-      </p:sp>
+        </p:txBody>
+      </p:sp>
+      <p:graphicFrame>
+        <p:nvGraphicFramePr>
+          <p:cNvPr id="3" name="表格 3">
+            <a:extLst>
+              <a:ext uri="{FF2B5EF4-FFF2-40B4-BE49-F238E27FC236}">
+                <a16:creationId xmlns:a16="http://schemas.microsoft.com/office/drawing/2014/main" id="{E5705D99-F306-CDD2-63C2-22142583ABF4}"/>
+              </a:ext>
+            </a:extLst>
+          </p:cNvPr>
+          <p:cNvGraphicFramePr>
+            <a:graphicFrameLocks noGrp="1"/>
+          </p:cNvGraphicFramePr>
+          <p:nvPr>
+            <p:extLst>
+              <p:ext uri="{D42A27DB-BD31-4B8C-83A1-F6EECF244321}">
+                <p14:modId xmlns:p14="http://schemas.microsoft.com/office/powerpoint/2010/main" val="298906488"/>
+              </p:ext>
+            </p:extLst>
+          </p:nvPr>
+        </p:nvGraphicFramePr>
+        <p:xfrm>
+          <a:off x="5664115" y="944714"/>
+          <a:ext cx="1406286" cy="1965960"/>
+        </p:xfrm>
+        <a:graphic>
+          <a:graphicData uri="http://schemas.openxmlformats.org/drawingml/2006/table">
+            <a:tbl>
+              <a:tblPr firstRow="1" bandRow="1">
+                <a:tableStyleId>{5C22544A-7EE6-4342-B048-85BDC9FD1C3A}</a:tableStyleId>
+              </a:tblPr>
+              <a:tblGrid>
+                <a:gridCol w="817006">
+                  <a:extLst>
+                    <a:ext uri="{9D8B030D-6E8A-4147-A177-3AD203B41FA5}">
+                      <a16:colId xmlns:a16="http://schemas.microsoft.com/office/drawing/2014/main" val="3768747560"/>
+                    </a:ext>
+                  </a:extLst>
+                </a:gridCol>
+                <a:gridCol w="589280">
+                  <a:extLst>
+                    <a:ext uri="{9D8B030D-6E8A-4147-A177-3AD203B41FA5}">
+                      <a16:colId xmlns:a16="http://schemas.microsoft.com/office/drawing/2014/main" val="3663189"/>
+                    </a:ext>
+                  </a:extLst>
+                </a:gridCol>
+              </a:tblGrid>
+              <a:tr h="174857">
+                <a:tc gridSpan="2">
+                  <a:txBody>
+                    <a:bodyPr/>
+                    <a:lstStyle/>
+                    <a:p>
+                      <a:pPr algn="ctr"/>
+                      <a:r>
+                        <a:rPr lang="zh-TW" altLang="en-US" sz="600" dirty="0">
+                          <a:solidFill>
+                            <a:schemeClr val="bg1"/>
+                          </a:solidFill>
+                          <a:latin typeface="源樣明體 SB" panose="02020600000000000000" pitchFamily="18" charset="-120"/>
+                          <a:ea typeface="源樣明體 SB" panose="02020600000000000000" pitchFamily="18" charset="-120"/>
+                        </a:rPr>
+                        <a:t>總實作時間約 </a:t>
+                      </a:r>
+                      <a:r>
+                        <a:rPr lang="en-US" altLang="zh-TW" sz="600" dirty="0">
+                          <a:solidFill>
+                            <a:schemeClr val="bg1"/>
+                          </a:solidFill>
+                          <a:latin typeface="源樣明體 SB" panose="02020600000000000000" pitchFamily="18" charset="-120"/>
+                          <a:ea typeface="源樣明體 SB" panose="02020600000000000000" pitchFamily="18" charset="-120"/>
+                        </a:rPr>
+                        <a:t>100 </a:t>
+                      </a:r>
+                      <a:r>
+                        <a:rPr lang="zh-TW" altLang="en-US" sz="600" dirty="0">
+                          <a:solidFill>
+                            <a:schemeClr val="bg1"/>
+                          </a:solidFill>
+                          <a:latin typeface="源樣明體 SB" panose="02020600000000000000" pitchFamily="18" charset="-120"/>
+                          <a:ea typeface="源樣明體 SB" panose="02020600000000000000" pitchFamily="18" charset="-120"/>
+                        </a:rPr>
+                        <a:t>小時</a:t>
+                      </a:r>
+                      <a:endParaRPr lang="en-US" sz="600" dirty="0">
+                        <a:solidFill>
+                          <a:schemeClr val="bg1"/>
+                        </a:solidFill>
+                        <a:latin typeface="源樣明體 SB" panose="02020600000000000000" pitchFamily="18" charset="-120"/>
+                        <a:ea typeface="源樣明體 SB" panose="02020600000000000000" pitchFamily="18" charset="-120"/>
+                      </a:endParaRPr>
+                    </a:p>
+                  </a:txBody>
+                  <a:tcPr>
+                    <a:lnL w="3175" cap="flat" cmpd="sng" algn="ctr">
+                      <a:noFill/>
+                      <a:prstDash val="solid"/>
+                      <a:round/>
+                      <a:headEnd type="none" w="med" len="med"/>
+                      <a:tailEnd type="none" w="med" len="med"/>
+                    </a:lnL>
+                    <a:lnR w="3175" cap="flat" cmpd="sng" algn="ctr">
+                      <a:noFill/>
+                      <a:prstDash val="solid"/>
+                      <a:round/>
+                      <a:headEnd type="none" w="med" len="med"/>
+                      <a:tailEnd type="none" w="med" len="med"/>
+                    </a:lnR>
+                    <a:lnT w="3175" cap="flat" cmpd="sng" algn="ctr">
+                      <a:noFill/>
+                      <a:prstDash val="solid"/>
+                      <a:round/>
+                      <a:headEnd type="none" w="med" len="med"/>
+                      <a:tailEnd type="none" w="med" len="med"/>
+                    </a:lnT>
+                    <a:lnB w="3175" cap="flat" cmpd="sng" algn="ctr">
+                      <a:solidFill>
+                        <a:schemeClr val="bg1"/>
+                      </a:solidFill>
+                      <a:prstDash val="solid"/>
+                      <a:round/>
+                      <a:headEnd type="none" w="med" len="med"/>
+                      <a:tailEnd type="none" w="med" len="med"/>
+                    </a:lnB>
+                    <a:lnTlToBr w="12700" cmpd="sng">
+                      <a:noFill/>
+                      <a:prstDash val="solid"/>
+                    </a:lnTlToBr>
+                    <a:lnBlToTr w="12700" cmpd="sng">
+                      <a:noFill/>
+                      <a:prstDash val="solid"/>
+                    </a:lnBlToTr>
+                    <a:noFill/>
+                  </a:tcPr>
+                </a:tc>
+                <a:tc hMerge="1">
+                  <a:txBody>
+                    <a:bodyPr/>
+                    <a:lstStyle/>
+                    <a:p>
+                      <a:pPr algn="ctr"/>
+                      <a:endParaRPr lang="en-US" sz="600" dirty="0">
+                        <a:solidFill>
+                          <a:schemeClr val="bg1"/>
+                        </a:solidFill>
+                        <a:latin typeface="源樣明體 SB" panose="02020600000000000000" pitchFamily="18" charset="-120"/>
+                        <a:ea typeface="源樣明體 SB" panose="02020600000000000000" pitchFamily="18" charset="-120"/>
+                      </a:endParaRPr>
+                    </a:p>
+                  </a:txBody>
+                  <a:tcPr>
+                    <a:lnL w="3175" cap="flat" cmpd="sng" algn="ctr">
+                      <a:solidFill>
+                        <a:schemeClr val="bg1"/>
+                      </a:solidFill>
+                      <a:prstDash val="solid"/>
+                      <a:round/>
+                      <a:headEnd type="none" w="med" len="med"/>
+                      <a:tailEnd type="none" w="med" len="med"/>
+                    </a:lnL>
+                    <a:lnR w="3175" cap="flat" cmpd="sng" algn="ctr">
+                      <a:solidFill>
+                        <a:schemeClr val="bg1"/>
+                      </a:solidFill>
+                      <a:prstDash val="solid"/>
+                      <a:round/>
+                      <a:headEnd type="none" w="med" len="med"/>
+                      <a:tailEnd type="none" w="med" len="med"/>
+                    </a:lnR>
+                    <a:lnT w="3175" cap="flat" cmpd="sng" algn="ctr">
+                      <a:solidFill>
+                        <a:schemeClr val="bg1"/>
+                      </a:solidFill>
+                      <a:prstDash val="solid"/>
+                      <a:round/>
+                      <a:headEnd type="none" w="med" len="med"/>
+                      <a:tailEnd type="none" w="med" len="med"/>
+                    </a:lnT>
+                    <a:lnB w="3175" cap="flat" cmpd="sng" algn="ctr">
+                      <a:solidFill>
+                        <a:schemeClr val="bg1"/>
+                      </a:solidFill>
+                      <a:prstDash val="solid"/>
+                      <a:round/>
+                      <a:headEnd type="none" w="med" len="med"/>
+                      <a:tailEnd type="none" w="med" len="med"/>
+                    </a:lnB>
+                    <a:lnTlToBr w="12700" cmpd="sng">
+                      <a:noFill/>
+                      <a:prstDash val="solid"/>
+                    </a:lnTlToBr>
+                    <a:lnBlToTr w="12700" cmpd="sng">
+                      <a:noFill/>
+                      <a:prstDash val="solid"/>
+                    </a:lnBlToTr>
+                    <a:noFill/>
+                  </a:tcPr>
+                </a:tc>
+                <a:extLst>
+                  <a:ext uri="{0D108BD9-81ED-4DB2-BD59-A6C34878D82A}">
+                    <a16:rowId xmlns:a16="http://schemas.microsoft.com/office/drawing/2014/main" val="2029189991"/>
+                  </a:ext>
+                </a:extLst>
+              </a:tr>
+              <a:tr h="174857">
+                <a:tc>
+                  <a:txBody>
+                    <a:bodyPr/>
+                    <a:lstStyle/>
+                    <a:p>
+                      <a:r>
+                        <a:rPr lang="zh-TW" altLang="en-US" sz="600" dirty="0">
+                          <a:solidFill>
+                            <a:schemeClr val="bg1"/>
+                          </a:solidFill>
+                          <a:latin typeface="源樣明體 SB" panose="02020600000000000000" pitchFamily="18" charset="-120"/>
+                          <a:ea typeface="源樣明體 SB" panose="02020600000000000000" pitchFamily="18" charset="-120"/>
+                        </a:rPr>
+                        <a:t>視角鎖定</a:t>
+                      </a:r>
+                      <a:endParaRPr lang="en-US" sz="600" dirty="0">
+                        <a:solidFill>
+                          <a:schemeClr val="bg1"/>
+                        </a:solidFill>
+                        <a:latin typeface="源樣明體 SB" panose="02020600000000000000" pitchFamily="18" charset="-120"/>
+                        <a:ea typeface="源樣明體 SB" panose="02020600000000000000" pitchFamily="18" charset="-120"/>
+                      </a:endParaRPr>
+                    </a:p>
+                  </a:txBody>
+                  <a:tcPr>
+                    <a:lnL w="3175" cap="flat" cmpd="sng" algn="ctr">
+                      <a:solidFill>
+                        <a:schemeClr val="bg1"/>
+                      </a:solidFill>
+                      <a:prstDash val="solid"/>
+                      <a:round/>
+                      <a:headEnd type="none" w="med" len="med"/>
+                      <a:tailEnd type="none" w="med" len="med"/>
+                    </a:lnL>
+                    <a:lnR w="3175" cap="flat" cmpd="sng" algn="ctr">
+                      <a:solidFill>
+                        <a:schemeClr val="bg1"/>
+                      </a:solidFill>
+                      <a:prstDash val="solid"/>
+                      <a:round/>
+                      <a:headEnd type="none" w="med" len="med"/>
+                      <a:tailEnd type="none" w="med" len="med"/>
+                    </a:lnR>
+                    <a:lnT w="3175" cap="flat" cmpd="sng" algn="ctr">
+                      <a:solidFill>
+                        <a:schemeClr val="bg1"/>
+                      </a:solidFill>
+                      <a:prstDash val="solid"/>
+                      <a:round/>
+                      <a:headEnd type="none" w="med" len="med"/>
+                      <a:tailEnd type="none" w="med" len="med"/>
+                    </a:lnT>
+                    <a:lnB w="3175" cap="flat" cmpd="sng" algn="ctr">
+                      <a:solidFill>
+                        <a:schemeClr val="bg1"/>
+                      </a:solidFill>
+                      <a:prstDash val="solid"/>
+                      <a:round/>
+                      <a:headEnd type="none" w="med" len="med"/>
+                      <a:tailEnd type="none" w="med" len="med"/>
+                    </a:lnB>
+                    <a:lnTlToBr w="12700" cmpd="sng">
+                      <a:noFill/>
+                      <a:prstDash val="solid"/>
+                    </a:lnTlToBr>
+                    <a:lnBlToTr w="12700" cmpd="sng">
+                      <a:noFill/>
+                      <a:prstDash val="solid"/>
+                    </a:lnBlToTr>
+                    <a:noFill/>
+                  </a:tcPr>
+                </a:tc>
+                <a:tc>
+                  <a:txBody>
+                    <a:bodyPr/>
+                    <a:lstStyle/>
+                    <a:p>
+                      <a:pPr algn="ctr"/>
+                      <a:r>
+                        <a:rPr lang="zh-TW" altLang="en-US" sz="600" dirty="0">
+                          <a:solidFill>
+                            <a:schemeClr val="bg1"/>
+                          </a:solidFill>
+                          <a:latin typeface="源樣明體 SB" panose="02020600000000000000" pitchFamily="18" charset="-120"/>
+                          <a:ea typeface="源樣明體 SB" panose="02020600000000000000" pitchFamily="18" charset="-120"/>
+                        </a:rPr>
+                        <a:t>約 </a:t>
+                      </a:r>
+                      <a:r>
+                        <a:rPr lang="en-US" altLang="zh-TW" sz="600" dirty="0">
+                          <a:solidFill>
+                            <a:schemeClr val="bg1"/>
+                          </a:solidFill>
+                          <a:latin typeface="源樣明體 SB" panose="02020600000000000000" pitchFamily="18" charset="-120"/>
+                          <a:ea typeface="源樣明體 SB" panose="02020600000000000000" pitchFamily="18" charset="-120"/>
+                        </a:rPr>
+                        <a:t>2 </a:t>
+                      </a:r>
+                      <a:r>
+                        <a:rPr lang="zh-TW" altLang="en-US" sz="600" dirty="0">
+                          <a:solidFill>
+                            <a:schemeClr val="bg1"/>
+                          </a:solidFill>
+                          <a:latin typeface="源樣明體 SB" panose="02020600000000000000" pitchFamily="18" charset="-120"/>
+                          <a:ea typeface="源樣明體 SB" panose="02020600000000000000" pitchFamily="18" charset="-120"/>
+                        </a:rPr>
+                        <a:t>小時</a:t>
+                      </a:r>
+                      <a:endParaRPr lang="en-US" sz="600" dirty="0">
+                        <a:solidFill>
+                          <a:schemeClr val="bg1"/>
+                        </a:solidFill>
+                        <a:latin typeface="源樣明體 SB" panose="02020600000000000000" pitchFamily="18" charset="-120"/>
+                        <a:ea typeface="源樣明體 SB" panose="02020600000000000000" pitchFamily="18" charset="-120"/>
+                      </a:endParaRPr>
+                    </a:p>
+                  </a:txBody>
+                  <a:tcPr>
+                    <a:lnL w="3175" cap="flat" cmpd="sng" algn="ctr">
+                      <a:solidFill>
+                        <a:schemeClr val="bg1"/>
+                      </a:solidFill>
+                      <a:prstDash val="solid"/>
+                      <a:round/>
+                      <a:headEnd type="none" w="med" len="med"/>
+                      <a:tailEnd type="none" w="med" len="med"/>
+                    </a:lnL>
+                    <a:lnR w="3175" cap="flat" cmpd="sng" algn="ctr">
+                      <a:solidFill>
+                        <a:schemeClr val="bg1"/>
+                      </a:solidFill>
+                      <a:prstDash val="solid"/>
+                      <a:round/>
+                      <a:headEnd type="none" w="med" len="med"/>
+                      <a:tailEnd type="none" w="med" len="med"/>
+                    </a:lnR>
+                    <a:lnT w="3175" cap="flat" cmpd="sng" algn="ctr">
+                      <a:solidFill>
+                        <a:schemeClr val="bg1"/>
+                      </a:solidFill>
+                      <a:prstDash val="solid"/>
+                      <a:round/>
+                      <a:headEnd type="none" w="med" len="med"/>
+                      <a:tailEnd type="none" w="med" len="med"/>
+                    </a:lnT>
+                    <a:lnB w="3175" cap="flat" cmpd="sng" algn="ctr">
+                      <a:solidFill>
+                        <a:schemeClr val="bg1"/>
+                      </a:solidFill>
+                      <a:prstDash val="solid"/>
+                      <a:round/>
+                      <a:headEnd type="none" w="med" len="med"/>
+                      <a:tailEnd type="none" w="med" len="med"/>
+                    </a:lnB>
+                    <a:lnTlToBr w="12700" cmpd="sng">
+                      <a:noFill/>
+                      <a:prstDash val="solid"/>
+                    </a:lnTlToBr>
+                    <a:lnBlToTr w="12700" cmpd="sng">
+                      <a:noFill/>
+                      <a:prstDash val="solid"/>
+                    </a:lnBlToTr>
+                    <a:noFill/>
+                  </a:tcPr>
+                </a:tc>
+                <a:extLst>
+                  <a:ext uri="{0D108BD9-81ED-4DB2-BD59-A6C34878D82A}">
+                    <a16:rowId xmlns:a16="http://schemas.microsoft.com/office/drawing/2014/main" val="3514846672"/>
+                  </a:ext>
+                </a:extLst>
+              </a:tr>
+              <a:tr h="174857">
+                <a:tc>
+                  <a:txBody>
+                    <a:bodyPr/>
+                    <a:lstStyle/>
+                    <a:p>
+                      <a:r>
+                        <a:rPr lang="zh-TW" altLang="en-US" sz="600" dirty="0">
+                          <a:solidFill>
+                            <a:schemeClr val="bg1"/>
+                          </a:solidFill>
+                          <a:latin typeface="源樣明體 SB" panose="02020600000000000000" pitchFamily="18" charset="-120"/>
+                          <a:ea typeface="源樣明體 SB" panose="02020600000000000000" pitchFamily="18" charset="-120"/>
+                        </a:rPr>
+                        <a:t>戰鬥系統</a:t>
+                      </a:r>
+                      <a:endParaRPr lang="en-US" sz="600" dirty="0">
+                        <a:solidFill>
+                          <a:schemeClr val="bg1"/>
+                        </a:solidFill>
+                        <a:latin typeface="源樣明體 SB" panose="02020600000000000000" pitchFamily="18" charset="-120"/>
+                        <a:ea typeface="源樣明體 SB" panose="02020600000000000000" pitchFamily="18" charset="-120"/>
+                      </a:endParaRPr>
+                    </a:p>
+                  </a:txBody>
+                  <a:tcPr>
+                    <a:lnL w="3175" cap="flat" cmpd="sng" algn="ctr">
+                      <a:solidFill>
+                        <a:schemeClr val="bg1"/>
+                      </a:solidFill>
+                      <a:prstDash val="solid"/>
+                      <a:round/>
+                      <a:headEnd type="none" w="med" len="med"/>
+                      <a:tailEnd type="none" w="med" len="med"/>
+                    </a:lnL>
+                    <a:lnR w="3175" cap="flat" cmpd="sng" algn="ctr">
+                      <a:solidFill>
+                        <a:schemeClr val="bg1"/>
+                      </a:solidFill>
+                      <a:prstDash val="solid"/>
+                      <a:round/>
+                      <a:headEnd type="none" w="med" len="med"/>
+                      <a:tailEnd type="none" w="med" len="med"/>
+                    </a:lnR>
+                    <a:lnT w="3175" cap="flat" cmpd="sng" algn="ctr">
+                      <a:solidFill>
+                        <a:schemeClr val="bg1"/>
+                      </a:solidFill>
+                      <a:prstDash val="solid"/>
+                      <a:round/>
+                      <a:headEnd type="none" w="med" len="med"/>
+                      <a:tailEnd type="none" w="med" len="med"/>
+                    </a:lnT>
+                    <a:lnB w="3175" cap="flat" cmpd="sng" algn="ctr">
+                      <a:solidFill>
+                        <a:schemeClr val="bg1"/>
+                      </a:solidFill>
+                      <a:prstDash val="solid"/>
+                      <a:round/>
+                      <a:headEnd type="none" w="med" len="med"/>
+                      <a:tailEnd type="none" w="med" len="med"/>
+                    </a:lnB>
+                    <a:lnTlToBr w="12700" cmpd="sng">
+                      <a:noFill/>
+                      <a:prstDash val="solid"/>
+                    </a:lnTlToBr>
+                    <a:lnBlToTr w="12700" cmpd="sng">
+                      <a:noFill/>
+                      <a:prstDash val="solid"/>
+                    </a:lnBlToTr>
+                    <a:noFill/>
+                  </a:tcPr>
+                </a:tc>
+                <a:tc>
+                  <a:txBody>
+                    <a:bodyPr/>
+                    <a:lstStyle/>
+                    <a:p>
+                      <a:pPr algn="ctr"/>
+                      <a:r>
+                        <a:rPr lang="zh-TW" altLang="en-US" sz="600" dirty="0">
+                          <a:solidFill>
+                            <a:schemeClr val="bg1"/>
+                          </a:solidFill>
+                          <a:latin typeface="源樣明體 SB" panose="02020600000000000000" pitchFamily="18" charset="-120"/>
+                          <a:ea typeface="源樣明體 SB" panose="02020600000000000000" pitchFamily="18" charset="-120"/>
+                        </a:rPr>
+                        <a:t>約 </a:t>
+                      </a:r>
+                      <a:r>
+                        <a:rPr lang="en-US" altLang="zh-TW" sz="600" dirty="0">
+                          <a:solidFill>
+                            <a:schemeClr val="bg1"/>
+                          </a:solidFill>
+                          <a:latin typeface="源樣明體 SB" panose="02020600000000000000" pitchFamily="18" charset="-120"/>
+                          <a:ea typeface="源樣明體 SB" panose="02020600000000000000" pitchFamily="18" charset="-120"/>
+                        </a:rPr>
+                        <a:t>16</a:t>
+                      </a:r>
+                      <a:r>
+                        <a:rPr lang="zh-TW" altLang="en-US" sz="600" dirty="0">
+                          <a:solidFill>
+                            <a:schemeClr val="bg1"/>
+                          </a:solidFill>
+                          <a:latin typeface="源樣明體 SB" panose="02020600000000000000" pitchFamily="18" charset="-120"/>
+                          <a:ea typeface="源樣明體 SB" panose="02020600000000000000" pitchFamily="18" charset="-120"/>
+                        </a:rPr>
+                        <a:t> 小時</a:t>
+                      </a:r>
+                      <a:endParaRPr lang="en-US" sz="600" dirty="0">
+                        <a:solidFill>
+                          <a:schemeClr val="bg1"/>
+                        </a:solidFill>
+                        <a:latin typeface="源樣明體 SB" panose="02020600000000000000" pitchFamily="18" charset="-120"/>
+                        <a:ea typeface="源樣明體 SB" panose="02020600000000000000" pitchFamily="18" charset="-120"/>
+                      </a:endParaRPr>
+                    </a:p>
+                  </a:txBody>
+                  <a:tcPr>
+                    <a:lnL w="3175" cap="flat" cmpd="sng" algn="ctr">
+                      <a:solidFill>
+                        <a:schemeClr val="bg1"/>
+                      </a:solidFill>
+                      <a:prstDash val="solid"/>
+                      <a:round/>
+                      <a:headEnd type="none" w="med" len="med"/>
+                      <a:tailEnd type="none" w="med" len="med"/>
+                    </a:lnL>
+                    <a:lnR w="3175" cap="flat" cmpd="sng" algn="ctr">
+                      <a:solidFill>
+                        <a:schemeClr val="bg1"/>
+                      </a:solidFill>
+                      <a:prstDash val="solid"/>
+                      <a:round/>
+                      <a:headEnd type="none" w="med" len="med"/>
+                      <a:tailEnd type="none" w="med" len="med"/>
+                    </a:lnR>
+                    <a:lnT w="3175" cap="flat" cmpd="sng" algn="ctr">
+                      <a:solidFill>
+                        <a:schemeClr val="bg1"/>
+                      </a:solidFill>
+                      <a:prstDash val="solid"/>
+                      <a:round/>
+                      <a:headEnd type="none" w="med" len="med"/>
+                      <a:tailEnd type="none" w="med" len="med"/>
+                    </a:lnT>
+                    <a:lnB w="3175" cap="flat" cmpd="sng" algn="ctr">
+                      <a:solidFill>
+                        <a:schemeClr val="bg1"/>
+                      </a:solidFill>
+                      <a:prstDash val="solid"/>
+                      <a:round/>
+                      <a:headEnd type="none" w="med" len="med"/>
+                      <a:tailEnd type="none" w="med" len="med"/>
+                    </a:lnB>
+                    <a:lnTlToBr w="12700" cmpd="sng">
+                      <a:noFill/>
+                      <a:prstDash val="solid"/>
+                    </a:lnTlToBr>
+                    <a:lnBlToTr w="12700" cmpd="sng">
+                      <a:noFill/>
+                      <a:prstDash val="solid"/>
+                    </a:lnBlToTr>
+                    <a:noFill/>
+                  </a:tcPr>
+                </a:tc>
+                <a:extLst>
+                  <a:ext uri="{0D108BD9-81ED-4DB2-BD59-A6C34878D82A}">
+                    <a16:rowId xmlns:a16="http://schemas.microsoft.com/office/drawing/2014/main" val="3188554075"/>
+                  </a:ext>
+                </a:extLst>
+              </a:tr>
+              <a:tr h="174857">
+                <a:tc>
+                  <a:txBody>
+                    <a:bodyPr/>
+                    <a:lstStyle/>
+                    <a:p>
+                      <a:pPr marL="0" marR="0" lvl="0" indent="0" algn="l" defTabSz="914400" rtl="0" eaLnBrk="1" fontAlgn="auto" latinLnBrk="0" hangingPunct="1">
+                        <a:lnSpc>
+                          <a:spcPct val="100000"/>
+                        </a:lnSpc>
+                        <a:spcBef>
+                          <a:spcPts val="0"/>
+                        </a:spcBef>
+                        <a:spcAft>
+                          <a:spcPts val="0"/>
+                        </a:spcAft>
+                        <a:buClrTx/>
+                        <a:buSzTx/>
+                        <a:buFontTx/>
+                        <a:buNone/>
+                        <a:tabLst/>
+                        <a:defRPr/>
+                      </a:pPr>
+                      <a:r>
+                        <a:rPr lang="zh-TW" altLang="en-US" sz="600" dirty="0">
+                          <a:solidFill>
+                            <a:schemeClr val="bg1"/>
+                          </a:solidFill>
+                          <a:latin typeface="源樣明體 SB" panose="02020600000000000000" pitchFamily="18" charset="-120"/>
+                          <a:ea typeface="源樣明體 SB" panose="02020600000000000000" pitchFamily="18" charset="-120"/>
+                        </a:rPr>
+                        <a:t>動態產生地圖</a:t>
+                      </a:r>
+                      <a:endParaRPr lang="en-US" sz="600" dirty="0">
+                        <a:solidFill>
+                          <a:schemeClr val="bg1"/>
+                        </a:solidFill>
+                        <a:latin typeface="源樣明體 SB" panose="02020600000000000000" pitchFamily="18" charset="-120"/>
+                        <a:ea typeface="源樣明體 SB" panose="02020600000000000000" pitchFamily="18" charset="-120"/>
+                      </a:endParaRPr>
+                    </a:p>
+                  </a:txBody>
+                  <a:tcPr>
+                    <a:lnL w="3175" cap="flat" cmpd="sng" algn="ctr">
+                      <a:solidFill>
+                        <a:schemeClr val="bg1"/>
+                      </a:solidFill>
+                      <a:prstDash val="solid"/>
+                      <a:round/>
+                      <a:headEnd type="none" w="med" len="med"/>
+                      <a:tailEnd type="none" w="med" len="med"/>
+                    </a:lnL>
+                    <a:lnR w="3175" cap="flat" cmpd="sng" algn="ctr">
+                      <a:solidFill>
+                        <a:schemeClr val="bg1"/>
+                      </a:solidFill>
+                      <a:prstDash val="solid"/>
+                      <a:round/>
+                      <a:headEnd type="none" w="med" len="med"/>
+                      <a:tailEnd type="none" w="med" len="med"/>
+                    </a:lnR>
+                    <a:lnT w="3175" cap="flat" cmpd="sng" algn="ctr">
+                      <a:solidFill>
+                        <a:schemeClr val="bg1"/>
+                      </a:solidFill>
+                      <a:prstDash val="solid"/>
+                      <a:round/>
+                      <a:headEnd type="none" w="med" len="med"/>
+                      <a:tailEnd type="none" w="med" len="med"/>
+                    </a:lnT>
+                    <a:lnB w="3175" cap="flat" cmpd="sng" algn="ctr">
+                      <a:solidFill>
+                        <a:schemeClr val="bg1"/>
+                      </a:solidFill>
+                      <a:prstDash val="solid"/>
+                      <a:round/>
+                      <a:headEnd type="none" w="med" len="med"/>
+                      <a:tailEnd type="none" w="med" len="med"/>
+                    </a:lnB>
+                    <a:lnTlToBr w="12700" cmpd="sng">
+                      <a:noFill/>
+                      <a:prstDash val="solid"/>
+                    </a:lnTlToBr>
+                    <a:lnBlToTr w="12700" cmpd="sng">
+                      <a:noFill/>
+                      <a:prstDash val="solid"/>
+                    </a:lnBlToTr>
+                    <a:noFill/>
+                  </a:tcPr>
+                </a:tc>
+                <a:tc>
+                  <a:txBody>
+                    <a:bodyPr/>
+                    <a:lstStyle/>
+                    <a:p>
+                      <a:pPr algn="ctr"/>
+                      <a:r>
+                        <a:rPr lang="zh-TW" altLang="en-US" sz="600" dirty="0">
+                          <a:solidFill>
+                            <a:schemeClr val="bg1"/>
+                          </a:solidFill>
+                          <a:latin typeface="源樣明體 SB" panose="02020600000000000000" pitchFamily="18" charset="-120"/>
+                          <a:ea typeface="源樣明體 SB" panose="02020600000000000000" pitchFamily="18" charset="-120"/>
+                        </a:rPr>
+                        <a:t>約 </a:t>
+                      </a:r>
+                      <a:r>
+                        <a:rPr lang="en-US" altLang="zh-TW" sz="600" dirty="0">
+                          <a:solidFill>
+                            <a:schemeClr val="bg1"/>
+                          </a:solidFill>
+                          <a:latin typeface="源樣明體 SB" panose="02020600000000000000" pitchFamily="18" charset="-120"/>
+                          <a:ea typeface="源樣明體 SB" panose="02020600000000000000" pitchFamily="18" charset="-120"/>
+                        </a:rPr>
+                        <a:t>1.5 </a:t>
+                      </a:r>
+                      <a:r>
+                        <a:rPr lang="zh-TW" altLang="en-US" sz="600" dirty="0">
+                          <a:solidFill>
+                            <a:schemeClr val="bg1"/>
+                          </a:solidFill>
+                          <a:latin typeface="源樣明體 SB" panose="02020600000000000000" pitchFamily="18" charset="-120"/>
+                          <a:ea typeface="源樣明體 SB" panose="02020600000000000000" pitchFamily="18" charset="-120"/>
+                        </a:rPr>
+                        <a:t>小時</a:t>
+                      </a:r>
+                      <a:endParaRPr lang="en-US" sz="600" dirty="0">
+                        <a:solidFill>
+                          <a:schemeClr val="bg1"/>
+                        </a:solidFill>
+                        <a:latin typeface="源樣明體 SB" panose="02020600000000000000" pitchFamily="18" charset="-120"/>
+                        <a:ea typeface="源樣明體 SB" panose="02020600000000000000" pitchFamily="18" charset="-120"/>
+                      </a:endParaRPr>
+                    </a:p>
+                  </a:txBody>
+                  <a:tcPr>
+                    <a:lnL w="3175" cap="flat" cmpd="sng" algn="ctr">
+                      <a:solidFill>
+                        <a:schemeClr val="bg1"/>
+                      </a:solidFill>
+                      <a:prstDash val="solid"/>
+                      <a:round/>
+                      <a:headEnd type="none" w="med" len="med"/>
+                      <a:tailEnd type="none" w="med" len="med"/>
+                    </a:lnL>
+                    <a:lnR w="3175" cap="flat" cmpd="sng" algn="ctr">
+                      <a:solidFill>
+                        <a:schemeClr val="bg1"/>
+                      </a:solidFill>
+                      <a:prstDash val="solid"/>
+                      <a:round/>
+                      <a:headEnd type="none" w="med" len="med"/>
+                      <a:tailEnd type="none" w="med" len="med"/>
+                    </a:lnR>
+                    <a:lnT w="3175" cap="flat" cmpd="sng" algn="ctr">
+                      <a:solidFill>
+                        <a:schemeClr val="bg1"/>
+                      </a:solidFill>
+                      <a:prstDash val="solid"/>
+                      <a:round/>
+                      <a:headEnd type="none" w="med" len="med"/>
+                      <a:tailEnd type="none" w="med" len="med"/>
+                    </a:lnT>
+                    <a:lnB w="3175" cap="flat" cmpd="sng" algn="ctr">
+                      <a:solidFill>
+                        <a:schemeClr val="bg1"/>
+                      </a:solidFill>
+                      <a:prstDash val="solid"/>
+                      <a:round/>
+                      <a:headEnd type="none" w="med" len="med"/>
+                      <a:tailEnd type="none" w="med" len="med"/>
+                    </a:lnB>
+                    <a:lnTlToBr w="12700" cmpd="sng">
+                      <a:noFill/>
+                      <a:prstDash val="solid"/>
+                    </a:lnTlToBr>
+                    <a:lnBlToTr w="12700" cmpd="sng">
+                      <a:noFill/>
+                      <a:prstDash val="solid"/>
+                    </a:lnBlToTr>
+                    <a:noFill/>
+                  </a:tcPr>
+                </a:tc>
+                <a:extLst>
+                  <a:ext uri="{0D108BD9-81ED-4DB2-BD59-A6C34878D82A}">
+                    <a16:rowId xmlns:a16="http://schemas.microsoft.com/office/drawing/2014/main" val="1629255420"/>
+                  </a:ext>
+                </a:extLst>
+              </a:tr>
+              <a:tr h="174857">
+                <a:tc>
+                  <a:txBody>
+                    <a:bodyPr/>
+                    <a:lstStyle/>
+                    <a:p>
+                      <a:r>
+                        <a:rPr lang="zh-TW" altLang="en-US" sz="600" dirty="0">
+                          <a:solidFill>
+                            <a:schemeClr val="bg1"/>
+                          </a:solidFill>
+                          <a:latin typeface="源樣明體 SB" panose="02020600000000000000" pitchFamily="18" charset="-120"/>
+                          <a:ea typeface="源樣明體 SB" panose="02020600000000000000" pitchFamily="18" charset="-120"/>
+                        </a:rPr>
+                        <a:t>碰撞箱</a:t>
+                      </a:r>
+                      <a:endParaRPr lang="en-US" sz="600" dirty="0">
+                        <a:solidFill>
+                          <a:schemeClr val="bg1"/>
+                        </a:solidFill>
+                        <a:latin typeface="源樣明體 SB" panose="02020600000000000000" pitchFamily="18" charset="-120"/>
+                        <a:ea typeface="源樣明體 SB" panose="02020600000000000000" pitchFamily="18" charset="-120"/>
+                      </a:endParaRPr>
+                    </a:p>
+                  </a:txBody>
+                  <a:tcPr>
+                    <a:lnL w="3175" cap="flat" cmpd="sng" algn="ctr">
+                      <a:solidFill>
+                        <a:schemeClr val="bg1"/>
+                      </a:solidFill>
+                      <a:prstDash val="solid"/>
+                      <a:round/>
+                      <a:headEnd type="none" w="med" len="med"/>
+                      <a:tailEnd type="none" w="med" len="med"/>
+                    </a:lnL>
+                    <a:lnR w="3175" cap="flat" cmpd="sng" algn="ctr">
+                      <a:solidFill>
+                        <a:schemeClr val="bg1"/>
+                      </a:solidFill>
+                      <a:prstDash val="solid"/>
+                      <a:round/>
+                      <a:headEnd type="none" w="med" len="med"/>
+                      <a:tailEnd type="none" w="med" len="med"/>
+                    </a:lnR>
+                    <a:lnT w="3175" cap="flat" cmpd="sng" algn="ctr">
+                      <a:solidFill>
+                        <a:schemeClr val="bg1"/>
+                      </a:solidFill>
+                      <a:prstDash val="solid"/>
+                      <a:round/>
+                      <a:headEnd type="none" w="med" len="med"/>
+                      <a:tailEnd type="none" w="med" len="med"/>
+                    </a:lnT>
+                    <a:lnB w="3175" cap="flat" cmpd="sng" algn="ctr">
+                      <a:solidFill>
+                        <a:schemeClr val="bg1"/>
+                      </a:solidFill>
+                      <a:prstDash val="solid"/>
+                      <a:round/>
+                      <a:headEnd type="none" w="med" len="med"/>
+                      <a:tailEnd type="none" w="med" len="med"/>
+                    </a:lnB>
+                    <a:lnTlToBr w="12700" cmpd="sng">
+                      <a:noFill/>
+                      <a:prstDash val="solid"/>
+                    </a:lnTlToBr>
+                    <a:lnBlToTr w="12700" cmpd="sng">
+                      <a:noFill/>
+                      <a:prstDash val="solid"/>
+                    </a:lnBlToTr>
+                    <a:noFill/>
+                  </a:tcPr>
+                </a:tc>
+                <a:tc>
+                  <a:txBody>
+                    <a:bodyPr/>
+                    <a:lstStyle/>
+                    <a:p>
+                      <a:pPr algn="ctr"/>
+                      <a:r>
+                        <a:rPr lang="zh-TW" altLang="en-US" sz="600" dirty="0">
+                          <a:solidFill>
+                            <a:schemeClr val="bg1"/>
+                          </a:solidFill>
+                          <a:latin typeface="源樣明體 SB" panose="02020600000000000000" pitchFamily="18" charset="-120"/>
+                          <a:ea typeface="源樣明體 SB" panose="02020600000000000000" pitchFamily="18" charset="-120"/>
+                        </a:rPr>
+                        <a:t>約 </a:t>
+                      </a:r>
+                      <a:r>
+                        <a:rPr lang="en-US" altLang="zh-TW" sz="600" dirty="0">
+                          <a:solidFill>
+                            <a:schemeClr val="bg1"/>
+                          </a:solidFill>
+                          <a:latin typeface="源樣明體 SB" panose="02020600000000000000" pitchFamily="18" charset="-120"/>
+                          <a:ea typeface="源樣明體 SB" panose="02020600000000000000" pitchFamily="18" charset="-120"/>
+                        </a:rPr>
+                        <a:t>2 </a:t>
+                      </a:r>
+                      <a:r>
+                        <a:rPr lang="zh-TW" altLang="en-US" sz="600" dirty="0">
+                          <a:solidFill>
+                            <a:schemeClr val="bg1"/>
+                          </a:solidFill>
+                          <a:latin typeface="源樣明體 SB" panose="02020600000000000000" pitchFamily="18" charset="-120"/>
+                          <a:ea typeface="源樣明體 SB" panose="02020600000000000000" pitchFamily="18" charset="-120"/>
+                        </a:rPr>
+                        <a:t>小時</a:t>
+                      </a:r>
+                      <a:endParaRPr lang="en-US" sz="600" dirty="0">
+                        <a:solidFill>
+                          <a:schemeClr val="bg1"/>
+                        </a:solidFill>
+                        <a:latin typeface="源樣明體 SB" panose="02020600000000000000" pitchFamily="18" charset="-120"/>
+                        <a:ea typeface="源樣明體 SB" panose="02020600000000000000" pitchFamily="18" charset="-120"/>
+                      </a:endParaRPr>
+                    </a:p>
+                  </a:txBody>
+                  <a:tcPr>
+                    <a:lnL w="3175" cap="flat" cmpd="sng" algn="ctr">
+                      <a:solidFill>
+                        <a:schemeClr val="bg1"/>
+                      </a:solidFill>
+                      <a:prstDash val="solid"/>
+                      <a:round/>
+                      <a:headEnd type="none" w="med" len="med"/>
+                      <a:tailEnd type="none" w="med" len="med"/>
+                    </a:lnL>
+                    <a:lnR w="3175" cap="flat" cmpd="sng" algn="ctr">
+                      <a:solidFill>
+                        <a:schemeClr val="bg1"/>
+                      </a:solidFill>
+                      <a:prstDash val="solid"/>
+                      <a:round/>
+                      <a:headEnd type="none" w="med" len="med"/>
+                      <a:tailEnd type="none" w="med" len="med"/>
+                    </a:lnR>
+                    <a:lnT w="3175" cap="flat" cmpd="sng" algn="ctr">
+                      <a:solidFill>
+                        <a:schemeClr val="bg1"/>
+                      </a:solidFill>
+                      <a:prstDash val="solid"/>
+                      <a:round/>
+                      <a:headEnd type="none" w="med" len="med"/>
+                      <a:tailEnd type="none" w="med" len="med"/>
+                    </a:lnT>
+                    <a:lnB w="3175" cap="flat" cmpd="sng" algn="ctr">
+                      <a:solidFill>
+                        <a:schemeClr val="bg1"/>
+                      </a:solidFill>
+                      <a:prstDash val="solid"/>
+                      <a:round/>
+                      <a:headEnd type="none" w="med" len="med"/>
+                      <a:tailEnd type="none" w="med" len="med"/>
+                    </a:lnB>
+                    <a:lnTlToBr w="12700" cmpd="sng">
+                      <a:noFill/>
+                      <a:prstDash val="solid"/>
+                    </a:lnTlToBr>
+                    <a:lnBlToTr w="12700" cmpd="sng">
+                      <a:noFill/>
+                      <a:prstDash val="solid"/>
+                    </a:lnBlToTr>
+                    <a:noFill/>
+                  </a:tcPr>
+                </a:tc>
+                <a:extLst>
+                  <a:ext uri="{0D108BD9-81ED-4DB2-BD59-A6C34878D82A}">
+                    <a16:rowId xmlns:a16="http://schemas.microsoft.com/office/drawing/2014/main" val="4181133297"/>
+                  </a:ext>
+                </a:extLst>
+              </a:tr>
+              <a:tr h="174857">
+                <a:tc>
+                  <a:txBody>
+                    <a:bodyPr/>
+                    <a:lstStyle/>
+                    <a:p>
+                      <a:r>
+                        <a:rPr lang="zh-TW" altLang="en-US" sz="600" dirty="0">
+                          <a:solidFill>
+                            <a:schemeClr val="bg1"/>
+                          </a:solidFill>
+                          <a:latin typeface="源樣明體 SB" panose="02020600000000000000" pitchFamily="18" charset="-120"/>
+                          <a:ea typeface="源樣明體 SB" panose="02020600000000000000" pitchFamily="18" charset="-120"/>
+                        </a:rPr>
+                        <a:t>音樂美術</a:t>
+                      </a:r>
+                      <a:endParaRPr lang="en-US" sz="600" dirty="0">
+                        <a:solidFill>
+                          <a:schemeClr val="bg1"/>
+                        </a:solidFill>
+                        <a:latin typeface="源樣明體 SB" panose="02020600000000000000" pitchFamily="18" charset="-120"/>
+                        <a:ea typeface="源樣明體 SB" panose="02020600000000000000" pitchFamily="18" charset="-120"/>
+                      </a:endParaRPr>
+                    </a:p>
+                  </a:txBody>
+                  <a:tcPr>
+                    <a:lnL w="3175" cap="flat" cmpd="sng" algn="ctr">
+                      <a:solidFill>
+                        <a:schemeClr val="bg1"/>
+                      </a:solidFill>
+                      <a:prstDash val="solid"/>
+                      <a:round/>
+                      <a:headEnd type="none" w="med" len="med"/>
+                      <a:tailEnd type="none" w="med" len="med"/>
+                    </a:lnL>
+                    <a:lnR w="3175" cap="flat" cmpd="sng" algn="ctr">
+                      <a:solidFill>
+                        <a:schemeClr val="bg1"/>
+                      </a:solidFill>
+                      <a:prstDash val="solid"/>
+                      <a:round/>
+                      <a:headEnd type="none" w="med" len="med"/>
+                      <a:tailEnd type="none" w="med" len="med"/>
+                    </a:lnR>
+                    <a:lnT w="3175" cap="flat" cmpd="sng" algn="ctr">
+                      <a:solidFill>
+                        <a:schemeClr val="bg1"/>
+                      </a:solidFill>
+                      <a:prstDash val="solid"/>
+                      <a:round/>
+                      <a:headEnd type="none" w="med" len="med"/>
+                      <a:tailEnd type="none" w="med" len="med"/>
+                    </a:lnT>
+                    <a:lnB w="3175" cap="flat" cmpd="sng" algn="ctr">
+                      <a:solidFill>
+                        <a:schemeClr val="bg1"/>
+                      </a:solidFill>
+                      <a:prstDash val="solid"/>
+                      <a:round/>
+                      <a:headEnd type="none" w="med" len="med"/>
+                      <a:tailEnd type="none" w="med" len="med"/>
+                    </a:lnB>
+                    <a:lnTlToBr w="12700" cmpd="sng">
+                      <a:noFill/>
+                      <a:prstDash val="solid"/>
+                    </a:lnTlToBr>
+                    <a:lnBlToTr w="12700" cmpd="sng">
+                      <a:noFill/>
+                      <a:prstDash val="solid"/>
+                    </a:lnBlToTr>
+                    <a:noFill/>
+                  </a:tcPr>
+                </a:tc>
+                <a:tc>
+                  <a:txBody>
+                    <a:bodyPr/>
+                    <a:lstStyle/>
+                    <a:p>
+                      <a:pPr algn="ctr"/>
+                      <a:r>
+                        <a:rPr lang="zh-TW" altLang="en-US" sz="600" dirty="0">
+                          <a:solidFill>
+                            <a:schemeClr val="bg1"/>
+                          </a:solidFill>
+                          <a:latin typeface="源樣明體 SB" panose="02020600000000000000" pitchFamily="18" charset="-120"/>
+                          <a:ea typeface="源樣明體 SB" panose="02020600000000000000" pitchFamily="18" charset="-120"/>
+                        </a:rPr>
+                        <a:t>約 </a:t>
+                      </a:r>
+                      <a:r>
+                        <a:rPr lang="en-US" altLang="zh-TW" sz="600" dirty="0">
+                          <a:solidFill>
+                            <a:schemeClr val="bg1"/>
+                          </a:solidFill>
+                          <a:latin typeface="源樣明體 SB" panose="02020600000000000000" pitchFamily="18" charset="-120"/>
+                          <a:ea typeface="源樣明體 SB" panose="02020600000000000000" pitchFamily="18" charset="-120"/>
+                        </a:rPr>
+                        <a:t>2</a:t>
+                      </a:r>
+                      <a:r>
+                        <a:rPr lang="zh-TW" altLang="en-US" sz="600" dirty="0">
+                          <a:solidFill>
+                            <a:schemeClr val="bg1"/>
+                          </a:solidFill>
+                          <a:latin typeface="源樣明體 SB" panose="02020600000000000000" pitchFamily="18" charset="-120"/>
+                          <a:ea typeface="源樣明體 SB" panose="02020600000000000000" pitchFamily="18" charset="-120"/>
+                        </a:rPr>
+                        <a:t> 小時</a:t>
+                      </a:r>
+                      <a:endParaRPr lang="en-US" sz="600" dirty="0">
+                        <a:solidFill>
+                          <a:schemeClr val="bg1"/>
+                        </a:solidFill>
+                        <a:latin typeface="源樣明體 SB" panose="02020600000000000000" pitchFamily="18" charset="-120"/>
+                        <a:ea typeface="源樣明體 SB" panose="02020600000000000000" pitchFamily="18" charset="-120"/>
+                      </a:endParaRPr>
+                    </a:p>
+                  </a:txBody>
+                  <a:tcPr>
+                    <a:lnL w="3175" cap="flat" cmpd="sng" algn="ctr">
+                      <a:solidFill>
+                        <a:schemeClr val="bg1"/>
+                      </a:solidFill>
+                      <a:prstDash val="solid"/>
+                      <a:round/>
+                      <a:headEnd type="none" w="med" len="med"/>
+                      <a:tailEnd type="none" w="med" len="med"/>
+                    </a:lnL>
+                    <a:lnR w="3175" cap="flat" cmpd="sng" algn="ctr">
+                      <a:solidFill>
+                        <a:schemeClr val="bg1"/>
+                      </a:solidFill>
+                      <a:prstDash val="solid"/>
+                      <a:round/>
+                      <a:headEnd type="none" w="med" len="med"/>
+                      <a:tailEnd type="none" w="med" len="med"/>
+                    </a:lnR>
+                    <a:lnT w="3175" cap="flat" cmpd="sng" algn="ctr">
+                      <a:solidFill>
+                        <a:schemeClr val="bg1"/>
+                      </a:solidFill>
+                      <a:prstDash val="solid"/>
+                      <a:round/>
+                      <a:headEnd type="none" w="med" len="med"/>
+                      <a:tailEnd type="none" w="med" len="med"/>
+                    </a:lnT>
+                    <a:lnB w="3175" cap="flat" cmpd="sng" algn="ctr">
+                      <a:solidFill>
+                        <a:schemeClr val="bg1"/>
+                      </a:solidFill>
+                      <a:prstDash val="solid"/>
+                      <a:round/>
+                      <a:headEnd type="none" w="med" len="med"/>
+                      <a:tailEnd type="none" w="med" len="med"/>
+                    </a:lnB>
+                    <a:lnTlToBr w="12700" cmpd="sng">
+                      <a:noFill/>
+                      <a:prstDash val="solid"/>
+                    </a:lnTlToBr>
+                    <a:lnBlToTr w="12700" cmpd="sng">
+                      <a:noFill/>
+                      <a:prstDash val="solid"/>
+                    </a:lnBlToTr>
+                    <a:noFill/>
+                  </a:tcPr>
+                </a:tc>
+                <a:extLst>
+                  <a:ext uri="{0D108BD9-81ED-4DB2-BD59-A6C34878D82A}">
+                    <a16:rowId xmlns:a16="http://schemas.microsoft.com/office/drawing/2014/main" val="1360963369"/>
+                  </a:ext>
+                </a:extLst>
+              </a:tr>
+              <a:tr h="174857">
+                <a:tc>
+                  <a:txBody>
+                    <a:bodyPr/>
+                    <a:lstStyle/>
+                    <a:p>
+                      <a:r>
+                        <a:rPr lang="zh-TW" altLang="en-US" sz="600" i="1" strike="sngStrike" dirty="0">
+                          <a:solidFill>
+                            <a:schemeClr val="bg1"/>
+                          </a:solidFill>
+                          <a:latin typeface="源樣明體 SB" panose="02020600000000000000" pitchFamily="18" charset="-120"/>
+                          <a:ea typeface="源樣明體 SB" panose="02020600000000000000" pitchFamily="18" charset="-120"/>
+                        </a:rPr>
+                        <a:t>偽 </a:t>
+                      </a:r>
+                      <a:r>
+                        <a:rPr lang="zh-TW" altLang="en-US" sz="600" i="1" strike="noStrike" dirty="0">
+                          <a:solidFill>
+                            <a:schemeClr val="bg1"/>
+                          </a:solidFill>
+                          <a:latin typeface="源樣明體 SB" panose="02020600000000000000" pitchFamily="18" charset="-120"/>
+                          <a:ea typeface="源樣明體 SB" panose="02020600000000000000" pitchFamily="18" charset="-120"/>
+                        </a:rPr>
+                        <a:t> </a:t>
+                      </a:r>
+                      <a:r>
+                        <a:rPr lang="en-US" altLang="zh-TW" sz="600" dirty="0">
+                          <a:solidFill>
+                            <a:schemeClr val="bg1"/>
+                          </a:solidFill>
+                          <a:latin typeface="源樣明體 SB" panose="02020600000000000000" pitchFamily="18" charset="-120"/>
+                          <a:ea typeface="源樣明體 SB" panose="02020600000000000000" pitchFamily="18" charset="-120"/>
+                        </a:rPr>
+                        <a:t>Q-Learning</a:t>
+                      </a:r>
+                      <a:endParaRPr lang="en-US" sz="600" dirty="0">
+                        <a:solidFill>
+                          <a:schemeClr val="bg1"/>
+                        </a:solidFill>
+                        <a:latin typeface="源樣明體 SB" panose="02020600000000000000" pitchFamily="18" charset="-120"/>
+                        <a:ea typeface="源樣明體 SB" panose="02020600000000000000" pitchFamily="18" charset="-120"/>
+                      </a:endParaRPr>
+                    </a:p>
+                  </a:txBody>
+                  <a:tcPr>
+                    <a:lnL w="3175" cap="flat" cmpd="sng" algn="ctr">
+                      <a:solidFill>
+                        <a:schemeClr val="bg1"/>
+                      </a:solidFill>
+                      <a:prstDash val="solid"/>
+                      <a:round/>
+                      <a:headEnd type="none" w="med" len="med"/>
+                      <a:tailEnd type="none" w="med" len="med"/>
+                    </a:lnL>
+                    <a:lnR w="3175" cap="flat" cmpd="sng" algn="ctr">
+                      <a:solidFill>
+                        <a:schemeClr val="bg1"/>
+                      </a:solidFill>
+                      <a:prstDash val="solid"/>
+                      <a:round/>
+                      <a:headEnd type="none" w="med" len="med"/>
+                      <a:tailEnd type="none" w="med" len="med"/>
+                    </a:lnR>
+                    <a:lnT w="3175" cap="flat" cmpd="sng" algn="ctr">
+                      <a:solidFill>
+                        <a:schemeClr val="bg1"/>
+                      </a:solidFill>
+                      <a:prstDash val="solid"/>
+                      <a:round/>
+                      <a:headEnd type="none" w="med" len="med"/>
+                      <a:tailEnd type="none" w="med" len="med"/>
+                    </a:lnT>
+                    <a:lnB w="3175" cap="flat" cmpd="sng" algn="ctr">
+                      <a:solidFill>
+                        <a:schemeClr val="bg1"/>
+                      </a:solidFill>
+                      <a:prstDash val="solid"/>
+                      <a:round/>
+                      <a:headEnd type="none" w="med" len="med"/>
+                      <a:tailEnd type="none" w="med" len="med"/>
+                    </a:lnB>
+                    <a:lnTlToBr w="12700" cmpd="sng">
+                      <a:noFill/>
+                      <a:prstDash val="solid"/>
+                    </a:lnTlToBr>
+                    <a:lnBlToTr w="12700" cmpd="sng">
+                      <a:noFill/>
+                      <a:prstDash val="solid"/>
+                    </a:lnBlToTr>
+                    <a:noFill/>
+                  </a:tcPr>
+                </a:tc>
+                <a:tc>
+                  <a:txBody>
+                    <a:bodyPr/>
+                    <a:lstStyle/>
+                    <a:p>
+                      <a:pPr algn="ctr"/>
+                      <a:r>
+                        <a:rPr lang="zh-TW" altLang="en-US" sz="600" dirty="0">
+                          <a:solidFill>
+                            <a:schemeClr val="bg1"/>
+                          </a:solidFill>
+                          <a:latin typeface="源樣明體 SB" panose="02020600000000000000" pitchFamily="18" charset="-120"/>
+                          <a:ea typeface="源樣明體 SB" panose="02020600000000000000" pitchFamily="18" charset="-120"/>
+                        </a:rPr>
+                        <a:t>約 </a:t>
+                      </a:r>
+                      <a:r>
+                        <a:rPr lang="en-US" altLang="zh-TW" sz="600" dirty="0">
+                          <a:solidFill>
+                            <a:schemeClr val="bg1"/>
+                          </a:solidFill>
+                          <a:latin typeface="源樣明體 SB" panose="02020600000000000000" pitchFamily="18" charset="-120"/>
+                          <a:ea typeface="源樣明體 SB" panose="02020600000000000000" pitchFamily="18" charset="-120"/>
+                        </a:rPr>
+                        <a:t>10 </a:t>
+                      </a:r>
+                      <a:r>
+                        <a:rPr lang="zh-TW" altLang="en-US" sz="600" dirty="0">
+                          <a:solidFill>
+                            <a:schemeClr val="bg1"/>
+                          </a:solidFill>
+                          <a:latin typeface="源樣明體 SB" panose="02020600000000000000" pitchFamily="18" charset="-120"/>
+                          <a:ea typeface="源樣明體 SB" panose="02020600000000000000" pitchFamily="18" charset="-120"/>
+                        </a:rPr>
+                        <a:t>小時</a:t>
+                      </a:r>
+                      <a:endParaRPr lang="en-US" sz="600" dirty="0">
+                        <a:solidFill>
+                          <a:schemeClr val="bg1"/>
+                        </a:solidFill>
+                        <a:latin typeface="源樣明體 SB" panose="02020600000000000000" pitchFamily="18" charset="-120"/>
+                        <a:ea typeface="源樣明體 SB" panose="02020600000000000000" pitchFamily="18" charset="-120"/>
+                      </a:endParaRPr>
+                    </a:p>
+                  </a:txBody>
+                  <a:tcPr>
+                    <a:lnL w="3175" cap="flat" cmpd="sng" algn="ctr">
+                      <a:solidFill>
+                        <a:schemeClr val="bg1"/>
+                      </a:solidFill>
+                      <a:prstDash val="solid"/>
+                      <a:round/>
+                      <a:headEnd type="none" w="med" len="med"/>
+                      <a:tailEnd type="none" w="med" len="med"/>
+                    </a:lnL>
+                    <a:lnR w="3175" cap="flat" cmpd="sng" algn="ctr">
+                      <a:solidFill>
+                        <a:schemeClr val="bg1"/>
+                      </a:solidFill>
+                      <a:prstDash val="solid"/>
+                      <a:round/>
+                      <a:headEnd type="none" w="med" len="med"/>
+                      <a:tailEnd type="none" w="med" len="med"/>
+                    </a:lnR>
+                    <a:lnT w="3175" cap="flat" cmpd="sng" algn="ctr">
+                      <a:solidFill>
+                        <a:schemeClr val="bg1"/>
+                      </a:solidFill>
+                      <a:prstDash val="solid"/>
+                      <a:round/>
+                      <a:headEnd type="none" w="med" len="med"/>
+                      <a:tailEnd type="none" w="med" len="med"/>
+                    </a:lnT>
+                    <a:lnB w="3175" cap="flat" cmpd="sng" algn="ctr">
+                      <a:solidFill>
+                        <a:schemeClr val="bg1"/>
+                      </a:solidFill>
+                      <a:prstDash val="solid"/>
+                      <a:round/>
+                      <a:headEnd type="none" w="med" len="med"/>
+                      <a:tailEnd type="none" w="med" len="med"/>
+                    </a:lnB>
+                    <a:lnTlToBr w="12700" cmpd="sng">
+                      <a:noFill/>
+                      <a:prstDash val="solid"/>
+                    </a:lnTlToBr>
+                    <a:lnBlToTr w="12700" cmpd="sng">
+                      <a:noFill/>
+                      <a:prstDash val="solid"/>
+                    </a:lnBlToTr>
+                    <a:noFill/>
+                  </a:tcPr>
+                </a:tc>
+                <a:extLst>
+                  <a:ext uri="{0D108BD9-81ED-4DB2-BD59-A6C34878D82A}">
+                    <a16:rowId xmlns:a16="http://schemas.microsoft.com/office/drawing/2014/main" val="2530873916"/>
+                  </a:ext>
+                </a:extLst>
+              </a:tr>
+              <a:tr h="174857">
+                <a:tc>
+                  <a:txBody>
+                    <a:bodyPr/>
+                    <a:lstStyle/>
+                    <a:p>
+                      <a:r>
+                        <a:rPr lang="en-US" altLang="zh-TW" sz="600" dirty="0">
+                          <a:solidFill>
+                            <a:schemeClr val="bg1"/>
+                          </a:solidFill>
+                          <a:latin typeface="源樣明體 SB" panose="02020600000000000000" pitchFamily="18" charset="-120"/>
+                          <a:ea typeface="源樣明體 SB" panose="02020600000000000000" pitchFamily="18" charset="-120"/>
+                        </a:rPr>
+                        <a:t>UI</a:t>
+                      </a:r>
+                      <a:r>
+                        <a:rPr lang="zh-TW" altLang="en-US" sz="600" dirty="0">
+                          <a:solidFill>
+                            <a:schemeClr val="bg1"/>
+                          </a:solidFill>
+                          <a:latin typeface="源樣明體 SB" panose="02020600000000000000" pitchFamily="18" charset="-120"/>
+                          <a:ea typeface="源樣明體 SB" panose="02020600000000000000" pitchFamily="18" charset="-120"/>
+                        </a:rPr>
+                        <a:t> 介面</a:t>
+                      </a:r>
+                      <a:r>
+                        <a:rPr lang="en-US" altLang="zh-TW" sz="600" dirty="0">
+                          <a:solidFill>
+                            <a:schemeClr val="bg1"/>
+                          </a:solidFill>
+                          <a:latin typeface="源樣明體 SB" panose="02020600000000000000" pitchFamily="18" charset="-120"/>
+                          <a:ea typeface="源樣明體 SB" panose="02020600000000000000" pitchFamily="18" charset="-120"/>
+                        </a:rPr>
+                        <a:t>&amp;</a:t>
+                      </a:r>
+                      <a:r>
+                        <a:rPr lang="zh-TW" altLang="en-US" sz="600" dirty="0">
+                          <a:solidFill>
+                            <a:schemeClr val="bg1"/>
+                          </a:solidFill>
+                          <a:latin typeface="源樣明體 SB" panose="02020600000000000000" pitchFamily="18" charset="-120"/>
+                          <a:ea typeface="源樣明體 SB" panose="02020600000000000000" pitchFamily="18" charset="-120"/>
+                        </a:rPr>
+                        <a:t>場景轉換</a:t>
+                      </a:r>
+                      <a:endParaRPr lang="en-US" sz="600" dirty="0">
+                        <a:solidFill>
+                          <a:schemeClr val="bg1"/>
+                        </a:solidFill>
+                        <a:latin typeface="源樣明體 SB" panose="02020600000000000000" pitchFamily="18" charset="-120"/>
+                        <a:ea typeface="源樣明體 SB" panose="02020600000000000000" pitchFamily="18" charset="-120"/>
+                      </a:endParaRPr>
+                    </a:p>
+                  </a:txBody>
+                  <a:tcPr>
+                    <a:lnL w="3175" cap="flat" cmpd="sng" algn="ctr">
+                      <a:solidFill>
+                        <a:schemeClr val="bg1"/>
+                      </a:solidFill>
+                      <a:prstDash val="solid"/>
+                      <a:round/>
+                      <a:headEnd type="none" w="med" len="med"/>
+                      <a:tailEnd type="none" w="med" len="med"/>
+                    </a:lnL>
+                    <a:lnR w="3175" cap="flat" cmpd="sng" algn="ctr">
+                      <a:solidFill>
+                        <a:schemeClr val="bg1"/>
+                      </a:solidFill>
+                      <a:prstDash val="solid"/>
+                      <a:round/>
+                      <a:headEnd type="none" w="med" len="med"/>
+                      <a:tailEnd type="none" w="med" len="med"/>
+                    </a:lnR>
+                    <a:lnT w="3175" cap="flat" cmpd="sng" algn="ctr">
+                      <a:solidFill>
+                        <a:schemeClr val="bg1"/>
+                      </a:solidFill>
+                      <a:prstDash val="solid"/>
+                      <a:round/>
+                      <a:headEnd type="none" w="med" len="med"/>
+                      <a:tailEnd type="none" w="med" len="med"/>
+                    </a:lnT>
+                    <a:lnB w="3175" cap="flat" cmpd="sng" algn="ctr">
+                      <a:solidFill>
+                        <a:schemeClr val="bg1"/>
+                      </a:solidFill>
+                      <a:prstDash val="solid"/>
+                      <a:round/>
+                      <a:headEnd type="none" w="med" len="med"/>
+                      <a:tailEnd type="none" w="med" len="med"/>
+                    </a:lnB>
+                    <a:lnTlToBr w="12700" cmpd="sng">
+                      <a:noFill/>
+                      <a:prstDash val="solid"/>
+                    </a:lnTlToBr>
+                    <a:lnBlToTr w="12700" cmpd="sng">
+                      <a:noFill/>
+                      <a:prstDash val="solid"/>
+                    </a:lnBlToTr>
+                    <a:noFill/>
+                  </a:tcPr>
+                </a:tc>
+                <a:tc>
+                  <a:txBody>
+                    <a:bodyPr/>
+                    <a:lstStyle/>
+                    <a:p>
+                      <a:pPr algn="ctr"/>
+                      <a:r>
+                        <a:rPr lang="zh-TW" altLang="en-US" sz="600" dirty="0">
+                          <a:solidFill>
+                            <a:schemeClr val="bg1"/>
+                          </a:solidFill>
+                          <a:latin typeface="源樣明體 SB" panose="02020600000000000000" pitchFamily="18" charset="-120"/>
+                          <a:ea typeface="源樣明體 SB" panose="02020600000000000000" pitchFamily="18" charset="-120"/>
+                        </a:rPr>
+                        <a:t>約 </a:t>
+                      </a:r>
+                      <a:r>
+                        <a:rPr lang="en-US" altLang="zh-TW" sz="600" dirty="0">
+                          <a:solidFill>
+                            <a:schemeClr val="bg1"/>
+                          </a:solidFill>
+                          <a:latin typeface="源樣明體 SB" panose="02020600000000000000" pitchFamily="18" charset="-120"/>
+                          <a:ea typeface="源樣明體 SB" panose="02020600000000000000" pitchFamily="18" charset="-120"/>
+                        </a:rPr>
+                        <a:t>30 </a:t>
+                      </a:r>
+                      <a:r>
+                        <a:rPr lang="zh-TW" altLang="en-US" sz="600" dirty="0">
+                          <a:solidFill>
+                            <a:schemeClr val="bg1"/>
+                          </a:solidFill>
+                          <a:latin typeface="源樣明體 SB" panose="02020600000000000000" pitchFamily="18" charset="-120"/>
+                          <a:ea typeface="源樣明體 SB" panose="02020600000000000000" pitchFamily="18" charset="-120"/>
+                        </a:rPr>
+                        <a:t>小時</a:t>
+                      </a:r>
+                      <a:endParaRPr lang="en-US" sz="600" dirty="0">
+                        <a:solidFill>
+                          <a:schemeClr val="bg1"/>
+                        </a:solidFill>
+                        <a:latin typeface="源樣明體 SB" panose="02020600000000000000" pitchFamily="18" charset="-120"/>
+                        <a:ea typeface="源樣明體 SB" panose="02020600000000000000" pitchFamily="18" charset="-120"/>
+                      </a:endParaRPr>
+                    </a:p>
+                  </a:txBody>
+                  <a:tcPr>
+                    <a:lnL w="3175" cap="flat" cmpd="sng" algn="ctr">
+                      <a:solidFill>
+                        <a:schemeClr val="bg1"/>
+                      </a:solidFill>
+                      <a:prstDash val="solid"/>
+                      <a:round/>
+                      <a:headEnd type="none" w="med" len="med"/>
+                      <a:tailEnd type="none" w="med" len="med"/>
+                    </a:lnL>
+                    <a:lnR w="3175" cap="flat" cmpd="sng" algn="ctr">
+                      <a:solidFill>
+                        <a:schemeClr val="bg1"/>
+                      </a:solidFill>
+                      <a:prstDash val="solid"/>
+                      <a:round/>
+                      <a:headEnd type="none" w="med" len="med"/>
+                      <a:tailEnd type="none" w="med" len="med"/>
+                    </a:lnR>
+                    <a:lnT w="3175" cap="flat" cmpd="sng" algn="ctr">
+                      <a:solidFill>
+                        <a:schemeClr val="bg1"/>
+                      </a:solidFill>
+                      <a:prstDash val="solid"/>
+                      <a:round/>
+                      <a:headEnd type="none" w="med" len="med"/>
+                      <a:tailEnd type="none" w="med" len="med"/>
+                    </a:lnT>
+                    <a:lnB w="3175" cap="flat" cmpd="sng" algn="ctr">
+                      <a:solidFill>
+                        <a:schemeClr val="bg1"/>
+                      </a:solidFill>
+                      <a:prstDash val="solid"/>
+                      <a:round/>
+                      <a:headEnd type="none" w="med" len="med"/>
+                      <a:tailEnd type="none" w="med" len="med"/>
+                    </a:lnB>
+                    <a:lnTlToBr w="12700" cmpd="sng">
+                      <a:noFill/>
+                      <a:prstDash val="solid"/>
+                    </a:lnTlToBr>
+                    <a:lnBlToTr w="12700" cmpd="sng">
+                      <a:noFill/>
+                      <a:prstDash val="solid"/>
+                    </a:lnBlToTr>
+                    <a:noFill/>
+                  </a:tcPr>
+                </a:tc>
+                <a:extLst>
+                  <a:ext uri="{0D108BD9-81ED-4DB2-BD59-A6C34878D82A}">
+                    <a16:rowId xmlns:a16="http://schemas.microsoft.com/office/drawing/2014/main" val="4201908353"/>
+                  </a:ext>
+                </a:extLst>
+              </a:tr>
+              <a:tr h="174857">
+                <a:tc>
+                  <a:txBody>
+                    <a:bodyPr/>
+                    <a:lstStyle/>
+                    <a:p>
+                      <a:r>
+                        <a:rPr lang="zh-TW" altLang="en-US" sz="600" dirty="0">
+                          <a:solidFill>
+                            <a:schemeClr val="bg1"/>
+                          </a:solidFill>
+                          <a:latin typeface="源樣明體 SB" panose="02020600000000000000" pitchFamily="18" charset="-120"/>
+                          <a:ea typeface="源樣明體 SB" panose="02020600000000000000" pitchFamily="18" charset="-120"/>
+                        </a:rPr>
+                        <a:t>對話</a:t>
+                      </a:r>
+                      <a:endParaRPr lang="en-US" sz="600" dirty="0">
+                        <a:solidFill>
+                          <a:schemeClr val="bg1"/>
+                        </a:solidFill>
+                        <a:latin typeface="源樣明體 SB" panose="02020600000000000000" pitchFamily="18" charset="-120"/>
+                        <a:ea typeface="源樣明體 SB" panose="02020600000000000000" pitchFamily="18" charset="-120"/>
+                      </a:endParaRPr>
+                    </a:p>
+                  </a:txBody>
+                  <a:tcPr>
+                    <a:lnL w="3175" cap="flat" cmpd="sng" algn="ctr">
+                      <a:solidFill>
+                        <a:schemeClr val="bg1"/>
+                      </a:solidFill>
+                      <a:prstDash val="solid"/>
+                      <a:round/>
+                      <a:headEnd type="none" w="med" len="med"/>
+                      <a:tailEnd type="none" w="med" len="med"/>
+                    </a:lnL>
+                    <a:lnR w="3175" cap="flat" cmpd="sng" algn="ctr">
+                      <a:solidFill>
+                        <a:schemeClr val="bg1"/>
+                      </a:solidFill>
+                      <a:prstDash val="solid"/>
+                      <a:round/>
+                      <a:headEnd type="none" w="med" len="med"/>
+                      <a:tailEnd type="none" w="med" len="med"/>
+                    </a:lnR>
+                    <a:lnT w="3175" cap="flat" cmpd="sng" algn="ctr">
+                      <a:solidFill>
+                        <a:schemeClr val="bg1"/>
+                      </a:solidFill>
+                      <a:prstDash val="solid"/>
+                      <a:round/>
+                      <a:headEnd type="none" w="med" len="med"/>
+                      <a:tailEnd type="none" w="med" len="med"/>
+                    </a:lnT>
+                    <a:lnB w="3175" cap="flat" cmpd="sng" algn="ctr">
+                      <a:solidFill>
+                        <a:schemeClr val="bg1"/>
+                      </a:solidFill>
+                      <a:prstDash val="solid"/>
+                      <a:round/>
+                      <a:headEnd type="none" w="med" len="med"/>
+                      <a:tailEnd type="none" w="med" len="med"/>
+                    </a:lnB>
+                    <a:lnTlToBr w="12700" cmpd="sng">
+                      <a:noFill/>
+                      <a:prstDash val="solid"/>
+                    </a:lnTlToBr>
+                    <a:lnBlToTr w="12700" cmpd="sng">
+                      <a:noFill/>
+                      <a:prstDash val="solid"/>
+                    </a:lnBlToTr>
+                    <a:noFill/>
+                  </a:tcPr>
+                </a:tc>
+                <a:tc>
+                  <a:txBody>
+                    <a:bodyPr/>
+                    <a:lstStyle/>
+                    <a:p>
+                      <a:pPr algn="ctr"/>
+                      <a:r>
+                        <a:rPr lang="zh-TW" altLang="en-US" sz="600" dirty="0">
+                          <a:solidFill>
+                            <a:schemeClr val="bg1"/>
+                          </a:solidFill>
+                          <a:latin typeface="源樣明體 SB" panose="02020600000000000000" pitchFamily="18" charset="-120"/>
+                          <a:ea typeface="源樣明體 SB" panose="02020600000000000000" pitchFamily="18" charset="-120"/>
+                        </a:rPr>
+                        <a:t>約 </a:t>
+                      </a:r>
+                      <a:r>
+                        <a:rPr lang="en-US" altLang="zh-TW" sz="600" dirty="0">
+                          <a:solidFill>
+                            <a:schemeClr val="bg1"/>
+                          </a:solidFill>
+                          <a:latin typeface="源樣明體 SB" panose="02020600000000000000" pitchFamily="18" charset="-120"/>
+                          <a:ea typeface="源樣明體 SB" panose="02020600000000000000" pitchFamily="18" charset="-120"/>
+                        </a:rPr>
+                        <a:t>2 </a:t>
+                      </a:r>
+                      <a:r>
+                        <a:rPr lang="zh-TW" altLang="en-US" sz="600" dirty="0">
+                          <a:solidFill>
+                            <a:schemeClr val="bg1"/>
+                          </a:solidFill>
+                          <a:latin typeface="源樣明體 SB" panose="02020600000000000000" pitchFamily="18" charset="-120"/>
+                          <a:ea typeface="源樣明體 SB" panose="02020600000000000000" pitchFamily="18" charset="-120"/>
+                        </a:rPr>
+                        <a:t>小時</a:t>
+                      </a:r>
+                      <a:endParaRPr lang="en-US" sz="600" dirty="0">
+                        <a:solidFill>
+                          <a:schemeClr val="bg1"/>
+                        </a:solidFill>
+                        <a:latin typeface="源樣明體 SB" panose="02020600000000000000" pitchFamily="18" charset="-120"/>
+                        <a:ea typeface="源樣明體 SB" panose="02020600000000000000" pitchFamily="18" charset="-120"/>
+                      </a:endParaRPr>
+                    </a:p>
+                  </a:txBody>
+                  <a:tcPr>
+                    <a:lnL w="3175" cap="flat" cmpd="sng" algn="ctr">
+                      <a:solidFill>
+                        <a:schemeClr val="bg1"/>
+                      </a:solidFill>
+                      <a:prstDash val="solid"/>
+                      <a:round/>
+                      <a:headEnd type="none" w="med" len="med"/>
+                      <a:tailEnd type="none" w="med" len="med"/>
+                    </a:lnL>
+                    <a:lnR w="3175" cap="flat" cmpd="sng" algn="ctr">
+                      <a:solidFill>
+                        <a:schemeClr val="bg1"/>
+                      </a:solidFill>
+                      <a:prstDash val="solid"/>
+                      <a:round/>
+                      <a:headEnd type="none" w="med" len="med"/>
+                      <a:tailEnd type="none" w="med" len="med"/>
+                    </a:lnR>
+                    <a:lnT w="3175" cap="flat" cmpd="sng" algn="ctr">
+                      <a:solidFill>
+                        <a:schemeClr val="bg1"/>
+                      </a:solidFill>
+                      <a:prstDash val="solid"/>
+                      <a:round/>
+                      <a:headEnd type="none" w="med" len="med"/>
+                      <a:tailEnd type="none" w="med" len="med"/>
+                    </a:lnT>
+                    <a:lnB w="3175" cap="flat" cmpd="sng" algn="ctr">
+                      <a:solidFill>
+                        <a:schemeClr val="bg1"/>
+                      </a:solidFill>
+                      <a:prstDash val="solid"/>
+                      <a:round/>
+                      <a:headEnd type="none" w="med" len="med"/>
+                      <a:tailEnd type="none" w="med" len="med"/>
+                    </a:lnB>
+                    <a:lnTlToBr w="12700" cmpd="sng">
+                      <a:noFill/>
+                      <a:prstDash val="solid"/>
+                    </a:lnTlToBr>
+                    <a:lnBlToTr w="12700" cmpd="sng">
+                      <a:noFill/>
+                      <a:prstDash val="solid"/>
+                    </a:lnBlToTr>
+                    <a:noFill/>
+                  </a:tcPr>
+                </a:tc>
+                <a:extLst>
+                  <a:ext uri="{0D108BD9-81ED-4DB2-BD59-A6C34878D82A}">
+                    <a16:rowId xmlns:a16="http://schemas.microsoft.com/office/drawing/2014/main" val="1169259986"/>
+                  </a:ext>
+                </a:extLst>
+              </a:tr>
+              <a:tr h="174857">
+                <a:tc>
+                  <a:txBody>
+                    <a:bodyPr/>
+                    <a:lstStyle/>
+                    <a:p>
+                      <a:r>
+                        <a:rPr lang="zh-TW" altLang="en-US" sz="600" dirty="0">
+                          <a:solidFill>
+                            <a:schemeClr val="bg1"/>
+                          </a:solidFill>
+                          <a:latin typeface="源樣明體 SB" panose="02020600000000000000" pitchFamily="18" charset="-120"/>
+                          <a:ea typeface="源樣明體 SB" panose="02020600000000000000" pitchFamily="18" charset="-120"/>
+                        </a:rPr>
+                        <a:t>其他細節</a:t>
+                      </a:r>
+                      <a:endParaRPr lang="en-US" sz="600" dirty="0">
+                        <a:solidFill>
+                          <a:schemeClr val="bg1"/>
+                        </a:solidFill>
+                        <a:latin typeface="源樣明體 SB" panose="02020600000000000000" pitchFamily="18" charset="-120"/>
+                        <a:ea typeface="源樣明體 SB" panose="02020600000000000000" pitchFamily="18" charset="-120"/>
+                      </a:endParaRPr>
+                    </a:p>
+                  </a:txBody>
+                  <a:tcPr>
+                    <a:lnL w="3175" cap="flat" cmpd="sng" algn="ctr">
+                      <a:solidFill>
+                        <a:schemeClr val="bg1"/>
+                      </a:solidFill>
+                      <a:prstDash val="solid"/>
+                      <a:round/>
+                      <a:headEnd type="none" w="med" len="med"/>
+                      <a:tailEnd type="none" w="med" len="med"/>
+                    </a:lnL>
+                    <a:lnR w="3175" cap="flat" cmpd="sng" algn="ctr">
+                      <a:solidFill>
+                        <a:schemeClr val="bg1"/>
+                      </a:solidFill>
+                      <a:prstDash val="solid"/>
+                      <a:round/>
+                      <a:headEnd type="none" w="med" len="med"/>
+                      <a:tailEnd type="none" w="med" len="med"/>
+                    </a:lnR>
+                    <a:lnT w="3175" cap="flat" cmpd="sng" algn="ctr">
+                      <a:solidFill>
+                        <a:schemeClr val="bg1"/>
+                      </a:solidFill>
+                      <a:prstDash val="solid"/>
+                      <a:round/>
+                      <a:headEnd type="none" w="med" len="med"/>
+                      <a:tailEnd type="none" w="med" len="med"/>
+                    </a:lnT>
+                    <a:lnB w="3175" cap="flat" cmpd="sng" algn="ctr">
+                      <a:solidFill>
+                        <a:schemeClr val="bg1"/>
+                      </a:solidFill>
+                      <a:prstDash val="solid"/>
+                      <a:round/>
+                      <a:headEnd type="none" w="med" len="med"/>
+                      <a:tailEnd type="none" w="med" len="med"/>
+                    </a:lnB>
+                    <a:lnTlToBr w="12700" cmpd="sng">
+                      <a:noFill/>
+                      <a:prstDash val="solid"/>
+                    </a:lnTlToBr>
+                    <a:lnBlToTr w="12700" cmpd="sng">
+                      <a:noFill/>
+                      <a:prstDash val="solid"/>
+                    </a:lnBlToTr>
+                    <a:noFill/>
+                  </a:tcPr>
+                </a:tc>
+                <a:tc>
+                  <a:txBody>
+                    <a:bodyPr/>
+                    <a:lstStyle/>
+                    <a:p>
+                      <a:pPr algn="ctr"/>
+                      <a:r>
+                        <a:rPr lang="zh-TW" altLang="en-US" sz="600" dirty="0">
+                          <a:solidFill>
+                            <a:schemeClr val="bg1"/>
+                          </a:solidFill>
+                          <a:latin typeface="源樣明體 SB" panose="02020600000000000000" pitchFamily="18" charset="-120"/>
+                          <a:ea typeface="源樣明體 SB" panose="02020600000000000000" pitchFamily="18" charset="-120"/>
+                        </a:rPr>
+                        <a:t>約 </a:t>
+                      </a:r>
+                      <a:r>
+                        <a:rPr lang="en-US" altLang="zh-TW" sz="600" dirty="0">
+                          <a:solidFill>
+                            <a:schemeClr val="bg1"/>
+                          </a:solidFill>
+                          <a:latin typeface="源樣明體 SB" panose="02020600000000000000" pitchFamily="18" charset="-120"/>
+                          <a:ea typeface="源樣明體 SB" panose="02020600000000000000" pitchFamily="18" charset="-120"/>
+                        </a:rPr>
+                        <a:t>40</a:t>
+                      </a:r>
+                      <a:r>
+                        <a:rPr lang="zh-TW" altLang="en-US" sz="600" dirty="0">
+                          <a:solidFill>
+                            <a:schemeClr val="bg1"/>
+                          </a:solidFill>
+                          <a:latin typeface="源樣明體 SB" panose="02020600000000000000" pitchFamily="18" charset="-120"/>
+                          <a:ea typeface="源樣明體 SB" panose="02020600000000000000" pitchFamily="18" charset="-120"/>
+                        </a:rPr>
+                        <a:t> 小時</a:t>
+                      </a:r>
+                      <a:endParaRPr lang="en-US" sz="600" dirty="0">
+                        <a:solidFill>
+                          <a:schemeClr val="bg1"/>
+                        </a:solidFill>
+                        <a:latin typeface="源樣明體 SB" panose="02020600000000000000" pitchFamily="18" charset="-120"/>
+                        <a:ea typeface="源樣明體 SB" panose="02020600000000000000" pitchFamily="18" charset="-120"/>
+                      </a:endParaRPr>
+                    </a:p>
+                  </a:txBody>
+                  <a:tcPr>
+                    <a:lnL w="3175" cap="flat" cmpd="sng" algn="ctr">
+                      <a:solidFill>
+                        <a:schemeClr val="bg1"/>
+                      </a:solidFill>
+                      <a:prstDash val="solid"/>
+                      <a:round/>
+                      <a:headEnd type="none" w="med" len="med"/>
+                      <a:tailEnd type="none" w="med" len="med"/>
+                    </a:lnL>
+                    <a:lnR w="3175" cap="flat" cmpd="sng" algn="ctr">
+                      <a:solidFill>
+                        <a:schemeClr val="bg1"/>
+                      </a:solidFill>
+                      <a:prstDash val="solid"/>
+                      <a:round/>
+                      <a:headEnd type="none" w="med" len="med"/>
+                      <a:tailEnd type="none" w="med" len="med"/>
+                    </a:lnR>
+                    <a:lnT w="3175" cap="flat" cmpd="sng" algn="ctr">
+                      <a:solidFill>
+                        <a:schemeClr val="bg1"/>
+                      </a:solidFill>
+                      <a:prstDash val="solid"/>
+                      <a:round/>
+                      <a:headEnd type="none" w="med" len="med"/>
+                      <a:tailEnd type="none" w="med" len="med"/>
+                    </a:lnT>
+                    <a:lnB w="3175" cap="flat" cmpd="sng" algn="ctr">
+                      <a:solidFill>
+                        <a:schemeClr val="bg1"/>
+                      </a:solidFill>
+                      <a:prstDash val="solid"/>
+                      <a:round/>
+                      <a:headEnd type="none" w="med" len="med"/>
+                      <a:tailEnd type="none" w="med" len="med"/>
+                    </a:lnB>
+                    <a:lnTlToBr w="12700" cmpd="sng">
+                      <a:noFill/>
+                      <a:prstDash val="solid"/>
+                    </a:lnTlToBr>
+                    <a:lnBlToTr w="12700" cmpd="sng">
+                      <a:noFill/>
+                      <a:prstDash val="solid"/>
+                    </a:lnBlToTr>
+                    <a:noFill/>
+                  </a:tcPr>
+                </a:tc>
+                <a:extLst>
+                  <a:ext uri="{0D108BD9-81ED-4DB2-BD59-A6C34878D82A}">
+                    <a16:rowId xmlns:a16="http://schemas.microsoft.com/office/drawing/2014/main" val="1432421676"/>
+                  </a:ext>
+                </a:extLst>
+              </a:tr>
+              <a:tr h="0">
+                <a:tc>
+                  <a:txBody>
+                    <a:bodyPr/>
+                    <a:lstStyle/>
+                    <a:p>
+                      <a:r>
+                        <a:rPr lang="zh-TW" altLang="en-US" sz="300" strike="sngStrike" dirty="0">
+                          <a:solidFill>
+                            <a:schemeClr val="bg1"/>
+                          </a:solidFill>
+                          <a:latin typeface="源樣明體 SB" panose="02020600000000000000" pitchFamily="18" charset="-120"/>
+                          <a:ea typeface="源樣明體 SB" panose="02020600000000000000" pitchFamily="18" charset="-120"/>
+                        </a:rPr>
+                        <a:t>懷疑人生</a:t>
+                      </a:r>
+                      <a:endParaRPr lang="en-US" sz="300" strike="sngStrike" dirty="0">
+                        <a:solidFill>
+                          <a:schemeClr val="bg1"/>
+                        </a:solidFill>
+                        <a:latin typeface="源樣明體 SB" panose="02020600000000000000" pitchFamily="18" charset="-120"/>
+                        <a:ea typeface="源樣明體 SB" panose="02020600000000000000" pitchFamily="18" charset="-120"/>
+                      </a:endParaRPr>
+                    </a:p>
+                  </a:txBody>
+                  <a:tcPr>
+                    <a:lnL w="3175" cap="flat" cmpd="sng" algn="ctr">
+                      <a:solidFill>
+                        <a:schemeClr val="bg1"/>
+                      </a:solidFill>
+                      <a:prstDash val="solid"/>
+                      <a:round/>
+                      <a:headEnd type="none" w="med" len="med"/>
+                      <a:tailEnd type="none" w="med" len="med"/>
+                    </a:lnL>
+                    <a:lnR w="3175" cap="flat" cmpd="sng" algn="ctr">
+                      <a:solidFill>
+                        <a:schemeClr val="bg1"/>
+                      </a:solidFill>
+                      <a:prstDash val="solid"/>
+                      <a:round/>
+                      <a:headEnd type="none" w="med" len="med"/>
+                      <a:tailEnd type="none" w="med" len="med"/>
+                    </a:lnR>
+                    <a:lnT w="3175" cap="flat" cmpd="sng" algn="ctr">
+                      <a:solidFill>
+                        <a:schemeClr val="bg1"/>
+                      </a:solidFill>
+                      <a:prstDash val="solid"/>
+                      <a:round/>
+                      <a:headEnd type="none" w="med" len="med"/>
+                      <a:tailEnd type="none" w="med" len="med"/>
+                    </a:lnT>
+                    <a:lnB w="3175" cap="flat" cmpd="sng" algn="ctr">
+                      <a:solidFill>
+                        <a:schemeClr val="bg1"/>
+                      </a:solidFill>
+                      <a:prstDash val="solid"/>
+                      <a:round/>
+                      <a:headEnd type="none" w="med" len="med"/>
+                      <a:tailEnd type="none" w="med" len="med"/>
+                    </a:lnB>
+                    <a:lnTlToBr w="12700" cmpd="sng">
+                      <a:noFill/>
+                      <a:prstDash val="solid"/>
+                    </a:lnTlToBr>
+                    <a:lnBlToTr w="12700" cmpd="sng">
+                      <a:noFill/>
+                      <a:prstDash val="solid"/>
+                    </a:lnBlToTr>
+                    <a:noFill/>
+                  </a:tcPr>
+                </a:tc>
+                <a:tc>
+                  <a:txBody>
+                    <a:bodyPr/>
+                    <a:lstStyle/>
+                    <a:p>
+                      <a:pPr algn="ctr"/>
+                      <a:r>
+                        <a:rPr lang="zh-TW" altLang="en-US" sz="300" strike="sngStrike" dirty="0">
+                          <a:solidFill>
+                            <a:schemeClr val="bg1"/>
+                          </a:solidFill>
+                          <a:latin typeface="源樣明體 SB" panose="02020600000000000000" pitchFamily="18" charset="-120"/>
+                          <a:ea typeface="源樣明體 SB" panose="02020600000000000000" pitchFamily="18" charset="-120"/>
+                        </a:rPr>
+                        <a:t>約 </a:t>
+                      </a:r>
+                      <a:r>
+                        <a:rPr lang="en-US" altLang="zh-TW" sz="300" strike="sngStrike" dirty="0">
+                          <a:solidFill>
+                            <a:schemeClr val="bg1"/>
+                          </a:solidFill>
+                          <a:latin typeface="源樣明體 SB" panose="02020600000000000000" pitchFamily="18" charset="-120"/>
+                          <a:ea typeface="源樣明體 SB" panose="02020600000000000000" pitchFamily="18" charset="-120"/>
+                        </a:rPr>
+                        <a:t>50 </a:t>
+                      </a:r>
+                      <a:r>
+                        <a:rPr lang="zh-TW" altLang="en-US" sz="300" strike="sngStrike" dirty="0">
+                          <a:solidFill>
+                            <a:schemeClr val="bg1"/>
+                          </a:solidFill>
+                          <a:latin typeface="源樣明體 SB" panose="02020600000000000000" pitchFamily="18" charset="-120"/>
+                          <a:ea typeface="源樣明體 SB" panose="02020600000000000000" pitchFamily="18" charset="-120"/>
+                        </a:rPr>
+                        <a:t>小時</a:t>
+                      </a:r>
+                      <a:endParaRPr lang="en-US" sz="300" strike="sngStrike" dirty="0">
+                        <a:solidFill>
+                          <a:schemeClr val="bg1"/>
+                        </a:solidFill>
+                        <a:latin typeface="源樣明體 SB" panose="02020600000000000000" pitchFamily="18" charset="-120"/>
+                        <a:ea typeface="源樣明體 SB" panose="02020600000000000000" pitchFamily="18" charset="-120"/>
+                      </a:endParaRPr>
+                    </a:p>
+                  </a:txBody>
+                  <a:tcPr>
+                    <a:lnL w="3175" cap="flat" cmpd="sng" algn="ctr">
+                      <a:solidFill>
+                        <a:schemeClr val="bg1"/>
+                      </a:solidFill>
+                      <a:prstDash val="solid"/>
+                      <a:round/>
+                      <a:headEnd type="none" w="med" len="med"/>
+                      <a:tailEnd type="none" w="med" len="med"/>
+                    </a:lnL>
+                    <a:lnR w="3175" cap="flat" cmpd="sng" algn="ctr">
+                      <a:solidFill>
+                        <a:schemeClr val="bg1"/>
+                      </a:solidFill>
+                      <a:prstDash val="solid"/>
+                      <a:round/>
+                      <a:headEnd type="none" w="med" len="med"/>
+                      <a:tailEnd type="none" w="med" len="med"/>
+                    </a:lnR>
+                    <a:lnT w="3175" cap="flat" cmpd="sng" algn="ctr">
+                      <a:solidFill>
+                        <a:schemeClr val="bg1"/>
+                      </a:solidFill>
+                      <a:prstDash val="solid"/>
+                      <a:round/>
+                      <a:headEnd type="none" w="med" len="med"/>
+                      <a:tailEnd type="none" w="med" len="med"/>
+                    </a:lnT>
+                    <a:lnB w="3175" cap="flat" cmpd="sng" algn="ctr">
+                      <a:solidFill>
+                        <a:schemeClr val="bg1"/>
+                      </a:solidFill>
+                      <a:prstDash val="solid"/>
+                      <a:round/>
+                      <a:headEnd type="none" w="med" len="med"/>
+                      <a:tailEnd type="none" w="med" len="med"/>
+                    </a:lnB>
+                    <a:lnTlToBr w="12700" cmpd="sng">
+                      <a:noFill/>
+                      <a:prstDash val="solid"/>
+                    </a:lnTlToBr>
+                    <a:lnBlToTr w="12700" cmpd="sng">
+                      <a:noFill/>
+                      <a:prstDash val="solid"/>
+                    </a:lnBlToTr>
+                    <a:noFill/>
+                  </a:tcPr>
+                </a:tc>
+                <a:extLst>
+                  <a:ext uri="{0D108BD9-81ED-4DB2-BD59-A6C34878D82A}">
+                    <a16:rowId xmlns:a16="http://schemas.microsoft.com/office/drawing/2014/main" val="2170836032"/>
+                  </a:ext>
+                </a:extLst>
+              </a:tr>
+            </a:tbl>
+          </a:graphicData>
+        </a:graphic>
+      </p:graphicFrame>
     </p:spTree>
     <p:extLst>
       <p:ext uri="{BB962C8B-B14F-4D97-AF65-F5344CB8AC3E}">
@@ -5598,7 +7445,7 @@
         </p:nvSpPr>
         <p:spPr>
           <a:xfrm>
-            <a:off x="4136167" y="2392144"/>
+            <a:off x="4136167" y="2855440"/>
             <a:ext cx="3919663" cy="677108"/>
           </a:xfrm>
           <a:prstGeom prst="rect">
@@ -5668,6 +7515,127 @@
                 <a:ea typeface="源樣明體 SB" panose="02020600000000000000" pitchFamily="18" charset="-120"/>
               </a:rPr>
               <a:t>LOL</a:t>
+            </a:r>
+          </a:p>
+        </p:txBody>
+      </p:sp>
+      <p:pic>
+        <p:nvPicPr>
+          <p:cNvPr id="8" name="圖片 7" descr="一張含有 光 的圖片&#10;&#10;自動產生的描述">
+            <a:extLst>
+              <a:ext uri="{FF2B5EF4-FFF2-40B4-BE49-F238E27FC236}">
+                <a16:creationId xmlns:a16="http://schemas.microsoft.com/office/drawing/2014/main" id="{DA0B05CE-C126-179A-9983-B4BAA6505E68}"/>
+              </a:ext>
+            </a:extLst>
+          </p:cNvPr>
+          <p:cNvPicPr>
+            <a:picLocks noChangeAspect="1"/>
+          </p:cNvPicPr>
+          <p:nvPr/>
+        </p:nvPicPr>
+        <p:blipFill>
+          <a:blip r:embed="rId3">
+            <a:extLst>
+              <a:ext uri="{28A0092B-C50C-407E-A947-70E740481C1C}">
+                <a14:useLocalDpi xmlns:a14="http://schemas.microsoft.com/office/drawing/2010/main" val="0"/>
+              </a:ext>
+            </a:extLst>
+          </a:blip>
+          <a:stretch>
+            <a:fillRect/>
+          </a:stretch>
+        </p:blipFill>
+        <p:spPr>
+          <a:xfrm>
+            <a:off x="5686843" y="2222521"/>
+            <a:ext cx="818314" cy="591005"/>
+          </a:xfrm>
+          <a:prstGeom prst="rect">
+            <a:avLst/>
+          </a:prstGeom>
+        </p:spPr>
+      </p:pic>
+      <p:cxnSp>
+        <p:nvCxnSpPr>
+          <p:cNvPr id="10" name="直線單箭頭接點 9">
+            <a:extLst>
+              <a:ext uri="{FF2B5EF4-FFF2-40B4-BE49-F238E27FC236}">
+                <a16:creationId xmlns:a16="http://schemas.microsoft.com/office/drawing/2014/main" id="{59DA6A31-8C87-231A-498C-E77B5D86575C}"/>
+              </a:ext>
+            </a:extLst>
+          </p:cNvPr>
+          <p:cNvCxnSpPr>
+            <a:cxnSpLocks/>
+          </p:cNvCxnSpPr>
+          <p:nvPr/>
+        </p:nvCxnSpPr>
+        <p:spPr>
+          <a:xfrm flipH="1">
+            <a:off x="6723597" y="2392680"/>
+            <a:ext cx="341561" cy="98441"/>
+          </a:xfrm>
+          <a:prstGeom prst="straightConnector1">
+            <a:avLst/>
+          </a:prstGeom>
+          <a:ln w="28575">
+            <a:solidFill>
+              <a:schemeClr val="bg1"/>
+            </a:solidFill>
+            <a:tailEnd type="triangle"/>
+          </a:ln>
+        </p:spPr>
+        <p:style>
+          <a:lnRef idx="1">
+            <a:schemeClr val="accent1"/>
+          </a:lnRef>
+          <a:fillRef idx="0">
+            <a:schemeClr val="accent1"/>
+          </a:fillRef>
+          <a:effectRef idx="0">
+            <a:schemeClr val="accent1"/>
+          </a:effectRef>
+          <a:fontRef idx="minor">
+            <a:schemeClr val="tx1"/>
+          </a:fontRef>
+        </p:style>
+      </p:cxnSp>
+      <p:sp>
+        <p:nvSpPr>
+          <p:cNvPr id="12" name="文字方塊 11">
+            <a:extLst>
+              <a:ext uri="{FF2B5EF4-FFF2-40B4-BE49-F238E27FC236}">
+                <a16:creationId xmlns:a16="http://schemas.microsoft.com/office/drawing/2014/main" id="{D05B3A89-064B-C41B-2018-4256AA9CCDB6}"/>
+              </a:ext>
+            </a:extLst>
+          </p:cNvPr>
+          <p:cNvSpPr txBox="1"/>
+          <p:nvPr/>
+        </p:nvSpPr>
+        <p:spPr>
+          <a:xfrm>
+            <a:off x="7065158" y="2282792"/>
+            <a:ext cx="360996" cy="200055"/>
+          </a:xfrm>
+          <a:prstGeom prst="rect">
+            <a:avLst/>
+          </a:prstGeom>
+          <a:noFill/>
+        </p:spPr>
+        <p:txBody>
+          <a:bodyPr wrap="none" rtlCol="0">
+            <a:spAutoFit/>
+          </a:bodyPr>
+          <a:lstStyle/>
+          <a:p>
+            <a:r>
+              <a:rPr lang="en-US" sz="700" dirty="0">
+                <a:solidFill>
+                  <a:schemeClr val="bg1"/>
+                </a:solidFill>
+                <a:latin typeface="源樣明體 SB" panose="02020600000000000000" pitchFamily="18" charset="-120"/>
+                <a:ea typeface="源樣明體 SB" panose="02020600000000000000" pitchFamily="18" charset="-120"/>
+              </a:rPr>
+              <a:t>You</a:t>
             </a:r>
           </a:p>
         </p:txBody>

</xml_diff>